<commit_message>
week 2 Monday lecture draft
</commit_message>
<xml_diff>
--- a/slides/On-Campus/02_01_Variables.pptx
+++ b/slides/On-Campus/02_01_Variables.pptx
@@ -2,45 +2,47 @@
 <file path=ppt/presentation.xml><?xml version="1.0" encoding="utf-8"?>
 <p:presentation xmlns:a="http://schemas.openxmlformats.org/drawingml/2006/main" xmlns:r="http://schemas.openxmlformats.org/officeDocument/2006/relationships" xmlns:p="http://schemas.openxmlformats.org/presentationml/2006/main" strictFirstAndLastChars="0" embedTrueTypeFonts="1" saveSubsetFonts="1" autoCompressPictures="0">
   <p:sldMasterIdLst>
-    <p:sldMasterId id="2147483685" r:id="rId1"/>
+    <p:sldMasterId id="2147483685" r:id="rId4"/>
   </p:sldMasterIdLst>
   <p:notesMasterIdLst>
-    <p:notesMasterId r:id="rId11"/>
+    <p:notesMasterId r:id="rId16"/>
   </p:notesMasterIdLst>
   <p:sldIdLst>
-    <p:sldId id="256" r:id="rId2"/>
-    <p:sldId id="263" r:id="rId3"/>
-    <p:sldId id="261" r:id="rId4"/>
-    <p:sldId id="262" r:id="rId5"/>
-    <p:sldId id="257" r:id="rId6"/>
-    <p:sldId id="258" r:id="rId7"/>
-    <p:sldId id="259" r:id="rId8"/>
-    <p:sldId id="260" r:id="rId9"/>
-    <p:sldId id="264" r:id="rId10"/>
+    <p:sldId id="256" r:id="rId5"/>
+    <p:sldId id="263" r:id="rId6"/>
+    <p:sldId id="261" r:id="rId7"/>
+    <p:sldId id="262" r:id="rId8"/>
+    <p:sldId id="257" r:id="rId9"/>
+    <p:sldId id="258" r:id="rId10"/>
+    <p:sldId id="259" r:id="rId11"/>
+    <p:sldId id="260" r:id="rId12"/>
+    <p:sldId id="265" r:id="rId13"/>
+    <p:sldId id="266" r:id="rId14"/>
+    <p:sldId id="264" r:id="rId15"/>
   </p:sldIdLst>
   <p:sldSz cx="9144000" cy="5143500" type="screen16x9"/>
   <p:notesSz cx="6858000" cy="9144000"/>
   <p:embeddedFontLst>
     <p:embeddedFont>
-      <p:font typeface="Consolas" panose="020B0609020204030204" pitchFamily="49" charset="0"/>
-      <p:regular r:id="rId12"/>
-      <p:bold r:id="rId13"/>
-      <p:italic r:id="rId14"/>
-      <p:boldItalic r:id="rId15"/>
+      <p:font typeface="Proxima Nova" panose="020B0604020202020204" charset="0"/>
+      <p:regular r:id="rId17"/>
+      <p:bold r:id="rId18"/>
+      <p:italic r:id="rId19"/>
+      <p:boldItalic r:id="rId20"/>
     </p:embeddedFont>
     <p:embeddedFont>
-      <p:font typeface="Proxima Nova" panose="02000506030000020004" pitchFamily="2" charset="0"/>
-      <p:regular r:id="rId16"/>
-      <p:bold r:id="rId17"/>
-      <p:italic r:id="rId18"/>
-      <p:boldItalic r:id="rId19"/>
+      <p:font typeface="Consolas" panose="020B0609020204030204" pitchFamily="49" charset="0"/>
+      <p:regular r:id="rId21"/>
+      <p:bold r:id="rId22"/>
+      <p:italic r:id="rId23"/>
+      <p:boldItalic r:id="rId24"/>
     </p:embeddedFont>
     <p:embeddedFont>
-      <p:font typeface="Source Sans Pro" panose="020B0503030403020204" pitchFamily="34" charset="0"/>
-      <p:regular r:id="rId20"/>
-      <p:bold r:id="rId21"/>
-      <p:italic r:id="rId22"/>
-      <p:boldItalic r:id="rId23"/>
+      <p:font typeface="Source Sans Pro" panose="020B0604020202020204" charset="0"/>
+      <p:regular r:id="rId25"/>
+      <p:bold r:id="rId26"/>
+      <p:italic r:id="rId27"/>
+      <p:boldItalic r:id="rId28"/>
     </p:embeddedFont>
   </p:embeddedFontLst>
   <p:defaultTextStyle>
@@ -1245,6 +1247,224 @@
         </p:txBody>
       </p:sp>
     </p:spTree>
+  </p:cSld>
+  <p:clrMapOvr>
+    <a:masterClrMapping/>
+  </p:clrMapOvr>
+</p:notes>
+</file>
+
+<file path=ppt/notesSlides/notesSlide6.xml><?xml version="1.0" encoding="utf-8"?>
+<p:notes xmlns:a="http://schemas.openxmlformats.org/drawingml/2006/main" xmlns:r="http://schemas.openxmlformats.org/officeDocument/2006/relationships" xmlns:p="http://schemas.openxmlformats.org/presentationml/2006/main" showMasterSp="0" showMasterPhAnim="0">
+  <p:cSld>
+    <p:spTree>
+      <p:nvGrpSpPr>
+        <p:cNvPr id="1" name="Shape 206"/>
+        <p:cNvGrpSpPr/>
+        <p:nvPr/>
+      </p:nvGrpSpPr>
+      <p:grpSpPr>
+        <a:xfrm>
+          <a:off x="0" y="0"/>
+          <a:ext cx="0" cy="0"/>
+          <a:chOff x="0" y="0"/>
+          <a:chExt cx="0" cy="0"/>
+        </a:xfrm>
+      </p:grpSpPr>
+      <p:sp>
+        <p:nvSpPr>
+          <p:cNvPr id="207" name="Google Shape;207;g6e365c192e_0_203:notes"/>
+          <p:cNvSpPr>
+            <a:spLocks noGrp="1" noRot="1" noChangeAspect="1"/>
+          </p:cNvSpPr>
+          <p:nvPr>
+            <p:ph type="sldImg" idx="2"/>
+          </p:nvPr>
+        </p:nvSpPr>
+        <p:spPr>
+          <a:xfrm>
+            <a:off x="381000" y="685800"/>
+            <a:ext cx="6096000" cy="3429000"/>
+          </a:xfrm>
+          <a:custGeom>
+            <a:avLst/>
+            <a:gdLst/>
+            <a:ahLst/>
+            <a:cxnLst/>
+            <a:rect l="l" t="t" r="r" b="b"/>
+            <a:pathLst>
+              <a:path w="120000" h="120000" extrusionOk="0">
+                <a:moveTo>
+                  <a:pt x="0" y="0"/>
+                </a:moveTo>
+                <a:lnTo>
+                  <a:pt x="120000" y="0"/>
+                </a:lnTo>
+                <a:lnTo>
+                  <a:pt x="120000" y="120000"/>
+                </a:lnTo>
+                <a:lnTo>
+                  <a:pt x="0" y="120000"/>
+                </a:lnTo>
+                <a:close/>
+              </a:path>
+            </a:pathLst>
+          </a:custGeom>
+        </p:spPr>
+      </p:sp>
+      <p:sp>
+        <p:nvSpPr>
+          <p:cNvPr id="208" name="Google Shape;208;g6e365c192e_0_203:notes"/>
+          <p:cNvSpPr txBox="1">
+            <a:spLocks noGrp="1"/>
+          </p:cNvSpPr>
+          <p:nvPr>
+            <p:ph type="body" idx="1"/>
+          </p:nvPr>
+        </p:nvSpPr>
+        <p:spPr>
+          <a:xfrm>
+            <a:off x="685800" y="4343400"/>
+            <a:ext cx="5486400" cy="4114800"/>
+          </a:xfrm>
+          <a:prstGeom prst="rect">
+            <a:avLst/>
+          </a:prstGeom>
+        </p:spPr>
+        <p:txBody>
+          <a:bodyPr spcFirstLastPara="1" wrap="square" lIns="91425" tIns="91425" rIns="91425" bIns="91425" anchor="t" anchorCtr="0">
+            <a:noAutofit/>
+          </a:bodyPr>
+          <a:lstStyle/>
+          <a:p>
+            <a:pPr marL="0" lvl="0" indent="0" algn="l" rtl="0">
+              <a:spcBef>
+                <a:spcPts val="0"/>
+              </a:spcBef>
+              <a:spcAft>
+                <a:spcPts val="0"/>
+              </a:spcAft>
+              <a:buNone/>
+            </a:pPr>
+            <a:endParaRPr/>
+          </a:p>
+        </p:txBody>
+      </p:sp>
+    </p:spTree>
+    <p:extLst>
+      <p:ext uri="{BB962C8B-B14F-4D97-AF65-F5344CB8AC3E}">
+        <p14:creationId xmlns:p14="http://schemas.microsoft.com/office/powerpoint/2010/main" val="3772290187"/>
+      </p:ext>
+    </p:extLst>
+  </p:cSld>
+  <p:clrMapOvr>
+    <a:masterClrMapping/>
+  </p:clrMapOvr>
+</p:notes>
+</file>
+
+<file path=ppt/notesSlides/notesSlide7.xml><?xml version="1.0" encoding="utf-8"?>
+<p:notes xmlns:a="http://schemas.openxmlformats.org/drawingml/2006/main" xmlns:r="http://schemas.openxmlformats.org/officeDocument/2006/relationships" xmlns:p="http://schemas.openxmlformats.org/presentationml/2006/main" showMasterSp="0" showMasterPhAnim="0">
+  <p:cSld>
+    <p:spTree>
+      <p:nvGrpSpPr>
+        <p:cNvPr id="1" name="Shape 206"/>
+        <p:cNvGrpSpPr/>
+        <p:nvPr/>
+      </p:nvGrpSpPr>
+      <p:grpSpPr>
+        <a:xfrm>
+          <a:off x="0" y="0"/>
+          <a:ext cx="0" cy="0"/>
+          <a:chOff x="0" y="0"/>
+          <a:chExt cx="0" cy="0"/>
+        </a:xfrm>
+      </p:grpSpPr>
+      <p:sp>
+        <p:nvSpPr>
+          <p:cNvPr id="207" name="Google Shape;207;g6e365c192e_0_203:notes"/>
+          <p:cNvSpPr>
+            <a:spLocks noGrp="1" noRot="1" noChangeAspect="1"/>
+          </p:cNvSpPr>
+          <p:nvPr>
+            <p:ph type="sldImg" idx="2"/>
+          </p:nvPr>
+        </p:nvSpPr>
+        <p:spPr>
+          <a:xfrm>
+            <a:off x="381000" y="685800"/>
+            <a:ext cx="6096000" cy="3429000"/>
+          </a:xfrm>
+          <a:custGeom>
+            <a:avLst/>
+            <a:gdLst/>
+            <a:ahLst/>
+            <a:cxnLst/>
+            <a:rect l="l" t="t" r="r" b="b"/>
+            <a:pathLst>
+              <a:path w="120000" h="120000" extrusionOk="0">
+                <a:moveTo>
+                  <a:pt x="0" y="0"/>
+                </a:moveTo>
+                <a:lnTo>
+                  <a:pt x="120000" y="0"/>
+                </a:lnTo>
+                <a:lnTo>
+                  <a:pt x="120000" y="120000"/>
+                </a:lnTo>
+                <a:lnTo>
+                  <a:pt x="0" y="120000"/>
+                </a:lnTo>
+                <a:close/>
+              </a:path>
+            </a:pathLst>
+          </a:custGeom>
+        </p:spPr>
+      </p:sp>
+      <p:sp>
+        <p:nvSpPr>
+          <p:cNvPr id="208" name="Google Shape;208;g6e365c192e_0_203:notes"/>
+          <p:cNvSpPr txBox="1">
+            <a:spLocks noGrp="1"/>
+          </p:cNvSpPr>
+          <p:nvPr>
+            <p:ph type="body" idx="1"/>
+          </p:nvPr>
+        </p:nvSpPr>
+        <p:spPr>
+          <a:xfrm>
+            <a:off x="685800" y="4343400"/>
+            <a:ext cx="5486400" cy="4114800"/>
+          </a:xfrm>
+          <a:prstGeom prst="rect">
+            <a:avLst/>
+          </a:prstGeom>
+        </p:spPr>
+        <p:txBody>
+          <a:bodyPr spcFirstLastPara="1" wrap="square" lIns="91425" tIns="91425" rIns="91425" bIns="91425" anchor="t" anchorCtr="0">
+            <a:noAutofit/>
+          </a:bodyPr>
+          <a:lstStyle/>
+          <a:p>
+            <a:pPr marL="0" lvl="0" indent="0" algn="l" rtl="0">
+              <a:spcBef>
+                <a:spcPts val="0"/>
+              </a:spcBef>
+              <a:spcAft>
+                <a:spcPts val="0"/>
+              </a:spcAft>
+              <a:buNone/>
+            </a:pPr>
+            <a:endParaRPr/>
+          </a:p>
+        </p:txBody>
+      </p:sp>
+    </p:spTree>
+    <p:extLst>
+      <p:ext uri="{BB962C8B-B14F-4D97-AF65-F5344CB8AC3E}">
+        <p14:creationId xmlns:p14="http://schemas.microsoft.com/office/powerpoint/2010/main" val="688029519"/>
+      </p:ext>
+    </p:extLst>
   </p:cSld>
   <p:clrMapOvr>
     <a:masterClrMapping/>
@@ -14986,6 +15206,524 @@
 </p:sld>
 </file>
 
+<file path=ppt/slides/slide10.xml><?xml version="1.0" encoding="utf-8"?>
+<p:sld xmlns:a="http://schemas.openxmlformats.org/drawingml/2006/main" xmlns:r="http://schemas.openxmlformats.org/officeDocument/2006/relationships" xmlns:p="http://schemas.openxmlformats.org/presentationml/2006/main">
+  <p:cSld>
+    <p:spTree>
+      <p:nvGrpSpPr>
+        <p:cNvPr id="1" name="Shape 209"/>
+        <p:cNvGrpSpPr/>
+        <p:nvPr/>
+      </p:nvGrpSpPr>
+      <p:grpSpPr>
+        <a:xfrm>
+          <a:off x="0" y="0"/>
+          <a:ext cx="0" cy="0"/>
+          <a:chOff x="0" y="0"/>
+          <a:chExt cx="0" cy="0"/>
+        </a:xfrm>
+      </p:grpSpPr>
+      <p:sp>
+        <p:nvSpPr>
+          <p:cNvPr id="210" name="Google Shape;210;p43"/>
+          <p:cNvSpPr txBox="1">
+            <a:spLocks noGrp="1"/>
+          </p:cNvSpPr>
+          <p:nvPr>
+            <p:ph type="title"/>
+          </p:nvPr>
+        </p:nvSpPr>
+        <p:spPr>
+          <a:xfrm>
+            <a:off x="407768" y="490964"/>
+            <a:ext cx="8312700" cy="672000"/>
+          </a:xfrm>
+          <a:prstGeom prst="rect">
+            <a:avLst/>
+          </a:prstGeom>
+        </p:spPr>
+        <p:txBody>
+          <a:bodyPr spcFirstLastPara="1" wrap="square" lIns="60500" tIns="60500" rIns="60500" bIns="60500" anchor="b" anchorCtr="0">
+            <a:noAutofit/>
+          </a:bodyPr>
+          <a:lstStyle/>
+          <a:p>
+            <a:pPr marL="0" lvl="0" indent="0" algn="l" rtl="0">
+              <a:spcBef>
+                <a:spcPts val="0"/>
+              </a:spcBef>
+              <a:spcAft>
+                <a:spcPts val="0"/>
+              </a:spcAft>
+              <a:buNone/>
+            </a:pPr>
+            <a:r>
+              <a:rPr lang="en" dirty="0" smtClean="0"/>
+              <a:t>Practice 2 – Group Reflection</a:t>
+            </a:r>
+            <a:endParaRPr dirty="0"/>
+          </a:p>
+        </p:txBody>
+      </p:sp>
+      <p:sp>
+        <p:nvSpPr>
+          <p:cNvPr id="211" name="Google Shape;211;p43"/>
+          <p:cNvSpPr txBox="1">
+            <a:spLocks noGrp="1"/>
+          </p:cNvSpPr>
+          <p:nvPr>
+            <p:ph type="body" idx="1"/>
+          </p:nvPr>
+        </p:nvSpPr>
+        <p:spPr>
+          <a:xfrm>
+            <a:off x="407768" y="1139573"/>
+            <a:ext cx="8312700" cy="4003927"/>
+          </a:xfrm>
+          <a:prstGeom prst="rect">
+            <a:avLst/>
+          </a:prstGeom>
+        </p:spPr>
+        <p:txBody>
+          <a:bodyPr spcFirstLastPara="1" wrap="square" lIns="60500" tIns="60500" rIns="60500" bIns="60500" anchor="t" anchorCtr="0">
+            <a:noAutofit/>
+          </a:bodyPr>
+          <a:lstStyle/>
+          <a:p>
+            <a:pPr marL="152400" indent="0">
+              <a:buNone/>
+            </a:pPr>
+            <a:r>
+              <a:rPr lang="pt-BR" dirty="0">
+                <a:solidFill>
+                  <a:srgbClr val="000000"/>
+                </a:solidFill>
+                <a:latin typeface="Consolas"/>
+                <a:ea typeface="Consolas"/>
+                <a:cs typeface="Consolas"/>
+              </a:rPr>
+              <a:t>int A, B, C;</a:t>
+            </a:r>
+          </a:p>
+          <a:p>
+            <a:pPr marL="152400" indent="0">
+              <a:buNone/>
+            </a:pPr>
+            <a:r>
+              <a:rPr lang="pt-BR" dirty="0">
+                <a:solidFill>
+                  <a:srgbClr val="000000"/>
+                </a:solidFill>
+                <a:latin typeface="Consolas"/>
+                <a:ea typeface="Consolas"/>
+                <a:cs typeface="Consolas"/>
+              </a:rPr>
+              <a:t>A = 10;</a:t>
+            </a:r>
+          </a:p>
+          <a:p>
+            <a:pPr marL="152400" indent="0">
+              <a:buNone/>
+            </a:pPr>
+            <a:r>
+              <a:rPr lang="pt-BR" dirty="0">
+                <a:solidFill>
+                  <a:srgbClr val="000000"/>
+                </a:solidFill>
+                <a:latin typeface="Consolas"/>
+                <a:ea typeface="Consolas"/>
+                <a:cs typeface="Consolas"/>
+              </a:rPr>
+              <a:t>A = A + 1;</a:t>
+            </a:r>
+          </a:p>
+          <a:p>
+            <a:pPr marL="152400" indent="0">
+              <a:buNone/>
+            </a:pPr>
+            <a:r>
+              <a:rPr lang="pt-BR" dirty="0">
+                <a:solidFill>
+                  <a:srgbClr val="000000"/>
+                </a:solidFill>
+                <a:latin typeface="Consolas"/>
+                <a:ea typeface="Consolas"/>
+                <a:cs typeface="Consolas"/>
+              </a:rPr>
+              <a:t>B = A/2;</a:t>
+            </a:r>
+          </a:p>
+          <a:p>
+            <a:pPr marL="152400" indent="0">
+              <a:buNone/>
+            </a:pPr>
+            <a:r>
+              <a:rPr lang="pt-BR" dirty="0">
+                <a:solidFill>
+                  <a:srgbClr val="000000"/>
+                </a:solidFill>
+                <a:latin typeface="Consolas"/>
+                <a:ea typeface="Consolas"/>
+                <a:cs typeface="Consolas"/>
+              </a:rPr>
+              <a:t>A = 6;</a:t>
+            </a:r>
+          </a:p>
+          <a:p>
+            <a:pPr marL="152400" indent="0">
+              <a:buNone/>
+            </a:pPr>
+            <a:r>
+              <a:rPr lang="pt-BR" dirty="0">
+                <a:solidFill>
+                  <a:srgbClr val="000000"/>
+                </a:solidFill>
+                <a:latin typeface="Consolas"/>
+                <a:ea typeface="Consolas"/>
+                <a:cs typeface="Consolas"/>
+              </a:rPr>
+              <a:t>C = B + 1;</a:t>
+            </a:r>
+          </a:p>
+          <a:p>
+            <a:pPr marL="152400" indent="0">
+              <a:buNone/>
+            </a:pPr>
+            <a:r>
+              <a:rPr lang="pt-BR" dirty="0">
+                <a:solidFill>
+                  <a:srgbClr val="000000"/>
+                </a:solidFill>
+                <a:latin typeface="Consolas"/>
+                <a:ea typeface="Consolas"/>
+                <a:cs typeface="Consolas"/>
+              </a:rPr>
+              <a:t>C = C +2;</a:t>
+            </a:r>
+          </a:p>
+          <a:p>
+            <a:pPr marL="152400" indent="0">
+              <a:buNone/>
+            </a:pPr>
+            <a:r>
+              <a:rPr lang="pt-BR" dirty="0">
+                <a:solidFill>
+                  <a:srgbClr val="000000"/>
+                </a:solidFill>
+                <a:latin typeface="Consolas"/>
+                <a:ea typeface="Consolas"/>
+                <a:cs typeface="Consolas"/>
+              </a:rPr>
+              <a:t>A = B/2;</a:t>
+            </a:r>
+          </a:p>
+          <a:p>
+            <a:pPr marL="152400" indent="0">
+              <a:buNone/>
+            </a:pPr>
+            <a:r>
+              <a:rPr lang="en-US" dirty="0"/>
+              <a:t/>
+            </a:r>
+            <a:br>
+              <a:rPr lang="en-US" dirty="0"/>
+            </a:br>
+            <a:endParaRPr lang="en-US" dirty="0">
+              <a:solidFill>
+                <a:srgbClr val="000000"/>
+              </a:solidFill>
+              <a:latin typeface="Consolas"/>
+              <a:ea typeface="Consolas"/>
+              <a:cs typeface="Consolas"/>
+            </a:endParaRPr>
+          </a:p>
+        </p:txBody>
+      </p:sp>
+      <p:sp>
+        <p:nvSpPr>
+          <p:cNvPr id="212" name="Google Shape;212;p43"/>
+          <p:cNvSpPr/>
+          <p:nvPr/>
+        </p:nvSpPr>
+        <p:spPr>
+          <a:xfrm>
+            <a:off x="2902403" y="2956034"/>
+            <a:ext cx="5989200" cy="1600200"/>
+          </a:xfrm>
+          <a:prstGeom prst="rect">
+            <a:avLst/>
+          </a:prstGeom>
+          <a:solidFill>
+            <a:schemeClr val="lt2"/>
+          </a:solidFill>
+          <a:ln w="9525" cap="flat" cmpd="sng">
+            <a:solidFill>
+              <a:schemeClr val="dk2"/>
+            </a:solidFill>
+            <a:prstDash val="solid"/>
+            <a:round/>
+            <a:headEnd type="none" w="sm" len="sm"/>
+            <a:tailEnd type="none" w="sm" len="sm"/>
+          </a:ln>
+        </p:spPr>
+        <p:txBody>
+          <a:bodyPr spcFirstLastPara="1" wrap="square" lIns="91425" tIns="91425" rIns="91425" bIns="91425" anchor="ctr" anchorCtr="0">
+            <a:noAutofit/>
+          </a:bodyPr>
+          <a:lstStyle/>
+          <a:p>
+            <a:pPr marL="0" lvl="0" indent="0" algn="l" rtl="0">
+              <a:spcBef>
+                <a:spcPts val="0"/>
+              </a:spcBef>
+              <a:spcAft>
+                <a:spcPts val="0"/>
+              </a:spcAft>
+              <a:buNone/>
+            </a:pPr>
+            <a:r>
+              <a:rPr lang="en" b="1" dirty="0" smtClean="0"/>
+              <a:t>What are the final values for A, B, and C?</a:t>
+            </a:r>
+          </a:p>
+          <a:p>
+            <a:pPr marL="0" lvl="0" indent="0" algn="l" rtl="0">
+              <a:spcBef>
+                <a:spcPts val="0"/>
+              </a:spcBef>
+              <a:spcAft>
+                <a:spcPts val="0"/>
+              </a:spcAft>
+              <a:buNone/>
+            </a:pPr>
+            <a:endParaRPr lang="en" b="1" dirty="0"/>
+          </a:p>
+          <a:p>
+            <a:pPr marL="0" lvl="0" indent="0" algn="l" rtl="0">
+              <a:spcBef>
+                <a:spcPts val="0"/>
+              </a:spcBef>
+              <a:spcAft>
+                <a:spcPts val="0"/>
+              </a:spcAft>
+              <a:buNone/>
+            </a:pPr>
+            <a:r>
+              <a:rPr lang="en" b="1" dirty="0" smtClean="0"/>
+              <a:t>What happens if A is double instead of int?</a:t>
+            </a:r>
+          </a:p>
+          <a:p>
+            <a:pPr marL="0" lvl="0" indent="0" algn="l" rtl="0">
+              <a:spcBef>
+                <a:spcPts val="0"/>
+              </a:spcBef>
+              <a:spcAft>
+                <a:spcPts val="0"/>
+              </a:spcAft>
+              <a:buNone/>
+            </a:pPr>
+            <a:endParaRPr lang="en" b="1" dirty="0"/>
+          </a:p>
+          <a:p>
+            <a:pPr marL="0" lvl="0" indent="0" algn="l" rtl="0">
+              <a:spcBef>
+                <a:spcPts val="0"/>
+              </a:spcBef>
+              <a:spcAft>
+                <a:spcPts val="0"/>
+              </a:spcAft>
+              <a:buNone/>
+            </a:pPr>
+            <a:r>
+              <a:rPr lang="en" b="1" dirty="0" smtClean="0"/>
+              <a:t>What happens if A and B are double instead of int?</a:t>
+            </a:r>
+          </a:p>
+          <a:p>
+            <a:pPr marL="0" lvl="0" indent="0" algn="l" rtl="0">
+              <a:spcBef>
+                <a:spcPts val="0"/>
+              </a:spcBef>
+              <a:spcAft>
+                <a:spcPts val="0"/>
+              </a:spcAft>
+              <a:buNone/>
+            </a:pPr>
+            <a:endParaRPr dirty="0"/>
+          </a:p>
+        </p:txBody>
+      </p:sp>
+    </p:spTree>
+    <p:extLst>
+      <p:ext uri="{BB962C8B-B14F-4D97-AF65-F5344CB8AC3E}">
+        <p14:creationId xmlns:p14="http://schemas.microsoft.com/office/powerpoint/2010/main" val="621376379"/>
+      </p:ext>
+    </p:extLst>
+  </p:cSld>
+  <p:clrMapOvr>
+    <a:masterClrMapping/>
+  </p:clrMapOvr>
+</p:sld>
+</file>
+
+<file path=ppt/slides/slide11.xml><?xml version="1.0" encoding="utf-8"?>
+<p:sld xmlns:a="http://schemas.openxmlformats.org/drawingml/2006/main" xmlns:r="http://schemas.openxmlformats.org/officeDocument/2006/relationships" xmlns:p="http://schemas.openxmlformats.org/presentationml/2006/main">
+  <p:cSld>
+    <p:spTree>
+      <p:nvGrpSpPr>
+        <p:cNvPr id="1" name=""/>
+        <p:cNvGrpSpPr/>
+        <p:nvPr/>
+      </p:nvGrpSpPr>
+      <p:grpSpPr>
+        <a:xfrm>
+          <a:off x="0" y="0"/>
+          <a:ext cx="0" cy="0"/>
+          <a:chOff x="0" y="0"/>
+          <a:chExt cx="0" cy="0"/>
+        </a:xfrm>
+      </p:grpSpPr>
+      <p:sp>
+        <p:nvSpPr>
+          <p:cNvPr id="4" name="Title 3">
+            <a:extLst>
+              <a:ext uri="{FF2B5EF4-FFF2-40B4-BE49-F238E27FC236}">
+                <a16:creationId xmlns:a16="http://schemas.microsoft.com/office/drawing/2014/main" id="{A14B2A54-AAD3-474A-ADC5-CDDD77AB40F5}"/>
+              </a:ext>
+            </a:extLst>
+          </p:cNvPr>
+          <p:cNvSpPr>
+            <a:spLocks noGrp="1"/>
+          </p:cNvSpPr>
+          <p:nvPr>
+            <p:ph type="title"/>
+          </p:nvPr>
+        </p:nvSpPr>
+        <p:spPr/>
+        <p:txBody>
+          <a:bodyPr/>
+          <a:lstStyle/>
+          <a:p>
+            <a:r>
+              <a:rPr lang="en-US" dirty="0" smtClean="0"/>
+              <a:t>Practice 3 - Group </a:t>
+            </a:r>
+            <a:r>
+              <a:rPr lang="en-US" dirty="0"/>
+              <a:t>Coding</a:t>
+            </a:r>
+          </a:p>
+        </p:txBody>
+      </p:sp>
+      <p:sp>
+        <p:nvSpPr>
+          <p:cNvPr id="5" name="Text Placeholder 4">
+            <a:extLst>
+              <a:ext uri="{FF2B5EF4-FFF2-40B4-BE49-F238E27FC236}">
+                <a16:creationId xmlns:a16="http://schemas.microsoft.com/office/drawing/2014/main" id="{F6CF689A-1D0A-C341-8A65-C7F19380FDC9}"/>
+              </a:ext>
+            </a:extLst>
+          </p:cNvPr>
+          <p:cNvSpPr>
+            <a:spLocks noGrp="1"/>
+          </p:cNvSpPr>
+          <p:nvPr>
+            <p:ph type="body" idx="1"/>
+          </p:nvPr>
+        </p:nvSpPr>
+        <p:spPr/>
+        <p:txBody>
+          <a:bodyPr/>
+          <a:lstStyle/>
+          <a:p>
+            <a:r>
+              <a:rPr lang="en-US" dirty="0"/>
+              <a:t>Come up with other examples (write them down, white board, </a:t>
+            </a:r>
+            <a:r>
+              <a:rPr lang="en-US" dirty="0" err="1"/>
+              <a:t>etc</a:t>
+            </a:r>
+            <a:r>
+              <a:rPr lang="en-US" dirty="0"/>
+              <a:t>)</a:t>
+            </a:r>
+          </a:p>
+          <a:p>
+            <a:r>
+              <a:rPr lang="en-US" dirty="0"/>
+              <a:t>A single person goes to the </a:t>
+            </a:r>
+            <a:r>
+              <a:rPr lang="en-US" dirty="0" err="1"/>
+              <a:t>zybooks</a:t>
+            </a:r>
+            <a:r>
+              <a:rPr lang="en-US" dirty="0"/>
+              <a:t> IDE (note, we will alternate this person throughout the semester)</a:t>
+            </a:r>
+          </a:p>
+          <a:p>
+            <a:pPr lvl="1"/>
+            <a:r>
+              <a:rPr lang="en-US" dirty="0"/>
+              <a:t>Write out examples</a:t>
+            </a:r>
+          </a:p>
+          <a:p>
+            <a:pPr lvl="1"/>
+            <a:r>
+              <a:rPr lang="en-US" dirty="0"/>
+              <a:t>Do they compile? if not, what is wrong? fix it</a:t>
+            </a:r>
+          </a:p>
+          <a:p>
+            <a:pPr lvl="1"/>
+            <a:r>
+              <a:rPr lang="en-US" dirty="0"/>
+              <a:t>Can you print out each of the variables?</a:t>
+            </a:r>
+          </a:p>
+          <a:p>
+            <a:r>
+              <a:rPr lang="en-US" dirty="0"/>
+              <a:t>Try to include a math operation that uses </a:t>
+            </a:r>
+            <a:r>
+              <a:rPr lang="en-US" dirty="0" err="1"/>
+              <a:t>ints</a:t>
+            </a:r>
+            <a:r>
+              <a:rPr lang="en-US" dirty="0"/>
+              <a:t> and doubles combined </a:t>
+            </a:r>
+          </a:p>
+          <a:p>
+            <a:pPr lvl="1"/>
+            <a:r>
+              <a:rPr lang="en-US" dirty="0"/>
+              <a:t>What happens?</a:t>
+            </a:r>
+          </a:p>
+        </p:txBody>
+      </p:sp>
+    </p:spTree>
+    <p:extLst>
+      <p:ext uri="{BB962C8B-B14F-4D97-AF65-F5344CB8AC3E}">
+        <p14:creationId xmlns:p14="http://schemas.microsoft.com/office/powerpoint/2010/main" val="409570230"/>
+      </p:ext>
+    </p:extLst>
+  </p:cSld>
+  <p:clrMapOvr>
+    <a:masterClrMapping/>
+  </p:clrMapOvr>
+  <p:transition>
+    <p:fade/>
+  </p:transition>
+</p:sld>
+</file>
+
 <file path=ppt/slides/slide2.xml><?xml version="1.0" encoding="utf-8"?>
 <p:sld xmlns:a="http://schemas.openxmlformats.org/drawingml/2006/main" xmlns:r="http://schemas.openxmlformats.org/officeDocument/2006/relationships" xmlns:p="http://schemas.openxmlformats.org/presentationml/2006/main">
   <p:cSld>
@@ -15209,6 +15947,10 @@
             </a:r>
           </a:p>
           <a:p>
+            <a:r>
+              <a:rPr lang="en-US" dirty="0"/>
+              <a:t/>
+            </a:r>
             <a:br>
               <a:rPr lang="en-US" dirty="0"/>
             </a:br>
@@ -15324,27 +16066,6 @@
           </a:p>
           <a:p>
             <a:endParaRPr lang="en-US" dirty="0"/>
-          </a:p>
-          <a:p>
-            <a:r>
-              <a:rPr lang="en-US" dirty="0"/>
-              <a:t>First Question </a:t>
-            </a:r>
-            <a:r>
-              <a:rPr lang="en-US" b="1" dirty="0"/>
-              <a:t>– what seat are you sitting in</a:t>
-            </a:r>
-            <a:r>
-              <a:rPr lang="en-US" dirty="0"/>
-              <a:t>? (numbers should be by your seat..)</a:t>
-            </a:r>
-          </a:p>
-          <a:p>
-            <a:pPr lvl="1"/>
-            <a:r>
-              <a:rPr lang="en-US" dirty="0"/>
-              <a:t>we need this for contact tracing- please be honest</a:t>
-            </a:r>
           </a:p>
         </p:txBody>
       </p:sp>
@@ -17587,7 +18308,7 @@
   <p:cSld>
     <p:spTree>
       <p:nvGrpSpPr>
-        <p:cNvPr id="1" name=""/>
+        <p:cNvPr id="1" name="Shape 209"/>
         <p:cNvGrpSpPr/>
         <p:nvPr/>
       </p:nvGrpSpPr>
@@ -17601,137 +18322,509 @@
       </p:grpSpPr>
       <p:sp>
         <p:nvSpPr>
-          <p:cNvPr id="4" name="Title 3">
-            <a:extLst>
-              <a:ext uri="{FF2B5EF4-FFF2-40B4-BE49-F238E27FC236}">
-                <a16:creationId xmlns:a16="http://schemas.microsoft.com/office/drawing/2014/main" id="{A14B2A54-AAD3-474A-ADC5-CDDD77AB40F5}"/>
-              </a:ext>
-            </a:extLst>
-          </p:cNvPr>
-          <p:cNvSpPr>
+          <p:cNvPr id="210" name="Google Shape;210;p43"/>
+          <p:cNvSpPr txBox="1">
             <a:spLocks noGrp="1"/>
           </p:cNvSpPr>
           <p:nvPr>
             <p:ph type="title"/>
           </p:nvPr>
         </p:nvSpPr>
-        <p:spPr/>
+        <p:spPr>
+          <a:xfrm>
+            <a:off x="415650" y="368781"/>
+            <a:ext cx="8312700" cy="672000"/>
+          </a:xfrm>
+          <a:prstGeom prst="rect">
+            <a:avLst/>
+          </a:prstGeom>
+        </p:spPr>
         <p:txBody>
-          <a:bodyPr/>
+          <a:bodyPr spcFirstLastPara="1" wrap="square" lIns="60500" tIns="60500" rIns="60500" bIns="60500" anchor="b" anchorCtr="0">
+            <a:noAutofit/>
+          </a:bodyPr>
           <a:lstStyle/>
           <a:p>
+            <a:pPr marL="0" lvl="0" indent="0" algn="l" rtl="0">
+              <a:spcBef>
+                <a:spcPts val="0"/>
+              </a:spcBef>
+              <a:spcAft>
+                <a:spcPts val="0"/>
+              </a:spcAft>
+              <a:buNone/>
+            </a:pPr>
             <a:r>
-              <a:rPr lang="en-US" dirty="0"/>
-              <a:t>Group Coding</a:t>
+              <a:rPr lang="en" dirty="0" smtClean="0"/>
+              <a:t>Practice 1 – Group Reflection</a:t>
             </a:r>
+            <a:endParaRPr dirty="0"/>
           </a:p>
         </p:txBody>
       </p:sp>
       <p:sp>
         <p:nvSpPr>
-          <p:cNvPr id="5" name="Text Placeholder 4">
-            <a:extLst>
-              <a:ext uri="{FF2B5EF4-FFF2-40B4-BE49-F238E27FC236}">
-                <a16:creationId xmlns:a16="http://schemas.microsoft.com/office/drawing/2014/main" id="{F6CF689A-1D0A-C341-8A65-C7F19380FDC9}"/>
-              </a:ext>
-            </a:extLst>
-          </p:cNvPr>
-          <p:cNvSpPr>
+          <p:cNvPr id="211" name="Google Shape;211;p43"/>
+          <p:cNvSpPr txBox="1">
             <a:spLocks noGrp="1"/>
           </p:cNvSpPr>
           <p:nvPr>
             <p:ph type="body" idx="1"/>
           </p:nvPr>
         </p:nvSpPr>
-        <p:spPr/>
+        <p:spPr>
+          <a:xfrm>
+            <a:off x="415650" y="1017390"/>
+            <a:ext cx="8312700" cy="4003927"/>
+          </a:xfrm>
+          <a:prstGeom prst="rect">
+            <a:avLst/>
+          </a:prstGeom>
+        </p:spPr>
         <p:txBody>
-          <a:bodyPr/>
+          <a:bodyPr spcFirstLastPara="1" wrap="square" lIns="60500" tIns="60500" rIns="60500" bIns="60500" anchor="t" anchorCtr="0">
+            <a:noAutofit/>
+          </a:bodyPr>
           <a:lstStyle/>
           <a:p>
+            <a:pPr marL="152400" indent="0">
+              <a:buNone/>
+            </a:pPr>
             <a:r>
-              <a:rPr lang="en-US" dirty="0"/>
-              <a:t>Come up with other examples (write them down, white board, </a:t>
+              <a:rPr lang="en-US" dirty="0" err="1">
+                <a:solidFill>
+                  <a:srgbClr val="000000"/>
+                </a:solidFill>
+                <a:latin typeface="Consolas"/>
+                <a:ea typeface="Consolas"/>
+                <a:cs typeface="Consolas"/>
+              </a:rPr>
+              <a:t>int</a:t>
             </a:r>
             <a:r>
-              <a:rPr lang="en-US" dirty="0" err="1"/>
-              <a:t>etc</a:t>
+              <a:rPr lang="en-US" dirty="0">
+                <a:solidFill>
+                  <a:srgbClr val="000000"/>
+                </a:solidFill>
+                <a:latin typeface="Consolas"/>
+                <a:ea typeface="Consolas"/>
+                <a:cs typeface="Consolas"/>
+              </a:rPr>
+              <a:t> A = 5;</a:t>
+            </a:r>
+          </a:p>
+          <a:p>
+            <a:pPr marL="152400" indent="0">
+              <a:buNone/>
+            </a:pPr>
+            <a:r>
+              <a:rPr lang="en-US" dirty="0" err="1">
+                <a:solidFill>
+                  <a:srgbClr val="000000"/>
+                </a:solidFill>
+                <a:latin typeface="Consolas"/>
+                <a:ea typeface="Consolas"/>
+                <a:cs typeface="Consolas"/>
+              </a:rPr>
+              <a:t>int</a:t>
+            </a:r>
+            <a:r>
+              <a:rPr lang="en-US" dirty="0">
+                <a:solidFill>
+                  <a:srgbClr val="000000"/>
+                </a:solidFill>
+                <a:latin typeface="Consolas"/>
+                <a:ea typeface="Consolas"/>
+                <a:cs typeface="Consolas"/>
+              </a:rPr>
+              <a:t> B = 2;</a:t>
+            </a:r>
+          </a:p>
+          <a:p>
+            <a:pPr marL="152400" indent="0">
+              <a:buNone/>
+            </a:pPr>
+            <a:r>
+              <a:rPr lang="en-US" dirty="0" err="1">
+                <a:solidFill>
+                  <a:srgbClr val="000000"/>
+                </a:solidFill>
+                <a:latin typeface="Consolas"/>
+                <a:ea typeface="Consolas"/>
+                <a:cs typeface="Consolas"/>
+              </a:rPr>
+              <a:t>int</a:t>
+            </a:r>
+            <a:r>
+              <a:rPr lang="en-US" dirty="0">
+                <a:solidFill>
+                  <a:srgbClr val="000000"/>
+                </a:solidFill>
+                <a:latin typeface="Consolas"/>
+                <a:ea typeface="Consolas"/>
+                <a:cs typeface="Consolas"/>
+              </a:rPr>
+              <a:t> C = 10;</a:t>
+            </a:r>
+          </a:p>
+          <a:p>
+            <a:pPr marL="152400" indent="0">
+              <a:buNone/>
+            </a:pPr>
+            <a:r>
+              <a:rPr lang="en-US" dirty="0">
+                <a:solidFill>
+                  <a:srgbClr val="000000"/>
+                </a:solidFill>
+                <a:latin typeface="Consolas"/>
+                <a:ea typeface="Consolas"/>
+                <a:cs typeface="Consolas"/>
+              </a:rPr>
+              <a:t>A = B;</a:t>
+            </a:r>
+          </a:p>
+          <a:p>
+            <a:pPr marL="152400" indent="0">
+              <a:buNone/>
+            </a:pPr>
+            <a:r>
+              <a:rPr lang="en-US" dirty="0">
+                <a:solidFill>
+                  <a:srgbClr val="000000"/>
+                </a:solidFill>
+                <a:latin typeface="Consolas"/>
+                <a:ea typeface="Consolas"/>
+                <a:cs typeface="Consolas"/>
+              </a:rPr>
+              <a:t>B = C</a:t>
+            </a:r>
+            <a:r>
+              <a:rPr lang="en-US" dirty="0" smtClean="0">
+                <a:solidFill>
+                  <a:srgbClr val="000000"/>
+                </a:solidFill>
+                <a:latin typeface="Consolas"/>
+                <a:ea typeface="Consolas"/>
+                <a:cs typeface="Consolas"/>
+              </a:rPr>
+              <a:t>;</a:t>
+            </a:r>
+          </a:p>
+          <a:p>
+            <a:pPr marL="152400" indent="0">
+              <a:buNone/>
+            </a:pPr>
+            <a:r>
+              <a:rPr lang="en-US" dirty="0" smtClean="0">
+                <a:solidFill>
+                  <a:srgbClr val="000000"/>
+                </a:solidFill>
+                <a:latin typeface="Consolas"/>
+                <a:ea typeface="Consolas"/>
+                <a:cs typeface="Consolas"/>
+              </a:rPr>
+              <a:t>----------------------------------------------------------------------------------------------</a:t>
+            </a:r>
+          </a:p>
+          <a:p>
+            <a:pPr marL="152400" indent="0">
+              <a:buNone/>
+            </a:pPr>
+            <a:r>
+              <a:rPr lang="en-US" dirty="0" err="1" smtClean="0">
+                <a:solidFill>
+                  <a:srgbClr val="000000"/>
+                </a:solidFill>
+                <a:latin typeface="Consolas"/>
+                <a:ea typeface="Consolas"/>
+                <a:cs typeface="Consolas"/>
+              </a:rPr>
+              <a:t>int</a:t>
+            </a:r>
+            <a:r>
+              <a:rPr lang="en-US" dirty="0" smtClean="0">
+                <a:solidFill>
+                  <a:srgbClr val="000000"/>
+                </a:solidFill>
+                <a:latin typeface="Consolas"/>
+                <a:ea typeface="Consolas"/>
+                <a:cs typeface="Consolas"/>
+              </a:rPr>
+              <a:t> </a:t>
+            </a:r>
+            <a:r>
+              <a:rPr lang="en-US" dirty="0">
+                <a:solidFill>
+                  <a:srgbClr val="000000"/>
+                </a:solidFill>
+                <a:latin typeface="Consolas"/>
+                <a:ea typeface="Consolas"/>
+                <a:cs typeface="Consolas"/>
+              </a:rPr>
+              <a:t>A = 10;</a:t>
+            </a:r>
+          </a:p>
+          <a:p>
+            <a:pPr marL="152400" indent="0">
+              <a:buNone/>
+            </a:pPr>
+            <a:r>
+              <a:rPr lang="en-US" dirty="0" err="1">
+                <a:solidFill>
+                  <a:srgbClr val="000000"/>
+                </a:solidFill>
+                <a:latin typeface="Consolas"/>
+                <a:ea typeface="Consolas"/>
+                <a:cs typeface="Consolas"/>
+              </a:rPr>
+              <a:t>int</a:t>
+            </a:r>
+            <a:r>
+              <a:rPr lang="en-US" dirty="0">
+                <a:solidFill>
+                  <a:srgbClr val="000000"/>
+                </a:solidFill>
+                <a:latin typeface="Consolas"/>
+                <a:ea typeface="Consolas"/>
+                <a:cs typeface="Consolas"/>
+              </a:rPr>
+              <a:t> B = 20;</a:t>
+            </a:r>
+          </a:p>
+          <a:p>
+            <a:pPr marL="152400" indent="0">
+              <a:buNone/>
+            </a:pPr>
+            <a:r>
+              <a:rPr lang="en-US" dirty="0">
+                <a:solidFill>
+                  <a:srgbClr val="000000"/>
+                </a:solidFill>
+                <a:latin typeface="Consolas"/>
+                <a:ea typeface="Consolas"/>
+                <a:cs typeface="Consolas"/>
+              </a:rPr>
+              <a:t>A = B;</a:t>
+            </a:r>
+          </a:p>
+          <a:p>
+            <a:pPr marL="152400" indent="0">
+              <a:buNone/>
+            </a:pPr>
+            <a:r>
+              <a:rPr lang="en-US" dirty="0">
+                <a:solidFill>
+                  <a:srgbClr val="000000"/>
+                </a:solidFill>
+                <a:latin typeface="Consolas"/>
+                <a:ea typeface="Consolas"/>
+                <a:cs typeface="Consolas"/>
+              </a:rPr>
+              <a:t>B = A;</a:t>
+            </a:r>
+          </a:p>
+          <a:p>
+            <a:pPr marL="152400" indent="0">
+              <a:buNone/>
+            </a:pPr>
+            <a:r>
+              <a:rPr lang="en-US" dirty="0">
+                <a:solidFill>
+                  <a:srgbClr val="000000"/>
+                </a:solidFill>
+                <a:latin typeface="Consolas"/>
+                <a:ea typeface="Consolas"/>
+                <a:cs typeface="Consolas"/>
+              </a:rPr>
+              <a:t>----------------------------------------------------------------------------------------------</a:t>
+            </a:r>
+          </a:p>
+          <a:p>
+            <a:pPr marL="152400" indent="0">
+              <a:buNone/>
+            </a:pPr>
+            <a:r>
+              <a:rPr lang="en-US" dirty="0" smtClean="0"/>
+              <a:t>????</a:t>
             </a:r>
             <a:r>
               <a:rPr lang="en-US" dirty="0"/>
-              <a:t>)</a:t>
+              <a:t/>
             </a:r>
+            <a:br>
+              <a:rPr lang="en-US" dirty="0"/>
+            </a:br>
+            <a:endParaRPr lang="en-US" dirty="0">
+              <a:solidFill>
+                <a:srgbClr val="000000"/>
+              </a:solidFill>
+              <a:latin typeface="Consolas"/>
+              <a:ea typeface="Consolas"/>
+              <a:cs typeface="Consolas"/>
+            </a:endParaRPr>
           </a:p>
+        </p:txBody>
+      </p:sp>
+      <p:sp>
+        <p:nvSpPr>
+          <p:cNvPr id="212" name="Google Shape;212;p43"/>
+          <p:cNvSpPr/>
+          <p:nvPr/>
+        </p:nvSpPr>
+        <p:spPr>
+          <a:xfrm>
+            <a:off x="2807809" y="1915034"/>
+            <a:ext cx="5989200" cy="520004"/>
+          </a:xfrm>
+          <a:prstGeom prst="rect">
+            <a:avLst/>
+          </a:prstGeom>
+          <a:solidFill>
+            <a:schemeClr val="lt2"/>
+          </a:solidFill>
+          <a:ln w="9525" cap="flat" cmpd="sng">
+            <a:solidFill>
+              <a:schemeClr val="dk2"/>
+            </a:solidFill>
+            <a:prstDash val="solid"/>
+            <a:round/>
+            <a:headEnd type="none" w="sm" len="sm"/>
+            <a:tailEnd type="none" w="sm" len="sm"/>
+          </a:ln>
+        </p:spPr>
+        <p:txBody>
+          <a:bodyPr spcFirstLastPara="1" wrap="square" lIns="91425" tIns="91425" rIns="91425" bIns="91425" anchor="ctr" anchorCtr="0">
+            <a:noAutofit/>
+          </a:bodyPr>
+          <a:lstStyle/>
           <a:p>
+            <a:pPr marL="0" lvl="0" indent="0" algn="l" rtl="0">
+              <a:spcBef>
+                <a:spcPts val="0"/>
+              </a:spcBef>
+              <a:spcAft>
+                <a:spcPts val="0"/>
+              </a:spcAft>
+              <a:buNone/>
+            </a:pPr>
             <a:r>
-              <a:rPr lang="en-US" dirty="0"/>
-              <a:t>A single person goes to the </a:t>
+              <a:rPr lang="en" b="1" dirty="0" smtClean="0"/>
+              <a:t>What are the final values for A, B, and C?</a:t>
             </a:r>
+            <a:endParaRPr dirty="0"/>
+          </a:p>
+        </p:txBody>
+      </p:sp>
+      <p:sp>
+        <p:nvSpPr>
+          <p:cNvPr id="5" name="Google Shape;212;p43"/>
+          <p:cNvSpPr/>
+          <p:nvPr/>
+        </p:nvSpPr>
+        <p:spPr>
+          <a:xfrm>
+            <a:off x="2807809" y="3309292"/>
+            <a:ext cx="5989200" cy="520004"/>
+          </a:xfrm>
+          <a:prstGeom prst="rect">
+            <a:avLst/>
+          </a:prstGeom>
+          <a:solidFill>
+            <a:schemeClr val="lt2"/>
+          </a:solidFill>
+          <a:ln w="9525" cap="flat" cmpd="sng">
+            <a:solidFill>
+              <a:schemeClr val="dk2"/>
+            </a:solidFill>
+            <a:prstDash val="solid"/>
+            <a:round/>
+            <a:headEnd type="none" w="sm" len="sm"/>
+            <a:tailEnd type="none" w="sm" len="sm"/>
+          </a:ln>
+        </p:spPr>
+        <p:txBody>
+          <a:bodyPr spcFirstLastPara="1" wrap="square" lIns="91425" tIns="91425" rIns="91425" bIns="91425" anchor="ctr" anchorCtr="0">
+            <a:noAutofit/>
+          </a:bodyPr>
+          <a:lstStyle/>
+          <a:p>
+            <a:pPr marL="0" lvl="0" indent="0" algn="l" rtl="0">
+              <a:spcBef>
+                <a:spcPts val="0"/>
+              </a:spcBef>
+              <a:spcAft>
+                <a:spcPts val="0"/>
+              </a:spcAft>
+              <a:buNone/>
+            </a:pPr>
             <a:r>
-              <a:rPr lang="en-US" dirty="0" err="1"/>
-              <a:t>zybooks</a:t>
+              <a:rPr lang="en" b="1" dirty="0" smtClean="0"/>
+              <a:t>What are the final values for A and B?</a:t>
             </a:r>
+            <a:endParaRPr dirty="0"/>
+          </a:p>
+        </p:txBody>
+      </p:sp>
+      <p:sp>
+        <p:nvSpPr>
+          <p:cNvPr id="6" name="Google Shape;212;p43"/>
+          <p:cNvSpPr/>
+          <p:nvPr/>
+        </p:nvSpPr>
+        <p:spPr>
+          <a:xfrm>
+            <a:off x="2807809" y="4217903"/>
+            <a:ext cx="5989200" cy="520004"/>
+          </a:xfrm>
+          <a:prstGeom prst="rect">
+            <a:avLst/>
+          </a:prstGeom>
+          <a:solidFill>
+            <a:schemeClr val="lt2"/>
+          </a:solidFill>
+          <a:ln w="9525" cap="flat" cmpd="sng">
+            <a:solidFill>
+              <a:schemeClr val="dk2"/>
+            </a:solidFill>
+            <a:prstDash val="solid"/>
+            <a:round/>
+            <a:headEnd type="none" w="sm" len="sm"/>
+            <a:tailEnd type="none" w="sm" len="sm"/>
+          </a:ln>
+        </p:spPr>
+        <p:txBody>
+          <a:bodyPr spcFirstLastPara="1" wrap="square" lIns="91425" tIns="91425" rIns="91425" bIns="91425" anchor="ctr" anchorCtr="0">
+            <a:noAutofit/>
+          </a:bodyPr>
+          <a:lstStyle/>
+          <a:p>
+            <a:pPr marL="0" lvl="0" indent="0" algn="l" rtl="0">
+              <a:spcBef>
+                <a:spcPts val="0"/>
+              </a:spcBef>
+              <a:spcAft>
+                <a:spcPts val="0"/>
+              </a:spcAft>
+              <a:buNone/>
+            </a:pPr>
             <a:r>
-              <a:rPr lang="en-US" dirty="0"/>
-              <a:t> IDE (note, we will alternate this person throughout the semester)</a:t>
+              <a:rPr lang="en" b="1" dirty="0" smtClean="0"/>
+              <a:t>What sequence of assignments do we need to change the values of A and B?</a:t>
             </a:r>
-          </a:p>
-          <a:p>
-            <a:pPr lvl="1"/>
-            <a:r>
-              <a:rPr lang="en-US" dirty="0"/>
-              <a:t>Write out examples</a:t>
-            </a:r>
-          </a:p>
-          <a:p>
-            <a:pPr lvl="1"/>
-            <a:r>
-              <a:rPr lang="en-US" dirty="0"/>
-              <a:t>Do they compile? if not, what is wrong? fix it</a:t>
-            </a:r>
-          </a:p>
-          <a:p>
-            <a:pPr lvl="1"/>
-            <a:r>
-              <a:rPr lang="en-US" dirty="0"/>
-              <a:t>Can you print out each of the variables?</a:t>
-            </a:r>
-          </a:p>
-          <a:p>
-            <a:r>
-              <a:rPr lang="en-US" dirty="0"/>
-              <a:t>Try to include a math operation that uses </a:t>
-            </a:r>
-            <a:r>
-              <a:rPr lang="en-US" dirty="0" err="1"/>
-              <a:t>ints</a:t>
-            </a:r>
-            <a:r>
-              <a:rPr lang="en-US" dirty="0"/>
-              <a:t> and doubles combined </a:t>
-            </a:r>
-          </a:p>
-          <a:p>
-            <a:pPr lvl="1"/>
-            <a:r>
-              <a:rPr lang="en-US" dirty="0"/>
-              <a:t>What happens?</a:t>
-            </a:r>
+            <a:endParaRPr dirty="0"/>
           </a:p>
         </p:txBody>
       </p:sp>
     </p:spTree>
     <p:extLst>
       <p:ext uri="{BB962C8B-B14F-4D97-AF65-F5344CB8AC3E}">
-        <p14:creationId xmlns:p14="http://schemas.microsoft.com/office/powerpoint/2010/main" val="409570230"/>
+        <p14:creationId xmlns:p14="http://schemas.microsoft.com/office/powerpoint/2010/main" val="4288849530"/>
       </p:ext>
     </p:extLst>
   </p:cSld>
   <p:clrMapOvr>
     <a:masterClrMapping/>
   </p:clrMapOvr>
-  <p:transition>
-    <p:fade/>
-  </p:transition>
 </p:sld>
 </file>
 
@@ -18295,4 +19388,286 @@
   <a:objectDefaults/>
   <a:extraClrSchemeLst/>
 </a:theme>
+</file>
+
+<file path=customXml/item1.xml><?xml version="1.0" encoding="utf-8"?>
+<ct:contentTypeSchema xmlns:ct="http://schemas.microsoft.com/office/2006/metadata/contentType" xmlns:ma="http://schemas.microsoft.com/office/2006/metadata/properties/metaAttributes" ct:_="" ma:_="" ma:contentTypeName="Document" ma:contentTypeID="0x010100074387D78AC76C4289401EF66FB51FCC" ma:contentTypeVersion="13" ma:contentTypeDescription="Create a new document." ma:contentTypeScope="" ma:versionID="6d00cb191415ef07de8591021eed77b7">
+  <xsd:schema xmlns:xsd="http://www.w3.org/2001/XMLSchema" xmlns:xs="http://www.w3.org/2001/XMLSchema" xmlns:p="http://schemas.microsoft.com/office/2006/metadata/properties" xmlns:ns3="92c41bee-f0ee-4aa6-9399-a35fbb883510" xmlns:ns4="e06ed288-fd75-4b50-bbed-f5a5df88c31c" targetNamespace="http://schemas.microsoft.com/office/2006/metadata/properties" ma:root="true" ma:fieldsID="dd3c912a0e2ebbe56c1b62c06dfbba16" ns3:_="" ns4:_="">
+    <xsd:import namespace="92c41bee-f0ee-4aa6-9399-a35fbb883510"/>
+    <xsd:import namespace="e06ed288-fd75-4b50-bbed-f5a5df88c31c"/>
+    <xsd:element name="properties">
+      <xsd:complexType>
+        <xsd:sequence>
+          <xsd:element name="documentManagement">
+            <xsd:complexType>
+              <xsd:all>
+                <xsd:element ref="ns3:MediaServiceMetadata" minOccurs="0"/>
+                <xsd:element ref="ns3:MediaServiceFastMetadata" minOccurs="0"/>
+                <xsd:element ref="ns4:SharedWithUsers" minOccurs="0"/>
+                <xsd:element ref="ns4:SharedWithDetails" minOccurs="0"/>
+                <xsd:element ref="ns4:SharingHintHash" minOccurs="0"/>
+                <xsd:element ref="ns3:MediaServiceAutoKeyPoints" minOccurs="0"/>
+                <xsd:element ref="ns3:MediaServiceKeyPoints" minOccurs="0"/>
+                <xsd:element ref="ns3:MediaServiceAutoTags" minOccurs="0"/>
+                <xsd:element ref="ns3:MediaServiceOCR" minOccurs="0"/>
+                <xsd:element ref="ns3:MediaServiceGenerationTime" minOccurs="0"/>
+                <xsd:element ref="ns3:MediaServiceEventHashCode" minOccurs="0"/>
+                <xsd:element ref="ns3:MediaServiceDateTaken" minOccurs="0"/>
+                <xsd:element ref="ns3:MediaLengthInSeconds" minOccurs="0"/>
+              </xsd:all>
+            </xsd:complexType>
+          </xsd:element>
+        </xsd:sequence>
+      </xsd:complexType>
+    </xsd:element>
+  </xsd:schema>
+  <xsd:schema xmlns:xsd="http://www.w3.org/2001/XMLSchema" xmlns:xs="http://www.w3.org/2001/XMLSchema" xmlns:dms="http://schemas.microsoft.com/office/2006/documentManagement/types" xmlns:pc="http://schemas.microsoft.com/office/infopath/2007/PartnerControls" targetNamespace="92c41bee-f0ee-4aa6-9399-a35fbb883510" elementFormDefault="qualified">
+    <xsd:import namespace="http://schemas.microsoft.com/office/2006/documentManagement/types"/>
+    <xsd:import namespace="http://schemas.microsoft.com/office/infopath/2007/PartnerControls"/>
+    <xsd:element name="MediaServiceMetadata" ma:index="8" nillable="true" ma:displayName="MediaServiceMetadata" ma:hidden="true" ma:internalName="MediaServiceMetadata" ma:readOnly="true">
+      <xsd:simpleType>
+        <xsd:restriction base="dms:Note"/>
+      </xsd:simpleType>
+    </xsd:element>
+    <xsd:element name="MediaServiceFastMetadata" ma:index="9" nillable="true" ma:displayName="MediaServiceFastMetadata" ma:hidden="true" ma:internalName="MediaServiceFastMetadata" ma:readOnly="true">
+      <xsd:simpleType>
+        <xsd:restriction base="dms:Note"/>
+      </xsd:simpleType>
+    </xsd:element>
+    <xsd:element name="MediaServiceAutoKeyPoints" ma:index="13" nillable="true" ma:displayName="MediaServiceAutoKeyPoints" ma:hidden="true" ma:internalName="MediaServiceAutoKeyPoints" ma:readOnly="true">
+      <xsd:simpleType>
+        <xsd:restriction base="dms:Note"/>
+      </xsd:simpleType>
+    </xsd:element>
+    <xsd:element name="MediaServiceKeyPoints" ma:index="14" nillable="true" ma:displayName="KeyPoints" ma:internalName="MediaServiceKeyPoints" ma:readOnly="true">
+      <xsd:simpleType>
+        <xsd:restriction base="dms:Note">
+          <xsd:maxLength value="255"/>
+        </xsd:restriction>
+      </xsd:simpleType>
+    </xsd:element>
+    <xsd:element name="MediaServiceAutoTags" ma:index="15" nillable="true" ma:displayName="Tags" ma:internalName="MediaServiceAutoTags" ma:readOnly="true">
+      <xsd:simpleType>
+        <xsd:restriction base="dms:Text"/>
+      </xsd:simpleType>
+    </xsd:element>
+    <xsd:element name="MediaServiceOCR" ma:index="16" nillable="true" ma:displayName="Extracted Text" ma:internalName="MediaServiceOCR" ma:readOnly="true">
+      <xsd:simpleType>
+        <xsd:restriction base="dms:Note">
+          <xsd:maxLength value="255"/>
+        </xsd:restriction>
+      </xsd:simpleType>
+    </xsd:element>
+    <xsd:element name="MediaServiceGenerationTime" ma:index="17" nillable="true" ma:displayName="MediaServiceGenerationTime" ma:hidden="true" ma:internalName="MediaServiceGenerationTime" ma:readOnly="true">
+      <xsd:simpleType>
+        <xsd:restriction base="dms:Text"/>
+      </xsd:simpleType>
+    </xsd:element>
+    <xsd:element name="MediaServiceEventHashCode" ma:index="18" nillable="true" ma:displayName="MediaServiceEventHashCode" ma:hidden="true" ma:internalName="MediaServiceEventHashCode" ma:readOnly="true">
+      <xsd:simpleType>
+        <xsd:restriction base="dms:Text"/>
+      </xsd:simpleType>
+    </xsd:element>
+    <xsd:element name="MediaServiceDateTaken" ma:index="19" nillable="true" ma:displayName="MediaServiceDateTaken" ma:hidden="true" ma:internalName="MediaServiceDateTaken" ma:readOnly="true">
+      <xsd:simpleType>
+        <xsd:restriction base="dms:Text"/>
+      </xsd:simpleType>
+    </xsd:element>
+    <xsd:element name="MediaLengthInSeconds" ma:index="20" nillable="true" ma:displayName="Length (seconds)" ma:internalName="MediaLengthInSeconds" ma:readOnly="true">
+      <xsd:simpleType>
+        <xsd:restriction base="dms:Unknown"/>
+      </xsd:simpleType>
+    </xsd:element>
+  </xsd:schema>
+  <xsd:schema xmlns:xsd="http://www.w3.org/2001/XMLSchema" xmlns:xs="http://www.w3.org/2001/XMLSchema" xmlns:dms="http://schemas.microsoft.com/office/2006/documentManagement/types" xmlns:pc="http://schemas.microsoft.com/office/infopath/2007/PartnerControls" targetNamespace="e06ed288-fd75-4b50-bbed-f5a5df88c31c" elementFormDefault="qualified">
+    <xsd:import namespace="http://schemas.microsoft.com/office/2006/documentManagement/types"/>
+    <xsd:import namespace="http://schemas.microsoft.com/office/infopath/2007/PartnerControls"/>
+    <xsd:element name="SharedWithUsers" ma:index="10" nillable="true" ma:displayName="Shared With" ma:internalName="SharedWithUsers" ma:readOnly="true">
+      <xsd:complexType>
+        <xsd:complexContent>
+          <xsd:extension base="dms:UserMulti">
+            <xsd:sequence>
+              <xsd:element name="UserInfo" minOccurs="0" maxOccurs="unbounded">
+                <xsd:complexType>
+                  <xsd:sequence>
+                    <xsd:element name="DisplayName" type="xsd:string" minOccurs="0"/>
+                    <xsd:element name="AccountId" type="dms:UserId" minOccurs="0" nillable="true"/>
+                    <xsd:element name="AccountType" type="xsd:string" minOccurs="0"/>
+                  </xsd:sequence>
+                </xsd:complexType>
+              </xsd:element>
+            </xsd:sequence>
+          </xsd:extension>
+        </xsd:complexContent>
+      </xsd:complexType>
+    </xsd:element>
+    <xsd:element name="SharedWithDetails" ma:index="11" nillable="true" ma:displayName="Shared With Details" ma:internalName="SharedWithDetails" ma:readOnly="true">
+      <xsd:simpleType>
+        <xsd:restriction base="dms:Note">
+          <xsd:maxLength value="255"/>
+        </xsd:restriction>
+      </xsd:simpleType>
+    </xsd:element>
+    <xsd:element name="SharingHintHash" ma:index="12" nillable="true" ma:displayName="Sharing Hint Hash" ma:hidden="true" ma:internalName="SharingHintHash" ma:readOnly="true">
+      <xsd:simpleType>
+        <xsd:restriction base="dms:Text"/>
+      </xsd:simpleType>
+    </xsd:element>
+  </xsd:schema>
+  <xsd:schema xmlns="http://schemas.openxmlformats.org/package/2006/metadata/core-properties" xmlns:xsd="http://www.w3.org/2001/XMLSchema" xmlns:xsi="http://www.w3.org/2001/XMLSchema-instance" xmlns:dc="http://purl.org/dc/elements/1.1/" xmlns:dcterms="http://purl.org/dc/terms/" xmlns:odoc="http://schemas.microsoft.com/internal/obd" targetNamespace="http://schemas.openxmlformats.org/package/2006/metadata/core-properties" elementFormDefault="qualified" attributeFormDefault="unqualified" blockDefault="#all">
+    <xsd:import namespace="http://purl.org/dc/elements/1.1/" schemaLocation="http://dublincore.org/schemas/xmls/qdc/2003/04/02/dc.xsd"/>
+    <xsd:import namespace="http://purl.org/dc/terms/" schemaLocation="http://dublincore.org/schemas/xmls/qdc/2003/04/02/dcterms.xsd"/>
+    <xsd:element name="coreProperties" type="CT_coreProperties"/>
+    <xsd:complexType name="CT_coreProperties">
+      <xsd:all>
+        <xsd:element ref="dc:creator" minOccurs="0" maxOccurs="1"/>
+        <xsd:element ref="dcterms:created" minOccurs="0" maxOccurs="1"/>
+        <xsd:element ref="dc:identifier" minOccurs="0" maxOccurs="1"/>
+        <xsd:element name="contentType" minOccurs="0" maxOccurs="1" type="xsd:string" ma:index="0" ma:displayName="Content Type"/>
+        <xsd:element ref="dc:title" minOccurs="0" maxOccurs="1" ma:index="4" ma:displayName="Title"/>
+        <xsd:element ref="dc:subject" minOccurs="0" maxOccurs="1"/>
+        <xsd:element ref="dc:description" minOccurs="0" maxOccurs="1"/>
+        <xsd:element name="keywords" minOccurs="0" maxOccurs="1" type="xsd:string"/>
+        <xsd:element ref="dc:language" minOccurs="0" maxOccurs="1"/>
+        <xsd:element name="category" minOccurs="0" maxOccurs="1" type="xsd:string"/>
+        <xsd:element name="version" minOccurs="0" maxOccurs="1" type="xsd:string"/>
+        <xsd:element name="revision" minOccurs="0" maxOccurs="1" type="xsd:string">
+          <xsd:annotation>
+            <xsd:documentation>
+                        This value indicates the number of saves or revisions. The application is responsible for updating this value after each revision.
+                    </xsd:documentation>
+          </xsd:annotation>
+        </xsd:element>
+        <xsd:element name="lastModifiedBy" minOccurs="0" maxOccurs="1" type="xsd:string"/>
+        <xsd:element ref="dcterms:modified" minOccurs="0" maxOccurs="1"/>
+        <xsd:element name="contentStatus" minOccurs="0" maxOccurs="1" type="xsd:string"/>
+      </xsd:all>
+    </xsd:complexType>
+  </xsd:schema>
+  <xs:schema xmlns:pc="http://schemas.microsoft.com/office/infopath/2007/PartnerControls" xmlns:xs="http://www.w3.org/2001/XMLSchema" targetNamespace="http://schemas.microsoft.com/office/infopath/2007/PartnerControls" elementFormDefault="qualified" attributeFormDefault="unqualified">
+    <xs:element name="Person">
+      <xs:complexType>
+        <xs:sequence>
+          <xs:element ref="pc:DisplayName" minOccurs="0"/>
+          <xs:element ref="pc:AccountId" minOccurs="0"/>
+          <xs:element ref="pc:AccountType" minOccurs="0"/>
+        </xs:sequence>
+      </xs:complexType>
+    </xs:element>
+    <xs:element name="DisplayName" type="xs:string"/>
+    <xs:element name="AccountId" type="xs:string"/>
+    <xs:element name="AccountType" type="xs:string"/>
+    <xs:element name="BDCAssociatedEntity">
+      <xs:complexType>
+        <xs:sequence>
+          <xs:element ref="pc:BDCEntity" minOccurs="0" maxOccurs="unbounded"/>
+        </xs:sequence>
+        <xs:attribute ref="pc:EntityNamespace"/>
+        <xs:attribute ref="pc:EntityName"/>
+        <xs:attribute ref="pc:SystemInstanceName"/>
+        <xs:attribute ref="pc:AssociationName"/>
+      </xs:complexType>
+    </xs:element>
+    <xs:attribute name="EntityNamespace" type="xs:string"/>
+    <xs:attribute name="EntityName" type="xs:string"/>
+    <xs:attribute name="SystemInstanceName" type="xs:string"/>
+    <xs:attribute name="AssociationName" type="xs:string"/>
+    <xs:element name="BDCEntity">
+      <xs:complexType>
+        <xs:sequence>
+          <xs:element ref="pc:EntityDisplayName" minOccurs="0"/>
+          <xs:element ref="pc:EntityInstanceReference" minOccurs="0"/>
+          <xs:element ref="pc:EntityId1" minOccurs="0"/>
+          <xs:element ref="pc:EntityId2" minOccurs="0"/>
+          <xs:element ref="pc:EntityId3" minOccurs="0"/>
+          <xs:element ref="pc:EntityId4" minOccurs="0"/>
+          <xs:element ref="pc:EntityId5" minOccurs="0"/>
+        </xs:sequence>
+      </xs:complexType>
+    </xs:element>
+    <xs:element name="EntityDisplayName" type="xs:string"/>
+    <xs:element name="EntityInstanceReference" type="xs:string"/>
+    <xs:element name="EntityId1" type="xs:string"/>
+    <xs:element name="EntityId2" type="xs:string"/>
+    <xs:element name="EntityId3" type="xs:string"/>
+    <xs:element name="EntityId4" type="xs:string"/>
+    <xs:element name="EntityId5" type="xs:string"/>
+    <xs:element name="Terms">
+      <xs:complexType>
+        <xs:sequence>
+          <xs:element ref="pc:TermInfo" minOccurs="0" maxOccurs="unbounded"/>
+        </xs:sequence>
+      </xs:complexType>
+    </xs:element>
+    <xs:element name="TermInfo">
+      <xs:complexType>
+        <xs:sequence>
+          <xs:element ref="pc:TermName" minOccurs="0"/>
+          <xs:element ref="pc:TermId" minOccurs="0"/>
+        </xs:sequence>
+      </xs:complexType>
+    </xs:element>
+    <xs:element name="TermName" type="xs:string"/>
+    <xs:element name="TermId" type="xs:string"/>
+  </xs:schema>
+</ct:contentTypeSchema>
+</file>
+
+<file path=customXml/item2.xml><?xml version="1.0" encoding="utf-8"?>
+<?mso-contentType ?>
+<FormTemplates xmlns="http://schemas.microsoft.com/sharepoint/v3/contenttype/forms">
+  <Display>DocumentLibraryForm</Display>
+  <Edit>DocumentLibraryForm</Edit>
+  <New>DocumentLibraryForm</New>
+</FormTemplates>
+</file>
+
+<file path=customXml/item3.xml><?xml version="1.0" encoding="utf-8"?>
+<p:properties xmlns:p="http://schemas.microsoft.com/office/2006/metadata/properties" xmlns:xsi="http://www.w3.org/2001/XMLSchema-instance" xmlns:pc="http://schemas.microsoft.com/office/infopath/2007/PartnerControls">
+  <documentManagement/>
+</p:properties>
+</file>
+
+<file path=customXml/itemProps1.xml><?xml version="1.0" encoding="utf-8"?>
+<ds:datastoreItem xmlns:ds="http://schemas.openxmlformats.org/officeDocument/2006/customXml" ds:itemID="{92A5BA81-21EF-4D25-A1C1-3693A7025EF6}">
+  <ds:schemaRefs>
+    <ds:schemaRef ds:uri="http://schemas.microsoft.com/office/2006/metadata/contentType"/>
+    <ds:schemaRef ds:uri="http://schemas.microsoft.com/office/2006/metadata/properties/metaAttributes"/>
+    <ds:schemaRef ds:uri="http://www.w3.org/2001/XMLSchema"/>
+    <ds:schemaRef ds:uri="http://schemas.microsoft.com/office/2006/metadata/properties"/>
+    <ds:schemaRef ds:uri="92c41bee-f0ee-4aa6-9399-a35fbb883510"/>
+    <ds:schemaRef ds:uri="e06ed288-fd75-4b50-bbed-f5a5df88c31c"/>
+    <ds:schemaRef ds:uri="http://schemas.microsoft.com/office/2006/documentManagement/types"/>
+    <ds:schemaRef ds:uri="http://schemas.microsoft.com/office/infopath/2007/PartnerControls"/>
+    <ds:schemaRef ds:uri="http://schemas.openxmlformats.org/package/2006/metadata/core-properties"/>
+    <ds:schemaRef ds:uri="http://purl.org/dc/elements/1.1/"/>
+    <ds:schemaRef ds:uri="http://purl.org/dc/terms/"/>
+    <ds:schemaRef ds:uri="http://schemas.microsoft.com/internal/obd"/>
+  </ds:schemaRefs>
+</ds:datastoreItem>
+</file>
+
+<file path=customXml/itemProps2.xml><?xml version="1.0" encoding="utf-8"?>
+<ds:datastoreItem xmlns:ds="http://schemas.openxmlformats.org/officeDocument/2006/customXml" ds:itemID="{AD57AD06-F92C-44EB-AE7E-2E7C93F1B38A}">
+  <ds:schemaRefs>
+    <ds:schemaRef ds:uri="http://schemas.microsoft.com/sharepoint/v3/contenttype/forms"/>
+  </ds:schemaRefs>
+</ds:datastoreItem>
+</file>
+
+<file path=customXml/itemProps3.xml><?xml version="1.0" encoding="utf-8"?>
+<ds:datastoreItem xmlns:ds="http://schemas.openxmlformats.org/officeDocument/2006/customXml" ds:itemID="{2DC42811-3B51-4277-9BAB-60004E84128E}">
+  <ds:schemaRefs>
+    <ds:schemaRef ds:uri="http://purl.org/dc/terms/"/>
+    <ds:schemaRef ds:uri="http://purl.org/dc/elements/1.1/"/>
+    <ds:schemaRef ds:uri="92c41bee-f0ee-4aa6-9399-a35fbb883510"/>
+    <ds:schemaRef ds:uri="http://purl.org/dc/dcmitype/"/>
+    <ds:schemaRef ds:uri="http://schemas.microsoft.com/office/2006/documentManagement/types"/>
+    <ds:schemaRef ds:uri="http://schemas.microsoft.com/office/2006/metadata/properties"/>
+    <ds:schemaRef ds:uri="http://schemas.microsoft.com/office/infopath/2007/PartnerControls"/>
+    <ds:schemaRef ds:uri="http://schemas.openxmlformats.org/package/2006/metadata/core-properties"/>
+    <ds:schemaRef ds:uri="e06ed288-fd75-4b50-bbed-f5a5df88c31c"/>
+    <ds:schemaRef ds:uri="http://www.w3.org/XML/1998/namespace"/>
+  </ds:schemaRefs>
+</ds:datastoreItem>
 </file>
</xml_diff>

<commit_message>
updated Variables, and minor update to 01_02 for 163 in class example differencees.
</commit_message>
<xml_diff>
--- a/slides/On-Campus/02_01_Variables.pptx
+++ b/slides/On-Campus/02_01_Variables.pptx
@@ -24,21 +24,21 @@
   <p:notesSz cx="6858000" cy="9144000"/>
   <p:embeddedFontLst>
     <p:embeddedFont>
-      <p:font typeface="Proxima Nova" panose="020B0604020202020204" charset="0"/>
+      <p:font typeface="Consolas" panose="020B0609020204030204" pitchFamily="49" charset="0"/>
       <p:regular r:id="rId17"/>
       <p:bold r:id="rId18"/>
       <p:italic r:id="rId19"/>
       <p:boldItalic r:id="rId20"/>
     </p:embeddedFont>
     <p:embeddedFont>
-      <p:font typeface="Consolas" panose="020B0609020204030204" pitchFamily="49" charset="0"/>
+      <p:font typeface="Proxima Nova" panose="02000506030000020004" pitchFamily="2" charset="0"/>
       <p:regular r:id="rId21"/>
       <p:bold r:id="rId22"/>
       <p:italic r:id="rId23"/>
       <p:boldItalic r:id="rId24"/>
     </p:embeddedFont>
     <p:embeddedFont>
-      <p:font typeface="Source Sans Pro" panose="020B0604020202020204" charset="0"/>
+      <p:font typeface="Source Sans Pro" panose="020B0503030403020204" pitchFamily="34" charset="0"/>
       <p:regular r:id="rId25"/>
       <p:bold r:id="rId26"/>
       <p:italic r:id="rId27"/>
@@ -15258,7 +15258,7 @@
               <a:buNone/>
             </a:pPr>
             <a:r>
-              <a:rPr lang="en" dirty="0" smtClean="0"/>
+              <a:rPr lang="en" dirty="0"/>
               <a:t>Practice 2 – Group Reflection</a:t>
             </a:r>
             <a:endParaRPr dirty="0"/>
@@ -15398,7 +15398,7 @@
                 <a:ea typeface="Consolas"/>
                 <a:cs typeface="Consolas"/>
               </a:rPr>
-              <a:t>C = C +2;</a:t>
+              <a:t>C = C + 2;</a:t>
             </a:r>
           </a:p>
           <a:p>
@@ -15421,10 +15421,6 @@
             <a:pPr marL="152400" indent="0">
               <a:buNone/>
             </a:pPr>
-            <a:r>
-              <a:rPr lang="en-US" dirty="0"/>
-              <a:t/>
-            </a:r>
             <a:br>
               <a:rPr lang="en-US" dirty="0"/>
             </a:br>
@@ -15482,7 +15478,7 @@
               <a:buNone/>
             </a:pPr>
             <a:r>
-              <a:rPr lang="en" b="1" dirty="0" smtClean="0"/>
+              <a:rPr lang="en" b="1" dirty="0"/>
               <a:t>What are the final values for A, B, and C?</a:t>
             </a:r>
           </a:p>
@@ -15509,7 +15505,7 @@
               <a:buNone/>
             </a:pPr>
             <a:r>
-              <a:rPr lang="en" b="1" dirty="0" smtClean="0"/>
+              <a:rPr lang="en" b="1" dirty="0"/>
               <a:t>What happens if A is double instead of int?</a:t>
             </a:r>
           </a:p>
@@ -15536,7 +15532,7 @@
               <a:buNone/>
             </a:pPr>
             <a:r>
-              <a:rPr lang="en" b="1" dirty="0" smtClean="0"/>
+              <a:rPr lang="en" b="1" dirty="0"/>
               <a:t>What happens if A and B are double instead of int?</a:t>
             </a:r>
           </a:p>
@@ -15606,12 +15602,8 @@
           <a:lstStyle/>
           <a:p>
             <a:r>
-              <a:rPr lang="en-US" dirty="0" smtClean="0"/>
-              <a:t>Practice 3 - Group </a:t>
-            </a:r>
-            <a:r>
               <a:rPr lang="en-US" dirty="0"/>
-              <a:t>Coding</a:t>
+              <a:t>Practice 3 - Group Coding</a:t>
             </a:r>
           </a:p>
         </p:txBody>
@@ -15788,7 +15780,7 @@
         <p:spPr>
           <a:xfrm>
             <a:off x="415638" y="1646392"/>
-            <a:ext cx="5555792" cy="2898039"/>
+            <a:ext cx="5555792" cy="1968479"/>
           </a:xfrm>
         </p:spPr>
         <p:txBody>
@@ -15870,7 +15862,7 @@
         </p:nvSpPr>
         <p:spPr>
           <a:xfrm>
-            <a:off x="6448508" y="1423282"/>
+            <a:off x="6388687" y="229736"/>
             <a:ext cx="2576222" cy="738664"/>
           </a:xfrm>
           <a:prstGeom prst="rect">
@@ -15901,8 +15893,12 @@
           </a:p>
           <a:p>
             <a:r>
+              <a:rPr lang="en-US"/>
+              <a:t>Lab </a:t>
+            </a:r>
+            <a:r>
               <a:rPr lang="en-US" dirty="0"/>
-              <a:t>Labs projects start!</a:t>
+              <a:t>projects start!</a:t>
             </a:r>
           </a:p>
         </p:txBody>
@@ -15921,8 +15917,8 @@
         </p:nvSpPr>
         <p:spPr>
           <a:xfrm>
-            <a:off x="5971430" y="2612222"/>
-            <a:ext cx="2830664" cy="1169551"/>
+            <a:off x="6388687" y="1435554"/>
+            <a:ext cx="2830664" cy="1661993"/>
           </a:xfrm>
           <a:prstGeom prst="rect">
             <a:avLst/>
@@ -15942,15 +15938,17 @@
           </a:p>
           <a:p>
             <a:r>
-              <a:rPr lang="en-US" dirty="0"/>
-              <a:t>TODO</a:t>
+              <a:rPr lang="en-US" sz="1200" dirty="0"/>
+              <a:t>Success in CS Panel</a:t>
             </a:r>
           </a:p>
           <a:p>
             <a:r>
-              <a:rPr lang="en-US" dirty="0"/>
-              <a:t/>
+              <a:rPr lang="en-US" sz="1200" dirty="0"/>
+              <a:t>Wednesday, 6:00 PM CSB 130</a:t>
             </a:r>
+          </a:p>
+          <a:p>
             <a:br>
               <a:rPr lang="en-US" dirty="0"/>
             </a:br>
@@ -15961,8 +15959,78 @@
           </a:p>
           <a:p>
             <a:r>
+              <a:rPr lang="en-US" sz="1200" dirty="0"/>
+              <a:t>Hike to </a:t>
+            </a:r>
+            <a:r>
+              <a:rPr lang="en-US" sz="1200" dirty="0" err="1"/>
+              <a:t>Horsetooth</a:t>
+            </a:r>
+            <a:r>
+              <a:rPr lang="en-US" sz="1200" dirty="0"/>
+              <a:t> Falls</a:t>
+            </a:r>
+          </a:p>
+          <a:p>
+            <a:r>
+              <a:rPr lang="en-US" sz="1200" dirty="0"/>
+              <a:t>Thursday, 5:30 PM </a:t>
+            </a:r>
+            <a:br>
+              <a:rPr lang="en-US" sz="1200" dirty="0"/>
+            </a:br>
+            <a:r>
+              <a:rPr lang="en-US" sz="1200" dirty="0"/>
+              <a:t>Meet outside CSB front of building</a:t>
+            </a:r>
+          </a:p>
+        </p:txBody>
+      </p:sp>
+      <p:sp>
+        <p:nvSpPr>
+          <p:cNvPr id="2" name="TextBox 1">
+            <a:extLst>
+              <a:ext uri="{FF2B5EF4-FFF2-40B4-BE49-F238E27FC236}">
+                <a16:creationId xmlns:a16="http://schemas.microsoft.com/office/drawing/2014/main" id="{92EEFA02-5996-374A-B048-76B916799C48}"/>
+              </a:ext>
+            </a:extLst>
+          </p:cNvPr>
+          <p:cNvSpPr txBox="1"/>
+          <p:nvPr/>
+        </p:nvSpPr>
+        <p:spPr>
+          <a:xfrm>
+            <a:off x="1478833" y="3990195"/>
+            <a:ext cx="6186309" cy="738664"/>
+          </a:xfrm>
+          <a:prstGeom prst="rect">
+            <a:avLst/>
+          </a:prstGeom>
+          <a:solidFill>
+            <a:schemeClr val="accent2"/>
+          </a:solidFill>
+        </p:spPr>
+        <p:txBody>
+          <a:bodyPr wrap="none" rtlCol="0">
+            <a:spAutoFit/>
+          </a:bodyPr>
+          <a:lstStyle/>
+          <a:p>
+            <a:r>
+              <a:rPr lang="en-US" b="1" dirty="0"/>
+              <a:t>Opening Question (talk with others in your group *before* class starts)</a:t>
+            </a:r>
+          </a:p>
+          <a:p>
+            <a:r>
               <a:rPr lang="en-US" dirty="0"/>
-              <a:t>TODO</a:t>
+              <a:t>What are three ways technology can help improve the world around you? </a:t>
+            </a:r>
+          </a:p>
+          <a:p>
+            <a:r>
+              <a:rPr lang="en-US" dirty="0"/>
+              <a:t>How did you observe those ways this past weekend?</a:t>
             </a:r>
           </a:p>
         </p:txBody>
@@ -18355,7 +18423,7 @@
               <a:buNone/>
             </a:pPr>
             <a:r>
-              <a:rPr lang="en" dirty="0" smtClean="0"/>
+              <a:rPr lang="en" dirty="0"/>
               <a:t>Practice 1 – Group Reflection</a:t>
             </a:r>
             <a:endParaRPr dirty="0"/>
@@ -18496,18 +18564,7 @@
                 <a:ea typeface="Consolas"/>
                 <a:cs typeface="Consolas"/>
               </a:rPr>
-              <a:t>B = C</a:t>
-            </a:r>
-            <a:r>
-              <a:rPr lang="en-US" dirty="0" smtClean="0">
-                <a:solidFill>
-                  <a:srgbClr val="000000"/>
-                </a:solidFill>
-                <a:latin typeface="Consolas"/>
-                <a:ea typeface="Consolas"/>
-                <a:cs typeface="Consolas"/>
-              </a:rPr>
-              <a:t>;</a:t>
+              <a:t>B = C;</a:t>
             </a:r>
           </a:p>
           <a:p>
@@ -18515,7 +18572,7 @@
               <a:buNone/>
             </a:pPr>
             <a:r>
-              <a:rPr lang="en-US" dirty="0" smtClean="0">
+              <a:rPr lang="en-US" dirty="0">
                 <a:solidFill>
                   <a:srgbClr val="000000"/>
                 </a:solidFill>
@@ -18531,7 +18588,7 @@
               <a:buNone/>
             </a:pPr>
             <a:r>
-              <a:rPr lang="en-US" dirty="0" err="1" smtClean="0">
+              <a:rPr lang="en-US" dirty="0" err="1">
                 <a:solidFill>
                   <a:srgbClr val="000000"/>
                 </a:solidFill>
@@ -18542,7 +18599,7 @@
               <a:t>int</a:t>
             </a:r>
             <a:r>
-              <a:rPr lang="en-US" dirty="0" smtClean="0">
+              <a:rPr lang="en-US" dirty="0">
                 <a:solidFill>
                   <a:srgbClr val="000000"/>
                 </a:solidFill>
@@ -18550,18 +18607,7 @@
                 <a:ea typeface="Consolas"/>
                 <a:cs typeface="Consolas"/>
               </a:rPr>
-              <a:t> </a:t>
-            </a:r>
-            <a:r>
-              <a:rPr lang="en-US" dirty="0">
-                <a:solidFill>
-                  <a:srgbClr val="000000"/>
-                </a:solidFill>
-                <a:latin typeface="Consolas"/>
-                <a:ea typeface="Consolas"/>
-                <a:cs typeface="Consolas"/>
-              </a:rPr>
-              <a:t>A = 10;</a:t>
+              <a:t> A = 10;</a:t>
             </a:r>
           </a:p>
           <a:p>
@@ -18644,12 +18690,8 @@
               <a:buNone/>
             </a:pPr>
             <a:r>
-              <a:rPr lang="en-US" dirty="0" smtClean="0"/>
+              <a:rPr lang="en-US" dirty="0"/>
               <a:t>????</a:t>
-            </a:r>
-            <a:r>
-              <a:rPr lang="en-US" dirty="0"/>
-              <a:t/>
             </a:r>
             <a:br>
               <a:rPr lang="en-US" dirty="0"/>
@@ -18708,7 +18750,7 @@
               <a:buNone/>
             </a:pPr>
             <a:r>
-              <a:rPr lang="en" b="1" dirty="0" smtClean="0"/>
+              <a:rPr lang="en" b="1" dirty="0"/>
               <a:t>What are the final values for A, B, and C?</a:t>
             </a:r>
             <a:endParaRPr dirty="0"/>
@@ -18758,7 +18800,7 @@
               <a:buNone/>
             </a:pPr>
             <a:r>
-              <a:rPr lang="en" b="1" dirty="0" smtClean="0"/>
+              <a:rPr lang="en" b="1" dirty="0"/>
               <a:t>What are the final values for A and B?</a:t>
             </a:r>
             <a:endParaRPr dirty="0"/>
@@ -18798,18 +18840,10 @@
           </a:bodyPr>
           <a:lstStyle/>
           <a:p>
-            <a:pPr marL="0" lvl="0" indent="0" algn="l" rtl="0">
-              <a:spcBef>
-                <a:spcPts val="0"/>
-              </a:spcBef>
-              <a:spcAft>
-                <a:spcPts val="0"/>
-              </a:spcAft>
-              <a:buNone/>
-            </a:pPr>
+            <a:pPr lvl="0"/>
             <a:r>
-              <a:rPr lang="en" b="1" dirty="0" smtClean="0"/>
-              <a:t>What sequence of assignments do we need to change the values of A and B?</a:t>
+              <a:rPr lang="en-US" b="1" dirty="0"/>
+              <a:t>If we wanted to swap the values A and B, how would we modify the code above? Would we need to use a third variable? </a:t>
             </a:r>
             <a:endParaRPr dirty="0"/>
           </a:p>
@@ -19391,6 +19425,15 @@
 </file>
 
 <file path=customXml/item1.xml><?xml version="1.0" encoding="utf-8"?>
+<?mso-contentType ?>
+<FormTemplates xmlns="http://schemas.microsoft.com/sharepoint/v3/contenttype/forms">
+  <Display>DocumentLibraryForm</Display>
+  <Edit>DocumentLibraryForm</Edit>
+  <New>DocumentLibraryForm</New>
+</FormTemplates>
+</file>
+
+<file path=customXml/item2.xml><?xml version="1.0" encoding="utf-8"?>
 <ct:contentTypeSchema xmlns:ct="http://schemas.microsoft.com/office/2006/metadata/contentType" xmlns:ma="http://schemas.microsoft.com/office/2006/metadata/properties/metaAttributes" ct:_="" ma:_="" ma:contentTypeName="Document" ma:contentTypeID="0x010100074387D78AC76C4289401EF66FB51FCC" ma:contentTypeVersion="13" ma:contentTypeDescription="Create a new document." ma:contentTypeScope="" ma:versionID="6d00cb191415ef07de8591021eed77b7">
   <xsd:schema xmlns:xsd="http://www.w3.org/2001/XMLSchema" xmlns:xs="http://www.w3.org/2001/XMLSchema" xmlns:p="http://schemas.microsoft.com/office/2006/metadata/properties" xmlns:ns3="92c41bee-f0ee-4aa6-9399-a35fbb883510" xmlns:ns4="e06ed288-fd75-4b50-bbed-f5a5df88c31c" targetNamespace="http://schemas.microsoft.com/office/2006/metadata/properties" ma:root="true" ma:fieldsID="dd3c912a0e2ebbe56c1b62c06dfbba16" ns3:_="" ns4:_="">
     <xsd:import namespace="92c41bee-f0ee-4aa6-9399-a35fbb883510"/>
@@ -19613,15 +19656,6 @@
 </ct:contentTypeSchema>
 </file>
 
-<file path=customXml/item2.xml><?xml version="1.0" encoding="utf-8"?>
-<?mso-contentType ?>
-<FormTemplates xmlns="http://schemas.microsoft.com/sharepoint/v3/contenttype/forms">
-  <Display>DocumentLibraryForm</Display>
-  <Edit>DocumentLibraryForm</Edit>
-  <New>DocumentLibraryForm</New>
-</FormTemplates>
-</file>
-
 <file path=customXml/item3.xml><?xml version="1.0" encoding="utf-8"?>
 <p:properties xmlns:p="http://schemas.microsoft.com/office/2006/metadata/properties" xmlns:xsi="http://www.w3.org/2001/XMLSchema-instance" xmlns:pc="http://schemas.microsoft.com/office/infopath/2007/PartnerControls">
   <documentManagement/>
@@ -19629,6 +19663,14 @@
 </file>
 
 <file path=customXml/itemProps1.xml><?xml version="1.0" encoding="utf-8"?>
+<ds:datastoreItem xmlns:ds="http://schemas.openxmlformats.org/officeDocument/2006/customXml" ds:itemID="{AD57AD06-F92C-44EB-AE7E-2E7C93F1B38A}">
+  <ds:schemaRefs>
+    <ds:schemaRef ds:uri="http://schemas.microsoft.com/sharepoint/v3/contenttype/forms"/>
+  </ds:schemaRefs>
+</ds:datastoreItem>
+</file>
+
+<file path=customXml/itemProps2.xml><?xml version="1.0" encoding="utf-8"?>
 <ds:datastoreItem xmlns:ds="http://schemas.openxmlformats.org/officeDocument/2006/customXml" ds:itemID="{92A5BA81-21EF-4D25-A1C1-3693A7025EF6}">
   <ds:schemaRefs>
     <ds:schemaRef ds:uri="http://schemas.microsoft.com/office/2006/metadata/contentType"/>
@@ -19643,14 +19685,6 @@
     <ds:schemaRef ds:uri="http://purl.org/dc/elements/1.1/"/>
     <ds:schemaRef ds:uri="http://purl.org/dc/terms/"/>
     <ds:schemaRef ds:uri="http://schemas.microsoft.com/internal/obd"/>
-  </ds:schemaRefs>
-</ds:datastoreItem>
-</file>
-
-<file path=customXml/itemProps2.xml><?xml version="1.0" encoding="utf-8"?>
-<ds:datastoreItem xmlns:ds="http://schemas.openxmlformats.org/officeDocument/2006/customXml" ds:itemID="{AD57AD06-F92C-44EB-AE7E-2E7C93F1B38A}">
-  <ds:schemaRefs>
-    <ds:schemaRef ds:uri="http://schemas.microsoft.com/sharepoint/v3/contenttype/forms"/>
   </ds:schemaRefs>
 </ds:datastoreItem>
 </file>

</xml_diff>

<commit_message>
update for class including announcements.
</commit_message>
<xml_diff>
--- a/slides/On-Campus/02_01_Variables.pptx
+++ b/slides/On-Campus/02_01_Variables.pptx
@@ -14,10 +14,10 @@
     <p:sldId id="262" r:id="rId8"/>
     <p:sldId id="257" r:id="rId9"/>
     <p:sldId id="258" r:id="rId10"/>
-    <p:sldId id="259" r:id="rId11"/>
-    <p:sldId id="260" r:id="rId12"/>
-    <p:sldId id="265" r:id="rId13"/>
-    <p:sldId id="266" r:id="rId14"/>
+    <p:sldId id="265" r:id="rId11"/>
+    <p:sldId id="259" r:id="rId12"/>
+    <p:sldId id="266" r:id="rId13"/>
+    <p:sldId id="260" r:id="rId14"/>
     <p:sldId id="264" r:id="rId15"/>
   </p:sldIdLst>
   <p:sldSz cx="9144000" cy="5143500" type="screen16x9"/>
@@ -1051,6 +1051,115 @@
   <p:cSld>
     <p:spTree>
       <p:nvGrpSpPr>
+        <p:cNvPr id="1" name="Shape 206"/>
+        <p:cNvGrpSpPr/>
+        <p:nvPr/>
+      </p:nvGrpSpPr>
+      <p:grpSpPr>
+        <a:xfrm>
+          <a:off x="0" y="0"/>
+          <a:ext cx="0" cy="0"/>
+          <a:chOff x="0" y="0"/>
+          <a:chExt cx="0" cy="0"/>
+        </a:xfrm>
+      </p:grpSpPr>
+      <p:sp>
+        <p:nvSpPr>
+          <p:cNvPr id="207" name="Google Shape;207;g6e365c192e_0_203:notes"/>
+          <p:cNvSpPr>
+            <a:spLocks noGrp="1" noRot="1" noChangeAspect="1"/>
+          </p:cNvSpPr>
+          <p:nvPr>
+            <p:ph type="sldImg" idx="2"/>
+          </p:nvPr>
+        </p:nvSpPr>
+        <p:spPr>
+          <a:xfrm>
+            <a:off x="381000" y="685800"/>
+            <a:ext cx="6096000" cy="3429000"/>
+          </a:xfrm>
+          <a:custGeom>
+            <a:avLst/>
+            <a:gdLst/>
+            <a:ahLst/>
+            <a:cxnLst/>
+            <a:rect l="l" t="t" r="r" b="b"/>
+            <a:pathLst>
+              <a:path w="120000" h="120000" extrusionOk="0">
+                <a:moveTo>
+                  <a:pt x="0" y="0"/>
+                </a:moveTo>
+                <a:lnTo>
+                  <a:pt x="120000" y="0"/>
+                </a:lnTo>
+                <a:lnTo>
+                  <a:pt x="120000" y="120000"/>
+                </a:lnTo>
+                <a:lnTo>
+                  <a:pt x="0" y="120000"/>
+                </a:lnTo>
+                <a:close/>
+              </a:path>
+            </a:pathLst>
+          </a:custGeom>
+        </p:spPr>
+      </p:sp>
+      <p:sp>
+        <p:nvSpPr>
+          <p:cNvPr id="208" name="Google Shape;208;g6e365c192e_0_203:notes"/>
+          <p:cNvSpPr txBox="1">
+            <a:spLocks noGrp="1"/>
+          </p:cNvSpPr>
+          <p:nvPr>
+            <p:ph type="body" idx="1"/>
+          </p:nvPr>
+        </p:nvSpPr>
+        <p:spPr>
+          <a:xfrm>
+            <a:off x="685800" y="4343400"/>
+            <a:ext cx="5486400" cy="4114800"/>
+          </a:xfrm>
+          <a:prstGeom prst="rect">
+            <a:avLst/>
+          </a:prstGeom>
+        </p:spPr>
+        <p:txBody>
+          <a:bodyPr spcFirstLastPara="1" wrap="square" lIns="91425" tIns="91425" rIns="91425" bIns="91425" anchor="t" anchorCtr="0">
+            <a:noAutofit/>
+          </a:bodyPr>
+          <a:lstStyle/>
+          <a:p>
+            <a:pPr marL="0" lvl="0" indent="0" algn="l" rtl="0">
+              <a:spcBef>
+                <a:spcPts val="0"/>
+              </a:spcBef>
+              <a:spcAft>
+                <a:spcPts val="0"/>
+              </a:spcAft>
+              <a:buNone/>
+            </a:pPr>
+            <a:endParaRPr/>
+          </a:p>
+        </p:txBody>
+      </p:sp>
+    </p:spTree>
+    <p:extLst>
+      <p:ext uri="{BB962C8B-B14F-4D97-AF65-F5344CB8AC3E}">
+        <p14:creationId xmlns:p14="http://schemas.microsoft.com/office/powerpoint/2010/main" val="3772290187"/>
+      </p:ext>
+    </p:extLst>
+  </p:cSld>
+  <p:clrMapOvr>
+    <a:masterClrMapping/>
+  </p:clrMapOvr>
+</p:notes>
+</file>
+
+<file path=ppt/notesSlides/notesSlide5.xml><?xml version="1.0" encoding="utf-8"?>
+<p:notes xmlns:a="http://schemas.openxmlformats.org/drawingml/2006/main" xmlns:r="http://schemas.openxmlformats.org/officeDocument/2006/relationships" xmlns:p="http://schemas.openxmlformats.org/presentationml/2006/main" showMasterSp="0" showMasterPhAnim="0">
+  <p:cSld>
+    <p:spTree>
+      <p:nvGrpSpPr>
         <p:cNvPr id="1" name="Shape 200"/>
         <p:cNvGrpSpPr/>
         <p:nvPr/>
@@ -1107,110 +1216,6 @@
       <p:sp>
         <p:nvSpPr>
           <p:cNvPr id="202" name="Google Shape;202;g6e365c192e_0_351:notes"/>
-          <p:cNvSpPr txBox="1">
-            <a:spLocks noGrp="1"/>
-          </p:cNvSpPr>
-          <p:nvPr>
-            <p:ph type="body" idx="1"/>
-          </p:nvPr>
-        </p:nvSpPr>
-        <p:spPr>
-          <a:xfrm>
-            <a:off x="685800" y="4343400"/>
-            <a:ext cx="5486400" cy="4114800"/>
-          </a:xfrm>
-          <a:prstGeom prst="rect">
-            <a:avLst/>
-          </a:prstGeom>
-        </p:spPr>
-        <p:txBody>
-          <a:bodyPr spcFirstLastPara="1" wrap="square" lIns="91425" tIns="91425" rIns="91425" bIns="91425" anchor="t" anchorCtr="0">
-            <a:noAutofit/>
-          </a:bodyPr>
-          <a:lstStyle/>
-          <a:p>
-            <a:pPr marL="0" lvl="0" indent="0" algn="l" rtl="0">
-              <a:spcBef>
-                <a:spcPts val="0"/>
-              </a:spcBef>
-              <a:spcAft>
-                <a:spcPts val="0"/>
-              </a:spcAft>
-              <a:buNone/>
-            </a:pPr>
-            <a:endParaRPr/>
-          </a:p>
-        </p:txBody>
-      </p:sp>
-    </p:spTree>
-  </p:cSld>
-  <p:clrMapOvr>
-    <a:masterClrMapping/>
-  </p:clrMapOvr>
-</p:notes>
-</file>
-
-<file path=ppt/notesSlides/notesSlide5.xml><?xml version="1.0" encoding="utf-8"?>
-<p:notes xmlns:a="http://schemas.openxmlformats.org/drawingml/2006/main" xmlns:r="http://schemas.openxmlformats.org/officeDocument/2006/relationships" xmlns:p="http://schemas.openxmlformats.org/presentationml/2006/main" showMasterSp="0" showMasterPhAnim="0">
-  <p:cSld>
-    <p:spTree>
-      <p:nvGrpSpPr>
-        <p:cNvPr id="1" name="Shape 206"/>
-        <p:cNvGrpSpPr/>
-        <p:nvPr/>
-      </p:nvGrpSpPr>
-      <p:grpSpPr>
-        <a:xfrm>
-          <a:off x="0" y="0"/>
-          <a:ext cx="0" cy="0"/>
-          <a:chOff x="0" y="0"/>
-          <a:chExt cx="0" cy="0"/>
-        </a:xfrm>
-      </p:grpSpPr>
-      <p:sp>
-        <p:nvSpPr>
-          <p:cNvPr id="207" name="Google Shape;207;g6e365c192e_0_203:notes"/>
-          <p:cNvSpPr>
-            <a:spLocks noGrp="1" noRot="1" noChangeAspect="1"/>
-          </p:cNvSpPr>
-          <p:nvPr>
-            <p:ph type="sldImg" idx="2"/>
-          </p:nvPr>
-        </p:nvSpPr>
-        <p:spPr>
-          <a:xfrm>
-            <a:off x="381000" y="685800"/>
-            <a:ext cx="6096000" cy="3429000"/>
-          </a:xfrm>
-          <a:custGeom>
-            <a:avLst/>
-            <a:gdLst/>
-            <a:ahLst/>
-            <a:cxnLst/>
-            <a:rect l="l" t="t" r="r" b="b"/>
-            <a:pathLst>
-              <a:path w="120000" h="120000" extrusionOk="0">
-                <a:moveTo>
-                  <a:pt x="0" y="0"/>
-                </a:moveTo>
-                <a:lnTo>
-                  <a:pt x="120000" y="0"/>
-                </a:lnTo>
-                <a:lnTo>
-                  <a:pt x="120000" y="120000"/>
-                </a:lnTo>
-                <a:lnTo>
-                  <a:pt x="0" y="120000"/>
-                </a:lnTo>
-                <a:close/>
-              </a:path>
-            </a:pathLst>
-          </a:custGeom>
-        </p:spPr>
-      </p:sp>
-      <p:sp>
-        <p:nvSpPr>
-          <p:cNvPr id="208" name="Google Shape;208;g6e365c192e_0_203:notes"/>
           <p:cNvSpPr txBox="1">
             <a:spLocks noGrp="1"/>
           </p:cNvSpPr>
@@ -1353,7 +1358,7 @@
     </p:spTree>
     <p:extLst>
       <p:ext uri="{BB962C8B-B14F-4D97-AF65-F5344CB8AC3E}">
-        <p14:creationId xmlns:p14="http://schemas.microsoft.com/office/powerpoint/2010/main" val="3772290187"/>
+        <p14:creationId xmlns:p14="http://schemas.microsoft.com/office/powerpoint/2010/main" val="688029519"/>
       </p:ext>
     </p:extLst>
   </p:cSld>
@@ -1460,11 +1465,6 @@
         </p:txBody>
       </p:sp>
     </p:spTree>
-    <p:extLst>
-      <p:ext uri="{BB962C8B-B14F-4D97-AF65-F5344CB8AC3E}">
-        <p14:creationId xmlns:p14="http://schemas.microsoft.com/office/powerpoint/2010/main" val="688029519"/>
-      </p:ext>
-    </p:extLst>
   </p:cSld>
   <p:clrMapOvr>
     <a:masterClrMapping/>
@@ -15235,7 +15235,7 @@
         </p:nvSpPr>
         <p:spPr>
           <a:xfrm>
-            <a:off x="407768" y="490964"/>
+            <a:off x="415638" y="329368"/>
             <a:ext cx="8312700" cy="672000"/>
           </a:xfrm>
           <a:prstGeom prst="rect">
@@ -15259,7 +15259,7 @@
             </a:pPr>
             <a:r>
               <a:rPr lang="en" dirty="0"/>
-              <a:t>Practice 2 – Group Reflection</a:t>
+              <a:t>Examples</a:t>
             </a:r>
             <a:endParaRPr dirty="0"/>
           </a:p>
@@ -15277,8 +15277,8 @@
         </p:nvSpPr>
         <p:spPr>
           <a:xfrm>
-            <a:off x="407768" y="1139573"/>
-            <a:ext cx="8312700" cy="4003927"/>
+            <a:off x="415650" y="1001375"/>
+            <a:ext cx="8312700" cy="2967000"/>
           </a:xfrm>
           <a:prstGeom prst="rect">
             <a:avLst/>
@@ -15290,147 +15290,478 @@
           </a:bodyPr>
           <a:lstStyle/>
           <a:p>
-            <a:pPr marL="152400" indent="0">
+            <a:pPr marL="0" lvl="0" indent="0" algn="l" rtl="0">
+              <a:spcBef>
+                <a:spcPts val="400"/>
+              </a:spcBef>
+              <a:spcAft>
+                <a:spcPts val="0"/>
+              </a:spcAft>
               <a:buNone/>
             </a:pPr>
             <a:r>
-              <a:rPr lang="pt-BR" dirty="0">
+              <a:rPr lang="en" dirty="0">
                 <a:solidFill>
                   <a:srgbClr val="000000"/>
                 </a:solidFill>
                 <a:latin typeface="Consolas"/>
                 <a:ea typeface="Consolas"/>
                 <a:cs typeface="Consolas"/>
+                <a:sym typeface="Consolas"/>
               </a:rPr>
-              <a:t>int A, B, C;</a:t>
+              <a:t>int </a:t>
             </a:r>
-          </a:p>
-          <a:p>
-            <a:pPr marL="152400" indent="0">
-              <a:buNone/>
-            </a:pPr>
             <a:r>
-              <a:rPr lang="pt-BR" dirty="0">
+              <a:rPr lang="en" dirty="0" err="1">
                 <a:solidFill>
                   <a:srgbClr val="000000"/>
                 </a:solidFill>
                 <a:latin typeface="Consolas"/>
                 <a:ea typeface="Consolas"/>
                 <a:cs typeface="Consolas"/>
+                <a:sym typeface="Consolas"/>
               </a:rPr>
-              <a:t>A = 10;</a:t>
+              <a:t>puppyCounter</a:t>
             </a:r>
-          </a:p>
-          <a:p>
-            <a:pPr marL="152400" indent="0">
-              <a:buNone/>
-            </a:pPr>
             <a:r>
-              <a:rPr lang="pt-BR" dirty="0">
+              <a:rPr lang="en" dirty="0">
                 <a:solidFill>
                   <a:srgbClr val="000000"/>
                 </a:solidFill>
                 <a:latin typeface="Consolas"/>
                 <a:ea typeface="Consolas"/>
                 <a:cs typeface="Consolas"/>
+                <a:sym typeface="Consolas"/>
               </a:rPr>
-              <a:t>A = A + 1;</a:t>
+              <a:t> = 100; // so many puppies!</a:t>
             </a:r>
-          </a:p>
-          <a:p>
-            <a:pPr marL="152400" indent="0">
-              <a:buNone/>
-            </a:pPr>
-            <a:r>
-              <a:rPr lang="pt-BR" dirty="0">
-                <a:solidFill>
-                  <a:srgbClr val="000000"/>
-                </a:solidFill>
-                <a:latin typeface="Consolas"/>
-                <a:ea typeface="Consolas"/>
-                <a:cs typeface="Consolas"/>
-              </a:rPr>
-              <a:t>B = A/2;</a:t>
-            </a:r>
-          </a:p>
-          <a:p>
-            <a:pPr marL="152400" indent="0">
-              <a:buNone/>
-            </a:pPr>
-            <a:r>
-              <a:rPr lang="pt-BR" dirty="0">
-                <a:solidFill>
-                  <a:srgbClr val="000000"/>
-                </a:solidFill>
-                <a:latin typeface="Consolas"/>
-                <a:ea typeface="Consolas"/>
-                <a:cs typeface="Consolas"/>
-              </a:rPr>
-              <a:t>A = 6;</a:t>
-            </a:r>
-          </a:p>
-          <a:p>
-            <a:pPr marL="152400" indent="0">
-              <a:buNone/>
-            </a:pPr>
-            <a:r>
-              <a:rPr lang="pt-BR" dirty="0">
-                <a:solidFill>
-                  <a:srgbClr val="000000"/>
-                </a:solidFill>
-                <a:latin typeface="Consolas"/>
-                <a:ea typeface="Consolas"/>
-                <a:cs typeface="Consolas"/>
-              </a:rPr>
-              <a:t>C = B + 1;</a:t>
-            </a:r>
-          </a:p>
-          <a:p>
-            <a:pPr marL="152400" indent="0">
-              <a:buNone/>
-            </a:pPr>
-            <a:r>
-              <a:rPr lang="pt-BR" dirty="0">
-                <a:solidFill>
-                  <a:srgbClr val="000000"/>
-                </a:solidFill>
-                <a:latin typeface="Consolas"/>
-                <a:ea typeface="Consolas"/>
-                <a:cs typeface="Consolas"/>
-              </a:rPr>
-              <a:t>C = C + 2;</a:t>
-            </a:r>
-          </a:p>
-          <a:p>
-            <a:pPr marL="152400" indent="0">
-              <a:buNone/>
-            </a:pPr>
-            <a:r>
-              <a:rPr lang="pt-BR" dirty="0">
-                <a:solidFill>
-                  <a:srgbClr val="000000"/>
-                </a:solidFill>
-                <a:latin typeface="Consolas"/>
-                <a:ea typeface="Consolas"/>
-                <a:cs typeface="Consolas"/>
-              </a:rPr>
-              <a:t>A = B/2;</a:t>
-            </a:r>
-          </a:p>
-          <a:p>
-            <a:pPr marL="152400" indent="0">
-              <a:buNone/>
-            </a:pPr>
-            <a:br>
-              <a:rPr lang="en-US" dirty="0"/>
-            </a:br>
-            <a:endParaRPr lang="en-US" dirty="0">
+            <a:endParaRPr dirty="0">
               <a:solidFill>
                 <a:srgbClr val="000000"/>
               </a:solidFill>
               <a:latin typeface="Consolas"/>
               <a:ea typeface="Consolas"/>
               <a:cs typeface="Consolas"/>
+              <a:sym typeface="Consolas"/>
+            </a:endParaRPr>
+          </a:p>
+          <a:p>
+            <a:pPr marL="0" lvl="0" indent="0" algn="l" rtl="0">
+              <a:spcBef>
+                <a:spcPts val="400"/>
+              </a:spcBef>
+              <a:spcAft>
+                <a:spcPts val="0"/>
+              </a:spcAft>
+              <a:buNone/>
+            </a:pPr>
+            <a:endParaRPr lang="en" dirty="0">
+              <a:solidFill>
+                <a:srgbClr val="000000"/>
+              </a:solidFill>
+              <a:latin typeface="Consolas"/>
+              <a:ea typeface="Consolas"/>
+              <a:cs typeface="Consolas"/>
+              <a:sym typeface="Consolas"/>
+            </a:endParaRPr>
+          </a:p>
+          <a:p>
+            <a:pPr marL="0" lvl="0" indent="0" algn="l" rtl="0">
+              <a:spcBef>
+                <a:spcPts val="400"/>
+              </a:spcBef>
+              <a:spcAft>
+                <a:spcPts val="0"/>
+              </a:spcAft>
+              <a:buNone/>
+            </a:pPr>
+            <a:r>
+              <a:rPr lang="en" dirty="0">
+                <a:solidFill>
+                  <a:srgbClr val="000000"/>
+                </a:solidFill>
+                <a:latin typeface="Consolas"/>
+                <a:ea typeface="Consolas"/>
+                <a:cs typeface="Consolas"/>
+                <a:sym typeface="Consolas"/>
+              </a:rPr>
+              <a:t>String </a:t>
+            </a:r>
+            <a:r>
+              <a:rPr lang="en" dirty="0" err="1">
+                <a:solidFill>
+                  <a:srgbClr val="000000"/>
+                </a:solidFill>
+                <a:latin typeface="Consolas"/>
+                <a:ea typeface="Consolas"/>
+                <a:cs typeface="Consolas"/>
+                <a:sym typeface="Consolas"/>
+              </a:rPr>
+              <a:t>puppyName</a:t>
+            </a:r>
+            <a:r>
+              <a:rPr lang="en" dirty="0">
+                <a:solidFill>
+                  <a:srgbClr val="000000"/>
+                </a:solidFill>
+                <a:latin typeface="Consolas"/>
+                <a:ea typeface="Consolas"/>
+                <a:cs typeface="Consolas"/>
+                <a:sym typeface="Consolas"/>
+              </a:rPr>
+              <a:t> = “Spot”; </a:t>
+            </a:r>
+            <a:endParaRPr dirty="0">
+              <a:solidFill>
+                <a:srgbClr val="000000"/>
+              </a:solidFill>
+              <a:latin typeface="Consolas"/>
+              <a:ea typeface="Consolas"/>
+              <a:cs typeface="Consolas"/>
+              <a:sym typeface="Consolas"/>
+            </a:endParaRPr>
+          </a:p>
+          <a:p>
+            <a:pPr marL="0" lvl="0" indent="0" algn="l" rtl="0">
+              <a:spcBef>
+                <a:spcPts val="400"/>
+              </a:spcBef>
+              <a:spcAft>
+                <a:spcPts val="0"/>
+              </a:spcAft>
+              <a:buNone/>
+            </a:pPr>
+            <a:r>
+              <a:rPr lang="en" dirty="0">
+                <a:solidFill>
+                  <a:srgbClr val="000000"/>
+                </a:solidFill>
+                <a:latin typeface="Consolas"/>
+                <a:ea typeface="Consolas"/>
+                <a:cs typeface="Consolas"/>
+                <a:sym typeface="Consolas"/>
+              </a:rPr>
+              <a:t>String </a:t>
+            </a:r>
+            <a:r>
+              <a:rPr lang="en" dirty="0" err="1">
+                <a:solidFill>
+                  <a:srgbClr val="000000"/>
+                </a:solidFill>
+                <a:latin typeface="Consolas"/>
+                <a:ea typeface="Consolas"/>
+                <a:cs typeface="Consolas"/>
+                <a:sym typeface="Consolas"/>
+              </a:rPr>
+              <a:t>puppyLongName</a:t>
+            </a:r>
+            <a:r>
+              <a:rPr lang="en" dirty="0">
+                <a:solidFill>
+                  <a:srgbClr val="000000"/>
+                </a:solidFill>
+                <a:latin typeface="Consolas"/>
+                <a:ea typeface="Consolas"/>
+                <a:cs typeface="Consolas"/>
+                <a:sym typeface="Consolas"/>
+              </a:rPr>
+              <a:t> = “Cerberus”;</a:t>
+            </a:r>
+            <a:endParaRPr dirty="0">
+              <a:solidFill>
+                <a:srgbClr val="000000"/>
+              </a:solidFill>
+              <a:latin typeface="Consolas"/>
+              <a:ea typeface="Consolas"/>
+              <a:cs typeface="Consolas"/>
+              <a:sym typeface="Consolas"/>
+            </a:endParaRPr>
+          </a:p>
+          <a:p>
+            <a:pPr marL="0" lvl="0" indent="0" algn="l" rtl="0">
+              <a:spcBef>
+                <a:spcPts val="400"/>
+              </a:spcBef>
+              <a:spcAft>
+                <a:spcPts val="0"/>
+              </a:spcAft>
+              <a:buNone/>
+            </a:pPr>
+            <a:endParaRPr dirty="0">
+              <a:solidFill>
+                <a:srgbClr val="000000"/>
+              </a:solidFill>
+              <a:latin typeface="Consolas"/>
+              <a:ea typeface="Consolas"/>
+              <a:cs typeface="Consolas"/>
+              <a:sym typeface="Consolas"/>
+            </a:endParaRPr>
+          </a:p>
+          <a:p>
+            <a:pPr marL="0" lvl="0" indent="0" algn="l" rtl="0">
+              <a:spcBef>
+                <a:spcPts val="400"/>
+              </a:spcBef>
+              <a:spcAft>
+                <a:spcPts val="0"/>
+              </a:spcAft>
+              <a:buNone/>
+            </a:pPr>
+            <a:r>
+              <a:rPr lang="en" dirty="0">
+                <a:solidFill>
+                  <a:srgbClr val="000000"/>
+                </a:solidFill>
+                <a:latin typeface="Consolas"/>
+                <a:ea typeface="Consolas"/>
+                <a:cs typeface="Consolas"/>
+                <a:sym typeface="Consolas"/>
+              </a:rPr>
+              <a:t>double </a:t>
+            </a:r>
+            <a:r>
+              <a:rPr lang="en" dirty="0" err="1">
+                <a:solidFill>
+                  <a:srgbClr val="000000"/>
+                </a:solidFill>
+                <a:latin typeface="Consolas"/>
+                <a:ea typeface="Consolas"/>
+                <a:cs typeface="Consolas"/>
+                <a:sym typeface="Consolas"/>
+              </a:rPr>
+              <a:t>amountOfFoodPerDayLbs</a:t>
+            </a:r>
+            <a:r>
+              <a:rPr lang="en" dirty="0">
+                <a:solidFill>
+                  <a:srgbClr val="000000"/>
+                </a:solidFill>
+                <a:latin typeface="Consolas"/>
+                <a:ea typeface="Consolas"/>
+                <a:cs typeface="Consolas"/>
+                <a:sym typeface="Consolas"/>
+              </a:rPr>
+              <a:t> = 20.56; </a:t>
+            </a:r>
+            <a:endParaRPr dirty="0">
+              <a:solidFill>
+                <a:srgbClr val="000000"/>
+              </a:solidFill>
+              <a:latin typeface="Consolas"/>
+              <a:ea typeface="Consolas"/>
+              <a:cs typeface="Consolas"/>
+              <a:sym typeface="Consolas"/>
+            </a:endParaRPr>
+          </a:p>
+          <a:p>
+            <a:pPr marL="0" lvl="0" indent="0" algn="l" rtl="0">
+              <a:spcBef>
+                <a:spcPts val="400"/>
+              </a:spcBef>
+              <a:spcAft>
+                <a:spcPts val="0"/>
+              </a:spcAft>
+              <a:buNone/>
+            </a:pPr>
+            <a:r>
+              <a:rPr lang="en" dirty="0" err="1">
+                <a:solidFill>
+                  <a:srgbClr val="000000"/>
+                </a:solidFill>
+                <a:latin typeface="Consolas"/>
+                <a:ea typeface="Consolas"/>
+                <a:cs typeface="Consolas"/>
+                <a:sym typeface="Consolas"/>
+              </a:rPr>
+              <a:t>amountOfFoodPerDayLbs</a:t>
+            </a:r>
+            <a:r>
+              <a:rPr lang="en" dirty="0">
+                <a:solidFill>
+                  <a:srgbClr val="000000"/>
+                </a:solidFill>
+                <a:latin typeface="Consolas"/>
+                <a:ea typeface="Consolas"/>
+                <a:cs typeface="Consolas"/>
+                <a:sym typeface="Consolas"/>
+              </a:rPr>
+              <a:t> = </a:t>
+            </a:r>
+            <a:r>
+              <a:rPr lang="en" dirty="0" err="1">
+                <a:solidFill>
+                  <a:srgbClr val="000000"/>
+                </a:solidFill>
+                <a:latin typeface="Consolas"/>
+                <a:ea typeface="Consolas"/>
+                <a:cs typeface="Consolas"/>
+                <a:sym typeface="Consolas"/>
+              </a:rPr>
+              <a:t>amountOfFoodPerDayLbs</a:t>
+            </a:r>
+            <a:r>
+              <a:rPr lang="en" dirty="0">
+                <a:solidFill>
+                  <a:srgbClr val="000000"/>
+                </a:solidFill>
+                <a:latin typeface="Consolas"/>
+                <a:ea typeface="Consolas"/>
+                <a:cs typeface="Consolas"/>
+                <a:sym typeface="Consolas"/>
+              </a:rPr>
+              <a:t> + 10.0; // assigns 30.56 to the variable</a:t>
+            </a:r>
+            <a:br>
+              <a:rPr lang="en" dirty="0">
+                <a:solidFill>
+                  <a:srgbClr val="000000"/>
+                </a:solidFill>
+                <a:latin typeface="Consolas"/>
+                <a:ea typeface="Consolas"/>
+                <a:cs typeface="Consolas"/>
+                <a:sym typeface="Consolas"/>
+              </a:rPr>
+            </a:br>
+            <a:endParaRPr dirty="0">
+              <a:solidFill>
+                <a:srgbClr val="000000"/>
+              </a:solidFill>
+              <a:latin typeface="Consolas"/>
+              <a:ea typeface="Consolas"/>
+              <a:cs typeface="Consolas"/>
+              <a:sym typeface="Consolas"/>
+            </a:endParaRPr>
+          </a:p>
+          <a:p>
+            <a:pPr marL="0" lvl="0" indent="0" algn="l" rtl="0">
+              <a:spcBef>
+                <a:spcPts val="400"/>
+              </a:spcBef>
+              <a:spcAft>
+                <a:spcPts val="0"/>
+              </a:spcAft>
+              <a:buNone/>
+            </a:pPr>
+            <a:r>
+              <a:rPr lang="en" dirty="0">
+                <a:solidFill>
+                  <a:srgbClr val="000000"/>
+                </a:solidFill>
+                <a:latin typeface="Consolas"/>
+                <a:ea typeface="Consolas"/>
+                <a:cs typeface="Consolas"/>
+                <a:sym typeface="Consolas"/>
+              </a:rPr>
+              <a:t>boolean </a:t>
+            </a:r>
+            <a:r>
+              <a:rPr lang="en" dirty="0" err="1">
+                <a:solidFill>
+                  <a:srgbClr val="000000"/>
+                </a:solidFill>
+                <a:latin typeface="Consolas"/>
+                <a:ea typeface="Consolas"/>
+                <a:cs typeface="Consolas"/>
+                <a:sym typeface="Consolas"/>
+              </a:rPr>
+              <a:t>isPettable</a:t>
+            </a:r>
+            <a:r>
+              <a:rPr lang="en" dirty="0">
+                <a:solidFill>
+                  <a:srgbClr val="000000"/>
+                </a:solidFill>
+                <a:latin typeface="Consolas"/>
+                <a:ea typeface="Consolas"/>
+                <a:cs typeface="Consolas"/>
+                <a:sym typeface="Consolas"/>
+              </a:rPr>
+              <a:t> = true;  // only options for boolean is true or false</a:t>
+            </a:r>
+            <a:endParaRPr dirty="0">
+              <a:solidFill>
+                <a:srgbClr val="000000"/>
+              </a:solidFill>
+              <a:latin typeface="Consolas"/>
+              <a:ea typeface="Consolas"/>
+              <a:cs typeface="Consolas"/>
+              <a:sym typeface="Consolas"/>
+            </a:endParaRPr>
+          </a:p>
+          <a:p>
+            <a:pPr marL="0" lvl="0" indent="0" algn="l" rtl="0">
+              <a:spcBef>
+                <a:spcPts val="400"/>
+              </a:spcBef>
+              <a:spcAft>
+                <a:spcPts val="0"/>
+              </a:spcAft>
+              <a:buNone/>
+            </a:pPr>
+            <a:endParaRPr dirty="0">
+              <a:solidFill>
+                <a:srgbClr val="000000"/>
+              </a:solidFill>
+              <a:latin typeface="Consolas"/>
+              <a:ea typeface="Consolas"/>
+              <a:cs typeface="Consolas"/>
+              <a:sym typeface="Consolas"/>
+            </a:endParaRPr>
+          </a:p>
+          <a:p>
+            <a:pPr marL="0" lvl="0" indent="0" algn="l" rtl="0">
+              <a:spcBef>
+                <a:spcPts val="400"/>
+              </a:spcBef>
+              <a:spcAft>
+                <a:spcPts val="400"/>
+              </a:spcAft>
+              <a:buNone/>
+            </a:pPr>
+            <a:r>
+              <a:rPr lang="en" dirty="0">
+                <a:solidFill>
+                  <a:srgbClr val="000000"/>
+                </a:solidFill>
+                <a:latin typeface="Consolas"/>
+                <a:ea typeface="Consolas"/>
+                <a:cs typeface="Consolas"/>
+                <a:sym typeface="Consolas"/>
+              </a:rPr>
+              <a:t>char </a:t>
+            </a:r>
+            <a:r>
+              <a:rPr lang="en" dirty="0" err="1">
+                <a:solidFill>
+                  <a:srgbClr val="000000"/>
+                </a:solidFill>
+                <a:latin typeface="Consolas"/>
+                <a:ea typeface="Consolas"/>
+                <a:cs typeface="Consolas"/>
+                <a:sym typeface="Consolas"/>
+              </a:rPr>
+              <a:t>singleLetter</a:t>
+            </a:r>
+            <a:r>
+              <a:rPr lang="en" dirty="0">
+                <a:solidFill>
+                  <a:srgbClr val="000000"/>
+                </a:solidFill>
+                <a:latin typeface="Consolas"/>
+                <a:ea typeface="Consolas"/>
+                <a:cs typeface="Consolas"/>
+                <a:sym typeface="Consolas"/>
+              </a:rPr>
+              <a:t> = ‘c’;  //characters are single letters, notice single quote</a:t>
+            </a:r>
+            <a:endParaRPr dirty="0">
+              <a:solidFill>
+                <a:srgbClr val="000000"/>
+              </a:solidFill>
+              <a:latin typeface="Consolas"/>
+              <a:ea typeface="Consolas"/>
+              <a:cs typeface="Consolas"/>
+              <a:sym typeface="Consolas"/>
             </a:endParaRPr>
           </a:p>
         </p:txBody>
@@ -15443,8 +15774,8 @@
         </p:nvSpPr>
         <p:spPr>
           <a:xfrm>
-            <a:off x="2902403" y="2956034"/>
-            <a:ext cx="5989200" cy="1600200"/>
+            <a:off x="3112950" y="4021850"/>
+            <a:ext cx="5989200" cy="795300"/>
           </a:xfrm>
           <a:prstGeom prst="rect">
             <a:avLst/>
@@ -15478,84 +15809,21 @@
               <a:buNone/>
             </a:pPr>
             <a:r>
-              <a:rPr lang="en" b="1" dirty="0"/>
-              <a:t>What are the final values for A, B, and C?</a:t>
+              <a:rPr lang="en" b="1"/>
+              <a:t>Advanced Concept:</a:t>
             </a:r>
-          </a:p>
-          <a:p>
-            <a:pPr marL="0" lvl="0" indent="0" algn="l" rtl="0">
-              <a:spcBef>
-                <a:spcPts val="0"/>
-              </a:spcBef>
-              <a:spcAft>
-                <a:spcPts val="0"/>
-              </a:spcAft>
-              <a:buNone/>
-            </a:pPr>
-            <a:endParaRPr lang="en" b="1" dirty="0"/>
-          </a:p>
-          <a:p>
-            <a:pPr marL="0" lvl="0" indent="0" algn="l" rtl="0">
-              <a:spcBef>
-                <a:spcPts val="0"/>
-              </a:spcBef>
-              <a:spcAft>
-                <a:spcPts val="0"/>
-              </a:spcAft>
-              <a:buNone/>
-            </a:pPr>
+            <a:br>
+              <a:rPr lang="en" b="1"/>
+            </a:br>
             <a:r>
-              <a:rPr lang="en" b="1" dirty="0"/>
-              <a:t>What happens if A is double instead of int?</a:t>
+              <a:rPr lang="en"/>
+              <a:t>puppyCounter (and others) follow “camel case” a naming convention that capitalizes every word after the first - very common for java programs. </a:t>
             </a:r>
-          </a:p>
-          <a:p>
-            <a:pPr marL="0" lvl="0" indent="0" algn="l" rtl="0">
-              <a:spcBef>
-                <a:spcPts val="0"/>
-              </a:spcBef>
-              <a:spcAft>
-                <a:spcPts val="0"/>
-              </a:spcAft>
-              <a:buNone/>
-            </a:pPr>
-            <a:endParaRPr lang="en" b="1" dirty="0"/>
-          </a:p>
-          <a:p>
-            <a:pPr marL="0" lvl="0" indent="0" algn="l" rtl="0">
-              <a:spcBef>
-                <a:spcPts val="0"/>
-              </a:spcBef>
-              <a:spcAft>
-                <a:spcPts val="0"/>
-              </a:spcAft>
-              <a:buNone/>
-            </a:pPr>
-            <a:r>
-              <a:rPr lang="en" b="1" dirty="0"/>
-              <a:t>What happens if A and B are double instead of int?</a:t>
-            </a:r>
-          </a:p>
-          <a:p>
-            <a:pPr marL="0" lvl="0" indent="0" algn="l" rtl="0">
-              <a:spcBef>
-                <a:spcPts val="0"/>
-              </a:spcBef>
-              <a:spcAft>
-                <a:spcPts val="0"/>
-              </a:spcAft>
-              <a:buNone/>
-            </a:pPr>
-            <a:endParaRPr dirty="0"/>
+            <a:endParaRPr/>
           </a:p>
         </p:txBody>
       </p:sp>
     </p:spTree>
-    <p:extLst>
-      <p:ext uri="{BB962C8B-B14F-4D97-AF65-F5344CB8AC3E}">
-        <p14:creationId xmlns:p14="http://schemas.microsoft.com/office/powerpoint/2010/main" val="621376379"/>
-      </p:ext>
-    </p:extLst>
   </p:cSld>
   <p:clrMapOvr>
     <a:masterClrMapping/>
@@ -17252,1130 +17520,6 @@
   <p:cSld>
     <p:spTree>
       <p:nvGrpSpPr>
-        <p:cNvPr id="1" name="Shape 203"/>
-        <p:cNvGrpSpPr/>
-        <p:nvPr/>
-      </p:nvGrpSpPr>
-      <p:grpSpPr>
-        <a:xfrm>
-          <a:off x="0" y="0"/>
-          <a:ext cx="0" cy="0"/>
-          <a:chOff x="0" y="0"/>
-          <a:chExt cx="0" cy="0"/>
-        </a:xfrm>
-      </p:grpSpPr>
-      <p:sp>
-        <p:nvSpPr>
-          <p:cNvPr id="204" name="Google Shape;204;p42"/>
-          <p:cNvSpPr txBox="1">
-            <a:spLocks noGrp="1"/>
-          </p:cNvSpPr>
-          <p:nvPr>
-            <p:ph type="title"/>
-          </p:nvPr>
-        </p:nvSpPr>
-        <p:spPr>
-          <a:xfrm>
-            <a:off x="415638" y="599068"/>
-            <a:ext cx="8312700" cy="672000"/>
-          </a:xfrm>
-          <a:prstGeom prst="rect">
-            <a:avLst/>
-          </a:prstGeom>
-        </p:spPr>
-        <p:txBody>
-          <a:bodyPr spcFirstLastPara="1" wrap="square" lIns="60500" tIns="60500" rIns="60500" bIns="60500" anchor="b" anchorCtr="0">
-            <a:noAutofit/>
-          </a:bodyPr>
-          <a:lstStyle/>
-          <a:p>
-            <a:pPr marL="0" lvl="0" indent="0" algn="l" rtl="0">
-              <a:spcBef>
-                <a:spcPts val="0"/>
-              </a:spcBef>
-              <a:spcAft>
-                <a:spcPts val="0"/>
-              </a:spcAft>
-              <a:buNone/>
-            </a:pPr>
-            <a:r>
-              <a:rPr lang="en"/>
-              <a:t>Operators</a:t>
-            </a:r>
-            <a:endParaRPr/>
-          </a:p>
-        </p:txBody>
-      </p:sp>
-      <p:sp>
-        <p:nvSpPr>
-          <p:cNvPr id="205" name="Google Shape;205;p42"/>
-          <p:cNvSpPr txBox="1">
-            <a:spLocks noGrp="1"/>
-          </p:cNvSpPr>
-          <p:nvPr>
-            <p:ph type="body" idx="1"/>
-          </p:nvPr>
-        </p:nvSpPr>
-        <p:spPr>
-          <a:xfrm>
-            <a:off x="415650" y="1388358"/>
-            <a:ext cx="8312700" cy="2932500"/>
-          </a:xfrm>
-          <a:prstGeom prst="rect">
-            <a:avLst/>
-          </a:prstGeom>
-        </p:spPr>
-        <p:txBody>
-          <a:bodyPr spcFirstLastPara="1" wrap="square" lIns="60500" tIns="60500" rIns="60500" bIns="60500" anchor="t" anchorCtr="0">
-            <a:noAutofit/>
-          </a:bodyPr>
-          <a:lstStyle/>
-          <a:p>
-            <a:pPr marL="457200" lvl="0" indent="-304800" algn="l" rtl="0">
-              <a:spcBef>
-                <a:spcPts val="400"/>
-              </a:spcBef>
-              <a:spcAft>
-                <a:spcPts val="0"/>
-              </a:spcAft>
-              <a:buClr>
-                <a:srgbClr val="000000"/>
-              </a:buClr>
-              <a:buSzPts val="1200"/>
-              <a:buChar char="●"/>
-            </a:pPr>
-            <a:r>
-              <a:rPr lang="en" dirty="0">
-                <a:solidFill>
-                  <a:srgbClr val="000000"/>
-                </a:solidFill>
-              </a:rPr>
-              <a:t>Operators are MATH</a:t>
-            </a:r>
-            <a:endParaRPr dirty="0">
-              <a:solidFill>
-                <a:srgbClr val="000000"/>
-              </a:solidFill>
-            </a:endParaRPr>
-          </a:p>
-          <a:p>
-            <a:pPr marL="914400" lvl="1" indent="-298450" algn="l" rtl="0">
-              <a:spcBef>
-                <a:spcPts val="0"/>
-              </a:spcBef>
-              <a:spcAft>
-                <a:spcPts val="0"/>
-              </a:spcAft>
-              <a:buClr>
-                <a:srgbClr val="000000"/>
-              </a:buClr>
-              <a:buSzPts val="1100"/>
-              <a:buChar char="○"/>
-            </a:pPr>
-            <a:r>
-              <a:rPr lang="en" dirty="0">
-                <a:solidFill>
-                  <a:srgbClr val="000000"/>
-                </a:solidFill>
-              </a:rPr>
-              <a:t>= (assignment)	</a:t>
-            </a:r>
-            <a:endParaRPr dirty="0">
-              <a:solidFill>
-                <a:srgbClr val="000000"/>
-              </a:solidFill>
-            </a:endParaRPr>
-          </a:p>
-          <a:p>
-            <a:pPr marL="914400" lvl="1" indent="-298450" algn="l" rtl="0">
-              <a:spcBef>
-                <a:spcPts val="0"/>
-              </a:spcBef>
-              <a:spcAft>
-                <a:spcPts val="0"/>
-              </a:spcAft>
-              <a:buClr>
-                <a:srgbClr val="000000"/>
-              </a:buClr>
-              <a:buSzPts val="1100"/>
-              <a:buChar char="○"/>
-            </a:pPr>
-            <a:r>
-              <a:rPr lang="en" dirty="0">
-                <a:solidFill>
-                  <a:srgbClr val="000000"/>
-                </a:solidFill>
-              </a:rPr>
-              <a:t>+ (add)</a:t>
-            </a:r>
-            <a:endParaRPr dirty="0">
-              <a:solidFill>
-                <a:srgbClr val="000000"/>
-              </a:solidFill>
-            </a:endParaRPr>
-          </a:p>
-          <a:p>
-            <a:pPr marL="914400" lvl="1" indent="-298450" algn="l" rtl="0">
-              <a:spcBef>
-                <a:spcPts val="0"/>
-              </a:spcBef>
-              <a:spcAft>
-                <a:spcPts val="0"/>
-              </a:spcAft>
-              <a:buClr>
-                <a:srgbClr val="000000"/>
-              </a:buClr>
-              <a:buSzPts val="1100"/>
-              <a:buChar char="○"/>
-            </a:pPr>
-            <a:r>
-              <a:rPr lang="en" dirty="0">
-                <a:solidFill>
-                  <a:srgbClr val="000000"/>
-                </a:solidFill>
-              </a:rPr>
-              <a:t>- (subtract or negative)</a:t>
-            </a:r>
-            <a:endParaRPr dirty="0">
-              <a:solidFill>
-                <a:srgbClr val="000000"/>
-              </a:solidFill>
-            </a:endParaRPr>
-          </a:p>
-          <a:p>
-            <a:pPr marL="914400" lvl="1" indent="-298450" algn="l" rtl="0">
-              <a:spcBef>
-                <a:spcPts val="0"/>
-              </a:spcBef>
-              <a:spcAft>
-                <a:spcPts val="0"/>
-              </a:spcAft>
-              <a:buClr>
-                <a:srgbClr val="000000"/>
-              </a:buClr>
-              <a:buSzPts val="1100"/>
-              <a:buChar char="○"/>
-            </a:pPr>
-            <a:r>
-              <a:rPr lang="en" dirty="0">
-                <a:solidFill>
-                  <a:srgbClr val="000000"/>
-                </a:solidFill>
-              </a:rPr>
-              <a:t>/ (divide)</a:t>
-            </a:r>
-            <a:endParaRPr dirty="0">
-              <a:solidFill>
-                <a:srgbClr val="000000"/>
-              </a:solidFill>
-            </a:endParaRPr>
-          </a:p>
-          <a:p>
-            <a:pPr marL="914400" lvl="1" indent="-298450" algn="l" rtl="0">
-              <a:spcBef>
-                <a:spcPts val="0"/>
-              </a:spcBef>
-              <a:spcAft>
-                <a:spcPts val="0"/>
-              </a:spcAft>
-              <a:buClr>
-                <a:srgbClr val="000000"/>
-              </a:buClr>
-              <a:buSzPts val="1100"/>
-              <a:buChar char="○"/>
-            </a:pPr>
-            <a:r>
-              <a:rPr lang="en" dirty="0">
-                <a:solidFill>
-                  <a:srgbClr val="000000"/>
-                </a:solidFill>
-              </a:rPr>
-              <a:t>* (multiply) </a:t>
-            </a:r>
-            <a:endParaRPr dirty="0">
-              <a:solidFill>
-                <a:srgbClr val="000000"/>
-              </a:solidFill>
-            </a:endParaRPr>
-          </a:p>
-          <a:p>
-            <a:pPr marL="457200" lvl="0" indent="-304800" algn="l" rtl="0">
-              <a:spcBef>
-                <a:spcPts val="0"/>
-              </a:spcBef>
-              <a:spcAft>
-                <a:spcPts val="0"/>
-              </a:spcAft>
-              <a:buClr>
-                <a:srgbClr val="000000"/>
-              </a:buClr>
-              <a:buSzPts val="1200"/>
-              <a:buChar char="●"/>
-            </a:pPr>
-            <a:r>
-              <a:rPr lang="en" dirty="0">
-                <a:solidFill>
-                  <a:srgbClr val="000000"/>
-                </a:solidFill>
-              </a:rPr>
-              <a:t>Numeric Types</a:t>
-            </a:r>
-            <a:endParaRPr dirty="0">
-              <a:solidFill>
-                <a:srgbClr val="000000"/>
-              </a:solidFill>
-            </a:endParaRPr>
-          </a:p>
-          <a:p>
-            <a:pPr marL="914400" lvl="1" indent="-298450" algn="l" rtl="0">
-              <a:spcBef>
-                <a:spcPts val="0"/>
-              </a:spcBef>
-              <a:spcAft>
-                <a:spcPts val="0"/>
-              </a:spcAft>
-              <a:buClr>
-                <a:srgbClr val="000000"/>
-              </a:buClr>
-              <a:buSzPts val="1100"/>
-              <a:buChar char="○"/>
-            </a:pPr>
-            <a:r>
-              <a:rPr lang="en" dirty="0">
-                <a:solidFill>
-                  <a:srgbClr val="000000"/>
-                </a:solidFill>
-              </a:rPr>
-              <a:t>int - always whole number</a:t>
-            </a:r>
-            <a:endParaRPr dirty="0">
-              <a:solidFill>
-                <a:srgbClr val="000000"/>
-              </a:solidFill>
-            </a:endParaRPr>
-          </a:p>
-          <a:p>
-            <a:pPr marL="914400" lvl="1" indent="-298450" algn="l" rtl="0">
-              <a:spcBef>
-                <a:spcPts val="0"/>
-              </a:spcBef>
-              <a:spcAft>
-                <a:spcPts val="0"/>
-              </a:spcAft>
-              <a:buClr>
-                <a:srgbClr val="000000"/>
-              </a:buClr>
-              <a:buSzPts val="1100"/>
-              <a:buFont typeface="Consolas"/>
-              <a:buChar char="○"/>
-            </a:pPr>
-            <a:r>
-              <a:rPr lang="en" dirty="0">
-                <a:solidFill>
-                  <a:srgbClr val="000000"/>
-                </a:solidFill>
-                <a:latin typeface="Consolas"/>
-                <a:ea typeface="Consolas"/>
-                <a:cs typeface="Consolas"/>
-                <a:sym typeface="Consolas"/>
-              </a:rPr>
-              <a:t>int </a:t>
-            </a:r>
-            <a:r>
-              <a:rPr lang="en" dirty="0" err="1">
-                <a:solidFill>
-                  <a:srgbClr val="000000"/>
-                </a:solidFill>
-                <a:latin typeface="Consolas"/>
-                <a:ea typeface="Consolas"/>
-                <a:cs typeface="Consolas"/>
-                <a:sym typeface="Consolas"/>
-              </a:rPr>
-              <a:t>myVal</a:t>
-            </a:r>
-            <a:r>
-              <a:rPr lang="en" dirty="0">
-                <a:solidFill>
-                  <a:srgbClr val="000000"/>
-                </a:solidFill>
-                <a:latin typeface="Consolas"/>
-                <a:ea typeface="Consolas"/>
-                <a:cs typeface="Consolas"/>
-                <a:sym typeface="Consolas"/>
-              </a:rPr>
-              <a:t> = 1 / 2; // evaluates to 0!</a:t>
-            </a:r>
-            <a:endParaRPr dirty="0">
-              <a:solidFill>
-                <a:srgbClr val="000000"/>
-              </a:solidFill>
-              <a:latin typeface="Consolas"/>
-              <a:ea typeface="Consolas"/>
-              <a:cs typeface="Consolas"/>
-              <a:sym typeface="Consolas"/>
-            </a:endParaRPr>
-          </a:p>
-          <a:p>
-            <a:pPr marL="914400" lvl="1" indent="-298450" algn="l" rtl="0">
-              <a:spcBef>
-                <a:spcPts val="0"/>
-              </a:spcBef>
-              <a:spcAft>
-                <a:spcPts val="0"/>
-              </a:spcAft>
-              <a:buClr>
-                <a:srgbClr val="000000"/>
-              </a:buClr>
-              <a:buSzPts val="1100"/>
-              <a:buChar char="○"/>
-            </a:pPr>
-            <a:r>
-              <a:rPr lang="en" dirty="0">
-                <a:solidFill>
-                  <a:srgbClr val="000000"/>
-                </a:solidFill>
-              </a:rPr>
-              <a:t>double - has decimals</a:t>
-            </a:r>
-            <a:endParaRPr dirty="0">
-              <a:solidFill>
-                <a:srgbClr val="000000"/>
-              </a:solidFill>
-            </a:endParaRPr>
-          </a:p>
-          <a:p>
-            <a:pPr marL="914400" lvl="1" indent="-298450" algn="l" rtl="0">
-              <a:spcBef>
-                <a:spcPts val="0"/>
-              </a:spcBef>
-              <a:spcAft>
-                <a:spcPts val="0"/>
-              </a:spcAft>
-              <a:buClr>
-                <a:srgbClr val="000000"/>
-              </a:buClr>
-              <a:buSzPts val="1100"/>
-              <a:buFont typeface="Consolas"/>
-              <a:buChar char="○"/>
-            </a:pPr>
-            <a:r>
-              <a:rPr lang="en" dirty="0">
-                <a:solidFill>
-                  <a:srgbClr val="000000"/>
-                </a:solidFill>
-                <a:latin typeface="Consolas"/>
-                <a:ea typeface="Consolas"/>
-                <a:cs typeface="Consolas"/>
-                <a:sym typeface="Consolas"/>
-              </a:rPr>
-              <a:t>double </a:t>
-            </a:r>
-            <a:r>
-              <a:rPr lang="en" dirty="0" err="1">
-                <a:solidFill>
-                  <a:srgbClr val="000000"/>
-                </a:solidFill>
-                <a:latin typeface="Consolas"/>
-                <a:ea typeface="Consolas"/>
-                <a:cs typeface="Consolas"/>
-                <a:sym typeface="Consolas"/>
-              </a:rPr>
-              <a:t>doubleVal</a:t>
-            </a:r>
-            <a:r>
-              <a:rPr lang="en" dirty="0">
-                <a:solidFill>
-                  <a:srgbClr val="000000"/>
-                </a:solidFill>
-                <a:latin typeface="Consolas"/>
-                <a:ea typeface="Consolas"/>
-                <a:cs typeface="Consolas"/>
-                <a:sym typeface="Consolas"/>
-              </a:rPr>
-              <a:t> = 1.0 / 2; // evaluates to 0.5! </a:t>
-            </a:r>
-            <a:endParaRPr dirty="0">
-              <a:solidFill>
-                <a:srgbClr val="000000"/>
-              </a:solidFill>
-              <a:latin typeface="Consolas"/>
-              <a:ea typeface="Consolas"/>
-              <a:cs typeface="Consolas"/>
-              <a:sym typeface="Consolas"/>
-            </a:endParaRPr>
-          </a:p>
-          <a:p>
-            <a:pPr marL="0" lvl="0" indent="0" algn="l" rtl="0">
-              <a:spcBef>
-                <a:spcPts val="400"/>
-              </a:spcBef>
-              <a:spcAft>
-                <a:spcPts val="0"/>
-              </a:spcAft>
-              <a:buNone/>
-            </a:pPr>
-            <a:endParaRPr dirty="0">
-              <a:solidFill>
-                <a:srgbClr val="000000"/>
-              </a:solidFill>
-            </a:endParaRPr>
-          </a:p>
-          <a:p>
-            <a:pPr marL="0" lvl="0" indent="0" algn="l" rtl="0">
-              <a:spcBef>
-                <a:spcPts val="400"/>
-              </a:spcBef>
-              <a:spcAft>
-                <a:spcPts val="400"/>
-              </a:spcAft>
-              <a:buNone/>
-            </a:pPr>
-            <a:endParaRPr dirty="0">
-              <a:solidFill>
-                <a:srgbClr val="000000"/>
-              </a:solidFill>
-            </a:endParaRPr>
-          </a:p>
-        </p:txBody>
-      </p:sp>
-    </p:spTree>
-  </p:cSld>
-  <p:clrMapOvr>
-    <a:masterClrMapping/>
-  </p:clrMapOvr>
-</p:sld>
-</file>
-
-<file path=ppt/slides/slide8.xml><?xml version="1.0" encoding="utf-8"?>
-<p:sld xmlns:a="http://schemas.openxmlformats.org/drawingml/2006/main" xmlns:r="http://schemas.openxmlformats.org/officeDocument/2006/relationships" xmlns:p="http://schemas.openxmlformats.org/presentationml/2006/main">
-  <p:cSld>
-    <p:spTree>
-      <p:nvGrpSpPr>
-        <p:cNvPr id="1" name="Shape 209"/>
-        <p:cNvGrpSpPr/>
-        <p:nvPr/>
-      </p:nvGrpSpPr>
-      <p:grpSpPr>
-        <a:xfrm>
-          <a:off x="0" y="0"/>
-          <a:ext cx="0" cy="0"/>
-          <a:chOff x="0" y="0"/>
-          <a:chExt cx="0" cy="0"/>
-        </a:xfrm>
-      </p:grpSpPr>
-      <p:sp>
-        <p:nvSpPr>
-          <p:cNvPr id="210" name="Google Shape;210;p43"/>
-          <p:cNvSpPr txBox="1">
-            <a:spLocks noGrp="1"/>
-          </p:cNvSpPr>
-          <p:nvPr>
-            <p:ph type="title"/>
-          </p:nvPr>
-        </p:nvSpPr>
-        <p:spPr>
-          <a:xfrm>
-            <a:off x="415638" y="329368"/>
-            <a:ext cx="8312700" cy="672000"/>
-          </a:xfrm>
-          <a:prstGeom prst="rect">
-            <a:avLst/>
-          </a:prstGeom>
-        </p:spPr>
-        <p:txBody>
-          <a:bodyPr spcFirstLastPara="1" wrap="square" lIns="60500" tIns="60500" rIns="60500" bIns="60500" anchor="b" anchorCtr="0">
-            <a:noAutofit/>
-          </a:bodyPr>
-          <a:lstStyle/>
-          <a:p>
-            <a:pPr marL="0" lvl="0" indent="0" algn="l" rtl="0">
-              <a:spcBef>
-                <a:spcPts val="0"/>
-              </a:spcBef>
-              <a:spcAft>
-                <a:spcPts val="0"/>
-              </a:spcAft>
-              <a:buNone/>
-            </a:pPr>
-            <a:r>
-              <a:rPr lang="en" dirty="0"/>
-              <a:t>Examples</a:t>
-            </a:r>
-            <a:endParaRPr dirty="0"/>
-          </a:p>
-        </p:txBody>
-      </p:sp>
-      <p:sp>
-        <p:nvSpPr>
-          <p:cNvPr id="211" name="Google Shape;211;p43"/>
-          <p:cNvSpPr txBox="1">
-            <a:spLocks noGrp="1"/>
-          </p:cNvSpPr>
-          <p:nvPr>
-            <p:ph type="body" idx="1"/>
-          </p:nvPr>
-        </p:nvSpPr>
-        <p:spPr>
-          <a:xfrm>
-            <a:off x="415650" y="1001375"/>
-            <a:ext cx="8312700" cy="2967000"/>
-          </a:xfrm>
-          <a:prstGeom prst="rect">
-            <a:avLst/>
-          </a:prstGeom>
-        </p:spPr>
-        <p:txBody>
-          <a:bodyPr spcFirstLastPara="1" wrap="square" lIns="60500" tIns="60500" rIns="60500" bIns="60500" anchor="t" anchorCtr="0">
-            <a:noAutofit/>
-          </a:bodyPr>
-          <a:lstStyle/>
-          <a:p>
-            <a:pPr marL="0" lvl="0" indent="0" algn="l" rtl="0">
-              <a:spcBef>
-                <a:spcPts val="400"/>
-              </a:spcBef>
-              <a:spcAft>
-                <a:spcPts val="0"/>
-              </a:spcAft>
-              <a:buNone/>
-            </a:pPr>
-            <a:r>
-              <a:rPr lang="en" dirty="0">
-                <a:solidFill>
-                  <a:srgbClr val="000000"/>
-                </a:solidFill>
-                <a:latin typeface="Consolas"/>
-                <a:ea typeface="Consolas"/>
-                <a:cs typeface="Consolas"/>
-                <a:sym typeface="Consolas"/>
-              </a:rPr>
-              <a:t>int </a:t>
-            </a:r>
-            <a:r>
-              <a:rPr lang="en" dirty="0" err="1">
-                <a:solidFill>
-                  <a:srgbClr val="000000"/>
-                </a:solidFill>
-                <a:latin typeface="Consolas"/>
-                <a:ea typeface="Consolas"/>
-                <a:cs typeface="Consolas"/>
-                <a:sym typeface="Consolas"/>
-              </a:rPr>
-              <a:t>puppyCounter</a:t>
-            </a:r>
-            <a:r>
-              <a:rPr lang="en" dirty="0">
-                <a:solidFill>
-                  <a:srgbClr val="000000"/>
-                </a:solidFill>
-                <a:latin typeface="Consolas"/>
-                <a:ea typeface="Consolas"/>
-                <a:cs typeface="Consolas"/>
-                <a:sym typeface="Consolas"/>
-              </a:rPr>
-              <a:t> = 100; // so many puppies!</a:t>
-            </a:r>
-            <a:endParaRPr dirty="0">
-              <a:solidFill>
-                <a:srgbClr val="000000"/>
-              </a:solidFill>
-              <a:latin typeface="Consolas"/>
-              <a:ea typeface="Consolas"/>
-              <a:cs typeface="Consolas"/>
-              <a:sym typeface="Consolas"/>
-            </a:endParaRPr>
-          </a:p>
-          <a:p>
-            <a:pPr marL="0" lvl="0" indent="0" algn="l" rtl="0">
-              <a:spcBef>
-                <a:spcPts val="400"/>
-              </a:spcBef>
-              <a:spcAft>
-                <a:spcPts val="0"/>
-              </a:spcAft>
-              <a:buNone/>
-            </a:pPr>
-            <a:endParaRPr lang="en" dirty="0">
-              <a:solidFill>
-                <a:srgbClr val="000000"/>
-              </a:solidFill>
-              <a:latin typeface="Consolas"/>
-              <a:ea typeface="Consolas"/>
-              <a:cs typeface="Consolas"/>
-              <a:sym typeface="Consolas"/>
-            </a:endParaRPr>
-          </a:p>
-          <a:p>
-            <a:pPr marL="0" lvl="0" indent="0" algn="l" rtl="0">
-              <a:spcBef>
-                <a:spcPts val="400"/>
-              </a:spcBef>
-              <a:spcAft>
-                <a:spcPts val="0"/>
-              </a:spcAft>
-              <a:buNone/>
-            </a:pPr>
-            <a:r>
-              <a:rPr lang="en" dirty="0">
-                <a:solidFill>
-                  <a:srgbClr val="000000"/>
-                </a:solidFill>
-                <a:latin typeface="Consolas"/>
-                <a:ea typeface="Consolas"/>
-                <a:cs typeface="Consolas"/>
-                <a:sym typeface="Consolas"/>
-              </a:rPr>
-              <a:t>String </a:t>
-            </a:r>
-            <a:r>
-              <a:rPr lang="en" dirty="0" err="1">
-                <a:solidFill>
-                  <a:srgbClr val="000000"/>
-                </a:solidFill>
-                <a:latin typeface="Consolas"/>
-                <a:ea typeface="Consolas"/>
-                <a:cs typeface="Consolas"/>
-                <a:sym typeface="Consolas"/>
-              </a:rPr>
-              <a:t>puppyName</a:t>
-            </a:r>
-            <a:r>
-              <a:rPr lang="en" dirty="0">
-                <a:solidFill>
-                  <a:srgbClr val="000000"/>
-                </a:solidFill>
-                <a:latin typeface="Consolas"/>
-                <a:ea typeface="Consolas"/>
-                <a:cs typeface="Consolas"/>
-                <a:sym typeface="Consolas"/>
-              </a:rPr>
-              <a:t> = “Spot”; </a:t>
-            </a:r>
-            <a:endParaRPr dirty="0">
-              <a:solidFill>
-                <a:srgbClr val="000000"/>
-              </a:solidFill>
-              <a:latin typeface="Consolas"/>
-              <a:ea typeface="Consolas"/>
-              <a:cs typeface="Consolas"/>
-              <a:sym typeface="Consolas"/>
-            </a:endParaRPr>
-          </a:p>
-          <a:p>
-            <a:pPr marL="0" lvl="0" indent="0" algn="l" rtl="0">
-              <a:spcBef>
-                <a:spcPts val="400"/>
-              </a:spcBef>
-              <a:spcAft>
-                <a:spcPts val="0"/>
-              </a:spcAft>
-              <a:buNone/>
-            </a:pPr>
-            <a:r>
-              <a:rPr lang="en" dirty="0">
-                <a:solidFill>
-                  <a:srgbClr val="000000"/>
-                </a:solidFill>
-                <a:latin typeface="Consolas"/>
-                <a:ea typeface="Consolas"/>
-                <a:cs typeface="Consolas"/>
-                <a:sym typeface="Consolas"/>
-              </a:rPr>
-              <a:t>String </a:t>
-            </a:r>
-            <a:r>
-              <a:rPr lang="en" dirty="0" err="1">
-                <a:solidFill>
-                  <a:srgbClr val="000000"/>
-                </a:solidFill>
-                <a:latin typeface="Consolas"/>
-                <a:ea typeface="Consolas"/>
-                <a:cs typeface="Consolas"/>
-                <a:sym typeface="Consolas"/>
-              </a:rPr>
-              <a:t>puppyLongName</a:t>
-            </a:r>
-            <a:r>
-              <a:rPr lang="en" dirty="0">
-                <a:solidFill>
-                  <a:srgbClr val="000000"/>
-                </a:solidFill>
-                <a:latin typeface="Consolas"/>
-                <a:ea typeface="Consolas"/>
-                <a:cs typeface="Consolas"/>
-                <a:sym typeface="Consolas"/>
-              </a:rPr>
-              <a:t> = “Cerberus”;</a:t>
-            </a:r>
-            <a:endParaRPr dirty="0">
-              <a:solidFill>
-                <a:srgbClr val="000000"/>
-              </a:solidFill>
-              <a:latin typeface="Consolas"/>
-              <a:ea typeface="Consolas"/>
-              <a:cs typeface="Consolas"/>
-              <a:sym typeface="Consolas"/>
-            </a:endParaRPr>
-          </a:p>
-          <a:p>
-            <a:pPr marL="0" lvl="0" indent="0" algn="l" rtl="0">
-              <a:spcBef>
-                <a:spcPts val="400"/>
-              </a:spcBef>
-              <a:spcAft>
-                <a:spcPts val="0"/>
-              </a:spcAft>
-              <a:buNone/>
-            </a:pPr>
-            <a:endParaRPr dirty="0">
-              <a:solidFill>
-                <a:srgbClr val="000000"/>
-              </a:solidFill>
-              <a:latin typeface="Consolas"/>
-              <a:ea typeface="Consolas"/>
-              <a:cs typeface="Consolas"/>
-              <a:sym typeface="Consolas"/>
-            </a:endParaRPr>
-          </a:p>
-          <a:p>
-            <a:pPr marL="0" lvl="0" indent="0" algn="l" rtl="0">
-              <a:spcBef>
-                <a:spcPts val="400"/>
-              </a:spcBef>
-              <a:spcAft>
-                <a:spcPts val="0"/>
-              </a:spcAft>
-              <a:buNone/>
-            </a:pPr>
-            <a:r>
-              <a:rPr lang="en" dirty="0">
-                <a:solidFill>
-                  <a:srgbClr val="000000"/>
-                </a:solidFill>
-                <a:latin typeface="Consolas"/>
-                <a:ea typeface="Consolas"/>
-                <a:cs typeface="Consolas"/>
-                <a:sym typeface="Consolas"/>
-              </a:rPr>
-              <a:t>double </a:t>
-            </a:r>
-            <a:r>
-              <a:rPr lang="en" dirty="0" err="1">
-                <a:solidFill>
-                  <a:srgbClr val="000000"/>
-                </a:solidFill>
-                <a:latin typeface="Consolas"/>
-                <a:ea typeface="Consolas"/>
-                <a:cs typeface="Consolas"/>
-                <a:sym typeface="Consolas"/>
-              </a:rPr>
-              <a:t>amountOfFoodPerDayLbs</a:t>
-            </a:r>
-            <a:r>
-              <a:rPr lang="en" dirty="0">
-                <a:solidFill>
-                  <a:srgbClr val="000000"/>
-                </a:solidFill>
-                <a:latin typeface="Consolas"/>
-                <a:ea typeface="Consolas"/>
-                <a:cs typeface="Consolas"/>
-                <a:sym typeface="Consolas"/>
-              </a:rPr>
-              <a:t> = 20.56; </a:t>
-            </a:r>
-            <a:endParaRPr dirty="0">
-              <a:solidFill>
-                <a:srgbClr val="000000"/>
-              </a:solidFill>
-              <a:latin typeface="Consolas"/>
-              <a:ea typeface="Consolas"/>
-              <a:cs typeface="Consolas"/>
-              <a:sym typeface="Consolas"/>
-            </a:endParaRPr>
-          </a:p>
-          <a:p>
-            <a:pPr marL="0" lvl="0" indent="0" algn="l" rtl="0">
-              <a:spcBef>
-                <a:spcPts val="400"/>
-              </a:spcBef>
-              <a:spcAft>
-                <a:spcPts val="0"/>
-              </a:spcAft>
-              <a:buNone/>
-            </a:pPr>
-            <a:r>
-              <a:rPr lang="en" dirty="0" err="1">
-                <a:solidFill>
-                  <a:srgbClr val="000000"/>
-                </a:solidFill>
-                <a:latin typeface="Consolas"/>
-                <a:ea typeface="Consolas"/>
-                <a:cs typeface="Consolas"/>
-                <a:sym typeface="Consolas"/>
-              </a:rPr>
-              <a:t>amountOfFoodPerDayLbs</a:t>
-            </a:r>
-            <a:r>
-              <a:rPr lang="en" dirty="0">
-                <a:solidFill>
-                  <a:srgbClr val="000000"/>
-                </a:solidFill>
-                <a:latin typeface="Consolas"/>
-                <a:ea typeface="Consolas"/>
-                <a:cs typeface="Consolas"/>
-                <a:sym typeface="Consolas"/>
-              </a:rPr>
-              <a:t> = </a:t>
-            </a:r>
-            <a:r>
-              <a:rPr lang="en" dirty="0" err="1">
-                <a:solidFill>
-                  <a:srgbClr val="000000"/>
-                </a:solidFill>
-                <a:latin typeface="Consolas"/>
-                <a:ea typeface="Consolas"/>
-                <a:cs typeface="Consolas"/>
-                <a:sym typeface="Consolas"/>
-              </a:rPr>
-              <a:t>amountOfFoodPerDayLbs</a:t>
-            </a:r>
-            <a:r>
-              <a:rPr lang="en" dirty="0">
-                <a:solidFill>
-                  <a:srgbClr val="000000"/>
-                </a:solidFill>
-                <a:latin typeface="Consolas"/>
-                <a:ea typeface="Consolas"/>
-                <a:cs typeface="Consolas"/>
-                <a:sym typeface="Consolas"/>
-              </a:rPr>
-              <a:t> + 10.0; // assigns 30.56 to the variable</a:t>
-            </a:r>
-            <a:br>
-              <a:rPr lang="en" dirty="0">
-                <a:solidFill>
-                  <a:srgbClr val="000000"/>
-                </a:solidFill>
-                <a:latin typeface="Consolas"/>
-                <a:ea typeface="Consolas"/>
-                <a:cs typeface="Consolas"/>
-                <a:sym typeface="Consolas"/>
-              </a:rPr>
-            </a:br>
-            <a:endParaRPr dirty="0">
-              <a:solidFill>
-                <a:srgbClr val="000000"/>
-              </a:solidFill>
-              <a:latin typeface="Consolas"/>
-              <a:ea typeface="Consolas"/>
-              <a:cs typeface="Consolas"/>
-              <a:sym typeface="Consolas"/>
-            </a:endParaRPr>
-          </a:p>
-          <a:p>
-            <a:pPr marL="0" lvl="0" indent="0" algn="l" rtl="0">
-              <a:spcBef>
-                <a:spcPts val="400"/>
-              </a:spcBef>
-              <a:spcAft>
-                <a:spcPts val="0"/>
-              </a:spcAft>
-              <a:buNone/>
-            </a:pPr>
-            <a:r>
-              <a:rPr lang="en" dirty="0">
-                <a:solidFill>
-                  <a:srgbClr val="000000"/>
-                </a:solidFill>
-                <a:latin typeface="Consolas"/>
-                <a:ea typeface="Consolas"/>
-                <a:cs typeface="Consolas"/>
-                <a:sym typeface="Consolas"/>
-              </a:rPr>
-              <a:t>boolean </a:t>
-            </a:r>
-            <a:r>
-              <a:rPr lang="en" dirty="0" err="1">
-                <a:solidFill>
-                  <a:srgbClr val="000000"/>
-                </a:solidFill>
-                <a:latin typeface="Consolas"/>
-                <a:ea typeface="Consolas"/>
-                <a:cs typeface="Consolas"/>
-                <a:sym typeface="Consolas"/>
-              </a:rPr>
-              <a:t>isPettable</a:t>
-            </a:r>
-            <a:r>
-              <a:rPr lang="en" dirty="0">
-                <a:solidFill>
-                  <a:srgbClr val="000000"/>
-                </a:solidFill>
-                <a:latin typeface="Consolas"/>
-                <a:ea typeface="Consolas"/>
-                <a:cs typeface="Consolas"/>
-                <a:sym typeface="Consolas"/>
-              </a:rPr>
-              <a:t> = true;  // only options for boolean is true or false</a:t>
-            </a:r>
-            <a:endParaRPr dirty="0">
-              <a:solidFill>
-                <a:srgbClr val="000000"/>
-              </a:solidFill>
-              <a:latin typeface="Consolas"/>
-              <a:ea typeface="Consolas"/>
-              <a:cs typeface="Consolas"/>
-              <a:sym typeface="Consolas"/>
-            </a:endParaRPr>
-          </a:p>
-          <a:p>
-            <a:pPr marL="0" lvl="0" indent="0" algn="l" rtl="0">
-              <a:spcBef>
-                <a:spcPts val="400"/>
-              </a:spcBef>
-              <a:spcAft>
-                <a:spcPts val="0"/>
-              </a:spcAft>
-              <a:buNone/>
-            </a:pPr>
-            <a:endParaRPr dirty="0">
-              <a:solidFill>
-                <a:srgbClr val="000000"/>
-              </a:solidFill>
-              <a:latin typeface="Consolas"/>
-              <a:ea typeface="Consolas"/>
-              <a:cs typeface="Consolas"/>
-              <a:sym typeface="Consolas"/>
-            </a:endParaRPr>
-          </a:p>
-          <a:p>
-            <a:pPr marL="0" lvl="0" indent="0" algn="l" rtl="0">
-              <a:spcBef>
-                <a:spcPts val="400"/>
-              </a:spcBef>
-              <a:spcAft>
-                <a:spcPts val="400"/>
-              </a:spcAft>
-              <a:buNone/>
-            </a:pPr>
-            <a:r>
-              <a:rPr lang="en" dirty="0">
-                <a:solidFill>
-                  <a:srgbClr val="000000"/>
-                </a:solidFill>
-                <a:latin typeface="Consolas"/>
-                <a:ea typeface="Consolas"/>
-                <a:cs typeface="Consolas"/>
-                <a:sym typeface="Consolas"/>
-              </a:rPr>
-              <a:t>char </a:t>
-            </a:r>
-            <a:r>
-              <a:rPr lang="en" dirty="0" err="1">
-                <a:solidFill>
-                  <a:srgbClr val="000000"/>
-                </a:solidFill>
-                <a:latin typeface="Consolas"/>
-                <a:ea typeface="Consolas"/>
-                <a:cs typeface="Consolas"/>
-                <a:sym typeface="Consolas"/>
-              </a:rPr>
-              <a:t>singleLetter</a:t>
-            </a:r>
-            <a:r>
-              <a:rPr lang="en" dirty="0">
-                <a:solidFill>
-                  <a:srgbClr val="000000"/>
-                </a:solidFill>
-                <a:latin typeface="Consolas"/>
-                <a:ea typeface="Consolas"/>
-                <a:cs typeface="Consolas"/>
-                <a:sym typeface="Consolas"/>
-              </a:rPr>
-              <a:t> = ‘c’;  //characters are single letters, notice single quote</a:t>
-            </a:r>
-            <a:endParaRPr dirty="0">
-              <a:solidFill>
-                <a:srgbClr val="000000"/>
-              </a:solidFill>
-              <a:latin typeface="Consolas"/>
-              <a:ea typeface="Consolas"/>
-              <a:cs typeface="Consolas"/>
-              <a:sym typeface="Consolas"/>
-            </a:endParaRPr>
-          </a:p>
-        </p:txBody>
-      </p:sp>
-      <p:sp>
-        <p:nvSpPr>
-          <p:cNvPr id="212" name="Google Shape;212;p43"/>
-          <p:cNvSpPr/>
-          <p:nvPr/>
-        </p:nvSpPr>
-        <p:spPr>
-          <a:xfrm>
-            <a:off x="3112950" y="4021850"/>
-            <a:ext cx="5989200" cy="795300"/>
-          </a:xfrm>
-          <a:prstGeom prst="rect">
-            <a:avLst/>
-          </a:prstGeom>
-          <a:solidFill>
-            <a:schemeClr val="lt2"/>
-          </a:solidFill>
-          <a:ln w="9525" cap="flat" cmpd="sng">
-            <a:solidFill>
-              <a:schemeClr val="dk2"/>
-            </a:solidFill>
-            <a:prstDash val="solid"/>
-            <a:round/>
-            <a:headEnd type="none" w="sm" len="sm"/>
-            <a:tailEnd type="none" w="sm" len="sm"/>
-          </a:ln>
-        </p:spPr>
-        <p:txBody>
-          <a:bodyPr spcFirstLastPara="1" wrap="square" lIns="91425" tIns="91425" rIns="91425" bIns="91425" anchor="ctr" anchorCtr="0">
-            <a:noAutofit/>
-          </a:bodyPr>
-          <a:lstStyle/>
-          <a:p>
-            <a:pPr marL="0" lvl="0" indent="0" algn="l" rtl="0">
-              <a:spcBef>
-                <a:spcPts val="0"/>
-              </a:spcBef>
-              <a:spcAft>
-                <a:spcPts val="0"/>
-              </a:spcAft>
-              <a:buNone/>
-            </a:pPr>
-            <a:r>
-              <a:rPr lang="en" b="1"/>
-              <a:t>Advanced Concept:</a:t>
-            </a:r>
-            <a:br>
-              <a:rPr lang="en" b="1"/>
-            </a:br>
-            <a:r>
-              <a:rPr lang="en"/>
-              <a:t>puppyCounter (and others) follow “camel case” a naming convention that capitalizes every word after the first - very common for java programs. </a:t>
-            </a:r>
-            <a:endParaRPr/>
-          </a:p>
-        </p:txBody>
-      </p:sp>
-    </p:spTree>
-  </p:cSld>
-  <p:clrMapOvr>
-    <a:masterClrMapping/>
-  </p:clrMapOvr>
-</p:sld>
-</file>
-
-<file path=ppt/slides/slide9.xml><?xml version="1.0" encoding="utf-8"?>
-<p:sld xmlns:a="http://schemas.openxmlformats.org/drawingml/2006/main" xmlns:r="http://schemas.openxmlformats.org/officeDocument/2006/relationships" xmlns:p="http://schemas.openxmlformats.org/presentationml/2006/main">
-  <p:cSld>
-    <p:spTree>
-      <p:nvGrpSpPr>
         <p:cNvPr id="1" name="Shape 209"/>
         <p:cNvGrpSpPr/>
         <p:nvPr/>
@@ -18853,6 +17997,862 @@
     <p:extLst>
       <p:ext uri="{BB962C8B-B14F-4D97-AF65-F5344CB8AC3E}">
         <p14:creationId xmlns:p14="http://schemas.microsoft.com/office/powerpoint/2010/main" val="4288849530"/>
+      </p:ext>
+    </p:extLst>
+  </p:cSld>
+  <p:clrMapOvr>
+    <a:masterClrMapping/>
+  </p:clrMapOvr>
+</p:sld>
+</file>
+
+<file path=ppt/slides/slide8.xml><?xml version="1.0" encoding="utf-8"?>
+<p:sld xmlns:a="http://schemas.openxmlformats.org/drawingml/2006/main" xmlns:r="http://schemas.openxmlformats.org/officeDocument/2006/relationships" xmlns:p="http://schemas.openxmlformats.org/presentationml/2006/main">
+  <p:cSld>
+    <p:spTree>
+      <p:nvGrpSpPr>
+        <p:cNvPr id="1" name="Shape 203"/>
+        <p:cNvGrpSpPr/>
+        <p:nvPr/>
+      </p:nvGrpSpPr>
+      <p:grpSpPr>
+        <a:xfrm>
+          <a:off x="0" y="0"/>
+          <a:ext cx="0" cy="0"/>
+          <a:chOff x="0" y="0"/>
+          <a:chExt cx="0" cy="0"/>
+        </a:xfrm>
+      </p:grpSpPr>
+      <p:sp>
+        <p:nvSpPr>
+          <p:cNvPr id="204" name="Google Shape;204;p42"/>
+          <p:cNvSpPr txBox="1">
+            <a:spLocks noGrp="1"/>
+          </p:cNvSpPr>
+          <p:nvPr>
+            <p:ph type="title"/>
+          </p:nvPr>
+        </p:nvSpPr>
+        <p:spPr>
+          <a:xfrm>
+            <a:off x="415638" y="599068"/>
+            <a:ext cx="8312700" cy="672000"/>
+          </a:xfrm>
+          <a:prstGeom prst="rect">
+            <a:avLst/>
+          </a:prstGeom>
+        </p:spPr>
+        <p:txBody>
+          <a:bodyPr spcFirstLastPara="1" wrap="square" lIns="60500" tIns="60500" rIns="60500" bIns="60500" anchor="b" anchorCtr="0">
+            <a:noAutofit/>
+          </a:bodyPr>
+          <a:lstStyle/>
+          <a:p>
+            <a:pPr marL="0" lvl="0" indent="0" algn="l" rtl="0">
+              <a:spcBef>
+                <a:spcPts val="0"/>
+              </a:spcBef>
+              <a:spcAft>
+                <a:spcPts val="0"/>
+              </a:spcAft>
+              <a:buNone/>
+            </a:pPr>
+            <a:r>
+              <a:rPr lang="en"/>
+              <a:t>Operators</a:t>
+            </a:r>
+            <a:endParaRPr/>
+          </a:p>
+        </p:txBody>
+      </p:sp>
+      <p:sp>
+        <p:nvSpPr>
+          <p:cNvPr id="205" name="Google Shape;205;p42"/>
+          <p:cNvSpPr txBox="1">
+            <a:spLocks noGrp="1"/>
+          </p:cNvSpPr>
+          <p:nvPr>
+            <p:ph type="body" idx="1"/>
+          </p:nvPr>
+        </p:nvSpPr>
+        <p:spPr>
+          <a:xfrm>
+            <a:off x="415650" y="1388358"/>
+            <a:ext cx="8312700" cy="2932500"/>
+          </a:xfrm>
+          <a:prstGeom prst="rect">
+            <a:avLst/>
+          </a:prstGeom>
+        </p:spPr>
+        <p:txBody>
+          <a:bodyPr spcFirstLastPara="1" wrap="square" lIns="60500" tIns="60500" rIns="60500" bIns="60500" anchor="t" anchorCtr="0">
+            <a:noAutofit/>
+          </a:bodyPr>
+          <a:lstStyle/>
+          <a:p>
+            <a:pPr marL="457200" lvl="0" indent="-304800" algn="l" rtl="0">
+              <a:spcBef>
+                <a:spcPts val="400"/>
+              </a:spcBef>
+              <a:spcAft>
+                <a:spcPts val="0"/>
+              </a:spcAft>
+              <a:buClr>
+                <a:srgbClr val="000000"/>
+              </a:buClr>
+              <a:buSzPts val="1200"/>
+              <a:buChar char="●"/>
+            </a:pPr>
+            <a:r>
+              <a:rPr lang="en" dirty="0">
+                <a:solidFill>
+                  <a:srgbClr val="000000"/>
+                </a:solidFill>
+              </a:rPr>
+              <a:t>Operators are MATH</a:t>
+            </a:r>
+            <a:endParaRPr dirty="0">
+              <a:solidFill>
+                <a:srgbClr val="000000"/>
+              </a:solidFill>
+            </a:endParaRPr>
+          </a:p>
+          <a:p>
+            <a:pPr marL="914400" lvl="1" indent="-298450" algn="l" rtl="0">
+              <a:spcBef>
+                <a:spcPts val="0"/>
+              </a:spcBef>
+              <a:spcAft>
+                <a:spcPts val="0"/>
+              </a:spcAft>
+              <a:buClr>
+                <a:srgbClr val="000000"/>
+              </a:buClr>
+              <a:buSzPts val="1100"/>
+              <a:buChar char="○"/>
+            </a:pPr>
+            <a:r>
+              <a:rPr lang="en" dirty="0">
+                <a:solidFill>
+                  <a:srgbClr val="000000"/>
+                </a:solidFill>
+              </a:rPr>
+              <a:t>= (assignment)	</a:t>
+            </a:r>
+            <a:endParaRPr dirty="0">
+              <a:solidFill>
+                <a:srgbClr val="000000"/>
+              </a:solidFill>
+            </a:endParaRPr>
+          </a:p>
+          <a:p>
+            <a:pPr marL="914400" lvl="1" indent="-298450" algn="l" rtl="0">
+              <a:spcBef>
+                <a:spcPts val="0"/>
+              </a:spcBef>
+              <a:spcAft>
+                <a:spcPts val="0"/>
+              </a:spcAft>
+              <a:buClr>
+                <a:srgbClr val="000000"/>
+              </a:buClr>
+              <a:buSzPts val="1100"/>
+              <a:buChar char="○"/>
+            </a:pPr>
+            <a:r>
+              <a:rPr lang="en" dirty="0">
+                <a:solidFill>
+                  <a:srgbClr val="000000"/>
+                </a:solidFill>
+              </a:rPr>
+              <a:t>+ (add)</a:t>
+            </a:r>
+            <a:endParaRPr dirty="0">
+              <a:solidFill>
+                <a:srgbClr val="000000"/>
+              </a:solidFill>
+            </a:endParaRPr>
+          </a:p>
+          <a:p>
+            <a:pPr marL="914400" lvl="1" indent="-298450" algn="l" rtl="0">
+              <a:spcBef>
+                <a:spcPts val="0"/>
+              </a:spcBef>
+              <a:spcAft>
+                <a:spcPts val="0"/>
+              </a:spcAft>
+              <a:buClr>
+                <a:srgbClr val="000000"/>
+              </a:buClr>
+              <a:buSzPts val="1100"/>
+              <a:buChar char="○"/>
+            </a:pPr>
+            <a:r>
+              <a:rPr lang="en" dirty="0">
+                <a:solidFill>
+                  <a:srgbClr val="000000"/>
+                </a:solidFill>
+              </a:rPr>
+              <a:t>- (subtract or negative)</a:t>
+            </a:r>
+            <a:endParaRPr dirty="0">
+              <a:solidFill>
+                <a:srgbClr val="000000"/>
+              </a:solidFill>
+            </a:endParaRPr>
+          </a:p>
+          <a:p>
+            <a:pPr marL="914400" lvl="1" indent="-298450" algn="l" rtl="0">
+              <a:spcBef>
+                <a:spcPts val="0"/>
+              </a:spcBef>
+              <a:spcAft>
+                <a:spcPts val="0"/>
+              </a:spcAft>
+              <a:buClr>
+                <a:srgbClr val="000000"/>
+              </a:buClr>
+              <a:buSzPts val="1100"/>
+              <a:buChar char="○"/>
+            </a:pPr>
+            <a:r>
+              <a:rPr lang="en" dirty="0">
+                <a:solidFill>
+                  <a:srgbClr val="000000"/>
+                </a:solidFill>
+              </a:rPr>
+              <a:t>/ (divide)</a:t>
+            </a:r>
+            <a:endParaRPr dirty="0">
+              <a:solidFill>
+                <a:srgbClr val="000000"/>
+              </a:solidFill>
+            </a:endParaRPr>
+          </a:p>
+          <a:p>
+            <a:pPr marL="914400" lvl="1" indent="-298450" algn="l" rtl="0">
+              <a:spcBef>
+                <a:spcPts val="0"/>
+              </a:spcBef>
+              <a:spcAft>
+                <a:spcPts val="0"/>
+              </a:spcAft>
+              <a:buClr>
+                <a:srgbClr val="000000"/>
+              </a:buClr>
+              <a:buSzPts val="1100"/>
+              <a:buChar char="○"/>
+            </a:pPr>
+            <a:r>
+              <a:rPr lang="en" dirty="0">
+                <a:solidFill>
+                  <a:srgbClr val="000000"/>
+                </a:solidFill>
+              </a:rPr>
+              <a:t>* (multiply) </a:t>
+            </a:r>
+            <a:endParaRPr dirty="0">
+              <a:solidFill>
+                <a:srgbClr val="000000"/>
+              </a:solidFill>
+            </a:endParaRPr>
+          </a:p>
+          <a:p>
+            <a:pPr marL="457200" lvl="0" indent="-304800" algn="l" rtl="0">
+              <a:spcBef>
+                <a:spcPts val="0"/>
+              </a:spcBef>
+              <a:spcAft>
+                <a:spcPts val="0"/>
+              </a:spcAft>
+              <a:buClr>
+                <a:srgbClr val="000000"/>
+              </a:buClr>
+              <a:buSzPts val="1200"/>
+              <a:buChar char="●"/>
+            </a:pPr>
+            <a:r>
+              <a:rPr lang="en" dirty="0">
+                <a:solidFill>
+                  <a:srgbClr val="000000"/>
+                </a:solidFill>
+              </a:rPr>
+              <a:t>Numeric Types</a:t>
+            </a:r>
+            <a:endParaRPr dirty="0">
+              <a:solidFill>
+                <a:srgbClr val="000000"/>
+              </a:solidFill>
+            </a:endParaRPr>
+          </a:p>
+          <a:p>
+            <a:pPr marL="914400" lvl="1" indent="-298450" algn="l" rtl="0">
+              <a:spcBef>
+                <a:spcPts val="0"/>
+              </a:spcBef>
+              <a:spcAft>
+                <a:spcPts val="0"/>
+              </a:spcAft>
+              <a:buClr>
+                <a:srgbClr val="000000"/>
+              </a:buClr>
+              <a:buSzPts val="1100"/>
+              <a:buChar char="○"/>
+            </a:pPr>
+            <a:r>
+              <a:rPr lang="en" dirty="0">
+                <a:solidFill>
+                  <a:srgbClr val="000000"/>
+                </a:solidFill>
+              </a:rPr>
+              <a:t>int - always whole number</a:t>
+            </a:r>
+            <a:endParaRPr dirty="0">
+              <a:solidFill>
+                <a:srgbClr val="000000"/>
+              </a:solidFill>
+            </a:endParaRPr>
+          </a:p>
+          <a:p>
+            <a:pPr marL="914400" lvl="1" indent="-298450" algn="l" rtl="0">
+              <a:spcBef>
+                <a:spcPts val="0"/>
+              </a:spcBef>
+              <a:spcAft>
+                <a:spcPts val="0"/>
+              </a:spcAft>
+              <a:buClr>
+                <a:srgbClr val="000000"/>
+              </a:buClr>
+              <a:buSzPts val="1100"/>
+              <a:buFont typeface="Consolas"/>
+              <a:buChar char="○"/>
+            </a:pPr>
+            <a:r>
+              <a:rPr lang="en" dirty="0">
+                <a:solidFill>
+                  <a:srgbClr val="000000"/>
+                </a:solidFill>
+                <a:latin typeface="Consolas"/>
+                <a:ea typeface="Consolas"/>
+                <a:cs typeface="Consolas"/>
+                <a:sym typeface="Consolas"/>
+              </a:rPr>
+              <a:t>int </a:t>
+            </a:r>
+            <a:r>
+              <a:rPr lang="en" dirty="0" err="1">
+                <a:solidFill>
+                  <a:srgbClr val="000000"/>
+                </a:solidFill>
+                <a:latin typeface="Consolas"/>
+                <a:ea typeface="Consolas"/>
+                <a:cs typeface="Consolas"/>
+                <a:sym typeface="Consolas"/>
+              </a:rPr>
+              <a:t>myVal</a:t>
+            </a:r>
+            <a:r>
+              <a:rPr lang="en" dirty="0">
+                <a:solidFill>
+                  <a:srgbClr val="000000"/>
+                </a:solidFill>
+                <a:latin typeface="Consolas"/>
+                <a:ea typeface="Consolas"/>
+                <a:cs typeface="Consolas"/>
+                <a:sym typeface="Consolas"/>
+              </a:rPr>
+              <a:t> = 1 / 2; // evaluates to 0!</a:t>
+            </a:r>
+            <a:endParaRPr dirty="0">
+              <a:solidFill>
+                <a:srgbClr val="000000"/>
+              </a:solidFill>
+              <a:latin typeface="Consolas"/>
+              <a:ea typeface="Consolas"/>
+              <a:cs typeface="Consolas"/>
+              <a:sym typeface="Consolas"/>
+            </a:endParaRPr>
+          </a:p>
+          <a:p>
+            <a:pPr marL="914400" lvl="1" indent="-298450" algn="l" rtl="0">
+              <a:spcBef>
+                <a:spcPts val="0"/>
+              </a:spcBef>
+              <a:spcAft>
+                <a:spcPts val="0"/>
+              </a:spcAft>
+              <a:buClr>
+                <a:srgbClr val="000000"/>
+              </a:buClr>
+              <a:buSzPts val="1100"/>
+              <a:buChar char="○"/>
+            </a:pPr>
+            <a:r>
+              <a:rPr lang="en" dirty="0">
+                <a:solidFill>
+                  <a:srgbClr val="000000"/>
+                </a:solidFill>
+              </a:rPr>
+              <a:t>double - has decimals</a:t>
+            </a:r>
+            <a:endParaRPr dirty="0">
+              <a:solidFill>
+                <a:srgbClr val="000000"/>
+              </a:solidFill>
+            </a:endParaRPr>
+          </a:p>
+          <a:p>
+            <a:pPr marL="914400" lvl="1" indent="-298450" algn="l" rtl="0">
+              <a:spcBef>
+                <a:spcPts val="0"/>
+              </a:spcBef>
+              <a:spcAft>
+                <a:spcPts val="0"/>
+              </a:spcAft>
+              <a:buClr>
+                <a:srgbClr val="000000"/>
+              </a:buClr>
+              <a:buSzPts val="1100"/>
+              <a:buFont typeface="Consolas"/>
+              <a:buChar char="○"/>
+            </a:pPr>
+            <a:r>
+              <a:rPr lang="en" dirty="0">
+                <a:solidFill>
+                  <a:srgbClr val="000000"/>
+                </a:solidFill>
+                <a:latin typeface="Consolas"/>
+                <a:ea typeface="Consolas"/>
+                <a:cs typeface="Consolas"/>
+                <a:sym typeface="Consolas"/>
+              </a:rPr>
+              <a:t>double </a:t>
+            </a:r>
+            <a:r>
+              <a:rPr lang="en" dirty="0" err="1">
+                <a:solidFill>
+                  <a:srgbClr val="000000"/>
+                </a:solidFill>
+                <a:latin typeface="Consolas"/>
+                <a:ea typeface="Consolas"/>
+                <a:cs typeface="Consolas"/>
+                <a:sym typeface="Consolas"/>
+              </a:rPr>
+              <a:t>doubleVal</a:t>
+            </a:r>
+            <a:r>
+              <a:rPr lang="en" dirty="0">
+                <a:solidFill>
+                  <a:srgbClr val="000000"/>
+                </a:solidFill>
+                <a:latin typeface="Consolas"/>
+                <a:ea typeface="Consolas"/>
+                <a:cs typeface="Consolas"/>
+                <a:sym typeface="Consolas"/>
+              </a:rPr>
+              <a:t> = 1.0 / 2; // evaluates to 0.5! </a:t>
+            </a:r>
+            <a:endParaRPr dirty="0">
+              <a:solidFill>
+                <a:srgbClr val="000000"/>
+              </a:solidFill>
+              <a:latin typeface="Consolas"/>
+              <a:ea typeface="Consolas"/>
+              <a:cs typeface="Consolas"/>
+              <a:sym typeface="Consolas"/>
+            </a:endParaRPr>
+          </a:p>
+          <a:p>
+            <a:pPr marL="0" lvl="0" indent="0" algn="l" rtl="0">
+              <a:spcBef>
+                <a:spcPts val="400"/>
+              </a:spcBef>
+              <a:spcAft>
+                <a:spcPts val="0"/>
+              </a:spcAft>
+              <a:buNone/>
+            </a:pPr>
+            <a:endParaRPr dirty="0">
+              <a:solidFill>
+                <a:srgbClr val="000000"/>
+              </a:solidFill>
+            </a:endParaRPr>
+          </a:p>
+          <a:p>
+            <a:pPr marL="0" lvl="0" indent="0" algn="l" rtl="0">
+              <a:spcBef>
+                <a:spcPts val="400"/>
+              </a:spcBef>
+              <a:spcAft>
+                <a:spcPts val="400"/>
+              </a:spcAft>
+              <a:buNone/>
+            </a:pPr>
+            <a:endParaRPr dirty="0">
+              <a:solidFill>
+                <a:srgbClr val="000000"/>
+              </a:solidFill>
+            </a:endParaRPr>
+          </a:p>
+        </p:txBody>
+      </p:sp>
+    </p:spTree>
+  </p:cSld>
+  <p:clrMapOvr>
+    <a:masterClrMapping/>
+  </p:clrMapOvr>
+</p:sld>
+</file>
+
+<file path=ppt/slides/slide9.xml><?xml version="1.0" encoding="utf-8"?>
+<p:sld xmlns:a="http://schemas.openxmlformats.org/drawingml/2006/main" xmlns:r="http://schemas.openxmlformats.org/officeDocument/2006/relationships" xmlns:p="http://schemas.openxmlformats.org/presentationml/2006/main">
+  <p:cSld>
+    <p:spTree>
+      <p:nvGrpSpPr>
+        <p:cNvPr id="1" name="Shape 209"/>
+        <p:cNvGrpSpPr/>
+        <p:nvPr/>
+      </p:nvGrpSpPr>
+      <p:grpSpPr>
+        <a:xfrm>
+          <a:off x="0" y="0"/>
+          <a:ext cx="0" cy="0"/>
+          <a:chOff x="0" y="0"/>
+          <a:chExt cx="0" cy="0"/>
+        </a:xfrm>
+      </p:grpSpPr>
+      <p:sp>
+        <p:nvSpPr>
+          <p:cNvPr id="210" name="Google Shape;210;p43"/>
+          <p:cNvSpPr txBox="1">
+            <a:spLocks noGrp="1"/>
+          </p:cNvSpPr>
+          <p:nvPr>
+            <p:ph type="title"/>
+          </p:nvPr>
+        </p:nvSpPr>
+        <p:spPr>
+          <a:xfrm>
+            <a:off x="407768" y="490964"/>
+            <a:ext cx="8312700" cy="672000"/>
+          </a:xfrm>
+          <a:prstGeom prst="rect">
+            <a:avLst/>
+          </a:prstGeom>
+        </p:spPr>
+        <p:txBody>
+          <a:bodyPr spcFirstLastPara="1" wrap="square" lIns="60500" tIns="60500" rIns="60500" bIns="60500" anchor="b" anchorCtr="0">
+            <a:noAutofit/>
+          </a:bodyPr>
+          <a:lstStyle/>
+          <a:p>
+            <a:pPr marL="0" lvl="0" indent="0" algn="l" rtl="0">
+              <a:spcBef>
+                <a:spcPts val="0"/>
+              </a:spcBef>
+              <a:spcAft>
+                <a:spcPts val="0"/>
+              </a:spcAft>
+              <a:buNone/>
+            </a:pPr>
+            <a:r>
+              <a:rPr lang="en" dirty="0"/>
+              <a:t>Practice 2 – Group Reflection</a:t>
+            </a:r>
+            <a:endParaRPr dirty="0"/>
+          </a:p>
+        </p:txBody>
+      </p:sp>
+      <p:sp>
+        <p:nvSpPr>
+          <p:cNvPr id="211" name="Google Shape;211;p43"/>
+          <p:cNvSpPr txBox="1">
+            <a:spLocks noGrp="1"/>
+          </p:cNvSpPr>
+          <p:nvPr>
+            <p:ph type="body" idx="1"/>
+          </p:nvPr>
+        </p:nvSpPr>
+        <p:spPr>
+          <a:xfrm>
+            <a:off x="407768" y="1139573"/>
+            <a:ext cx="8312700" cy="4003927"/>
+          </a:xfrm>
+          <a:prstGeom prst="rect">
+            <a:avLst/>
+          </a:prstGeom>
+        </p:spPr>
+        <p:txBody>
+          <a:bodyPr spcFirstLastPara="1" wrap="square" lIns="60500" tIns="60500" rIns="60500" bIns="60500" anchor="t" anchorCtr="0">
+            <a:noAutofit/>
+          </a:bodyPr>
+          <a:lstStyle/>
+          <a:p>
+            <a:pPr marL="152400" indent="0">
+              <a:buNone/>
+            </a:pPr>
+            <a:r>
+              <a:rPr lang="pt-BR" dirty="0">
+                <a:solidFill>
+                  <a:srgbClr val="000000"/>
+                </a:solidFill>
+                <a:latin typeface="Consolas"/>
+                <a:ea typeface="Consolas"/>
+                <a:cs typeface="Consolas"/>
+              </a:rPr>
+              <a:t>int A, B, C;</a:t>
+            </a:r>
+          </a:p>
+          <a:p>
+            <a:pPr marL="152400" indent="0">
+              <a:buNone/>
+            </a:pPr>
+            <a:r>
+              <a:rPr lang="pt-BR" dirty="0">
+                <a:solidFill>
+                  <a:srgbClr val="000000"/>
+                </a:solidFill>
+                <a:latin typeface="Consolas"/>
+                <a:ea typeface="Consolas"/>
+                <a:cs typeface="Consolas"/>
+              </a:rPr>
+              <a:t>A = 10;</a:t>
+            </a:r>
+          </a:p>
+          <a:p>
+            <a:pPr marL="152400" indent="0">
+              <a:buNone/>
+            </a:pPr>
+            <a:r>
+              <a:rPr lang="pt-BR" dirty="0">
+                <a:solidFill>
+                  <a:srgbClr val="000000"/>
+                </a:solidFill>
+                <a:latin typeface="Consolas"/>
+                <a:ea typeface="Consolas"/>
+                <a:cs typeface="Consolas"/>
+              </a:rPr>
+              <a:t>A = A + 1;</a:t>
+            </a:r>
+          </a:p>
+          <a:p>
+            <a:pPr marL="152400" indent="0">
+              <a:buNone/>
+            </a:pPr>
+            <a:r>
+              <a:rPr lang="pt-BR" dirty="0">
+                <a:solidFill>
+                  <a:srgbClr val="000000"/>
+                </a:solidFill>
+                <a:latin typeface="Consolas"/>
+                <a:ea typeface="Consolas"/>
+                <a:cs typeface="Consolas"/>
+              </a:rPr>
+              <a:t>B = A/2;</a:t>
+            </a:r>
+          </a:p>
+          <a:p>
+            <a:pPr marL="152400" indent="0">
+              <a:buNone/>
+            </a:pPr>
+            <a:r>
+              <a:rPr lang="pt-BR" dirty="0">
+                <a:solidFill>
+                  <a:srgbClr val="000000"/>
+                </a:solidFill>
+                <a:latin typeface="Consolas"/>
+                <a:ea typeface="Consolas"/>
+                <a:cs typeface="Consolas"/>
+              </a:rPr>
+              <a:t>A = 6;</a:t>
+            </a:r>
+          </a:p>
+          <a:p>
+            <a:pPr marL="152400" indent="0">
+              <a:buNone/>
+            </a:pPr>
+            <a:r>
+              <a:rPr lang="pt-BR" dirty="0">
+                <a:solidFill>
+                  <a:srgbClr val="000000"/>
+                </a:solidFill>
+                <a:latin typeface="Consolas"/>
+                <a:ea typeface="Consolas"/>
+                <a:cs typeface="Consolas"/>
+              </a:rPr>
+              <a:t>C = B + 1;</a:t>
+            </a:r>
+          </a:p>
+          <a:p>
+            <a:pPr marL="152400" indent="0">
+              <a:buNone/>
+            </a:pPr>
+            <a:r>
+              <a:rPr lang="pt-BR" dirty="0">
+                <a:solidFill>
+                  <a:srgbClr val="000000"/>
+                </a:solidFill>
+                <a:latin typeface="Consolas"/>
+                <a:ea typeface="Consolas"/>
+                <a:cs typeface="Consolas"/>
+              </a:rPr>
+              <a:t>C = C + 2;</a:t>
+            </a:r>
+          </a:p>
+          <a:p>
+            <a:pPr marL="152400" indent="0">
+              <a:buNone/>
+            </a:pPr>
+            <a:r>
+              <a:rPr lang="pt-BR" dirty="0">
+                <a:solidFill>
+                  <a:srgbClr val="000000"/>
+                </a:solidFill>
+                <a:latin typeface="Consolas"/>
+                <a:ea typeface="Consolas"/>
+                <a:cs typeface="Consolas"/>
+              </a:rPr>
+              <a:t>A = B/2;</a:t>
+            </a:r>
+          </a:p>
+          <a:p>
+            <a:pPr marL="152400" indent="0">
+              <a:buNone/>
+            </a:pPr>
+            <a:br>
+              <a:rPr lang="en-US" dirty="0"/>
+            </a:br>
+            <a:endParaRPr lang="en-US" dirty="0">
+              <a:solidFill>
+                <a:srgbClr val="000000"/>
+              </a:solidFill>
+              <a:latin typeface="Consolas"/>
+              <a:ea typeface="Consolas"/>
+              <a:cs typeface="Consolas"/>
+            </a:endParaRPr>
+          </a:p>
+        </p:txBody>
+      </p:sp>
+      <p:sp>
+        <p:nvSpPr>
+          <p:cNvPr id="212" name="Google Shape;212;p43"/>
+          <p:cNvSpPr/>
+          <p:nvPr/>
+        </p:nvSpPr>
+        <p:spPr>
+          <a:xfrm>
+            <a:off x="2902403" y="2956034"/>
+            <a:ext cx="5989200" cy="1600200"/>
+          </a:xfrm>
+          <a:prstGeom prst="rect">
+            <a:avLst/>
+          </a:prstGeom>
+          <a:solidFill>
+            <a:schemeClr val="lt2"/>
+          </a:solidFill>
+          <a:ln w="9525" cap="flat" cmpd="sng">
+            <a:solidFill>
+              <a:schemeClr val="dk2"/>
+            </a:solidFill>
+            <a:prstDash val="solid"/>
+            <a:round/>
+            <a:headEnd type="none" w="sm" len="sm"/>
+            <a:tailEnd type="none" w="sm" len="sm"/>
+          </a:ln>
+        </p:spPr>
+        <p:txBody>
+          <a:bodyPr spcFirstLastPara="1" wrap="square" lIns="91425" tIns="91425" rIns="91425" bIns="91425" anchor="ctr" anchorCtr="0">
+            <a:noAutofit/>
+          </a:bodyPr>
+          <a:lstStyle/>
+          <a:p>
+            <a:pPr marL="0" lvl="0" indent="0" algn="l" rtl="0">
+              <a:spcBef>
+                <a:spcPts val="0"/>
+              </a:spcBef>
+              <a:spcAft>
+                <a:spcPts val="0"/>
+              </a:spcAft>
+              <a:buNone/>
+            </a:pPr>
+            <a:r>
+              <a:rPr lang="en" b="1" dirty="0"/>
+              <a:t>What are the final values for A, B, and C?</a:t>
+            </a:r>
+          </a:p>
+          <a:p>
+            <a:pPr marL="0" lvl="0" indent="0" algn="l" rtl="0">
+              <a:spcBef>
+                <a:spcPts val="0"/>
+              </a:spcBef>
+              <a:spcAft>
+                <a:spcPts val="0"/>
+              </a:spcAft>
+              <a:buNone/>
+            </a:pPr>
+            <a:endParaRPr lang="en" b="1" dirty="0"/>
+          </a:p>
+          <a:p>
+            <a:pPr marL="0" lvl="0" indent="0" algn="l" rtl="0">
+              <a:spcBef>
+                <a:spcPts val="0"/>
+              </a:spcBef>
+              <a:spcAft>
+                <a:spcPts val="0"/>
+              </a:spcAft>
+              <a:buNone/>
+            </a:pPr>
+            <a:r>
+              <a:rPr lang="en" b="1" dirty="0"/>
+              <a:t>What happens if A is double instead of int?</a:t>
+            </a:r>
+          </a:p>
+          <a:p>
+            <a:pPr marL="0" lvl="0" indent="0" algn="l" rtl="0">
+              <a:spcBef>
+                <a:spcPts val="0"/>
+              </a:spcBef>
+              <a:spcAft>
+                <a:spcPts val="0"/>
+              </a:spcAft>
+              <a:buNone/>
+            </a:pPr>
+            <a:endParaRPr lang="en" b="1" dirty="0"/>
+          </a:p>
+          <a:p>
+            <a:pPr marL="0" lvl="0" indent="0" algn="l" rtl="0">
+              <a:spcBef>
+                <a:spcPts val="0"/>
+              </a:spcBef>
+              <a:spcAft>
+                <a:spcPts val="0"/>
+              </a:spcAft>
+              <a:buNone/>
+            </a:pPr>
+            <a:r>
+              <a:rPr lang="en" b="1" dirty="0"/>
+              <a:t>What happens if A and B are double instead of int?</a:t>
+            </a:r>
+          </a:p>
+          <a:p>
+            <a:pPr marL="0" lvl="0" indent="0" algn="l" rtl="0">
+              <a:spcBef>
+                <a:spcPts val="0"/>
+              </a:spcBef>
+              <a:spcAft>
+                <a:spcPts val="0"/>
+              </a:spcAft>
+              <a:buNone/>
+            </a:pPr>
+            <a:endParaRPr dirty="0"/>
+          </a:p>
+        </p:txBody>
+      </p:sp>
+    </p:spTree>
+    <p:extLst>
+      <p:ext uri="{BB962C8B-B14F-4D97-AF65-F5344CB8AC3E}">
+        <p14:creationId xmlns:p14="http://schemas.microsoft.com/office/powerpoint/2010/main" val="621376379"/>
       </p:ext>
     </p:extLst>
   </p:cSld>
@@ -19434,6 +19434,12 @@
 </file>
 
 <file path=customXml/item2.xml><?xml version="1.0" encoding="utf-8"?>
+<p:properties xmlns:p="http://schemas.microsoft.com/office/2006/metadata/properties" xmlns:xsi="http://www.w3.org/2001/XMLSchema-instance" xmlns:pc="http://schemas.microsoft.com/office/infopath/2007/PartnerControls">
+  <documentManagement/>
+</p:properties>
+</file>
+
+<file path=customXml/item3.xml><?xml version="1.0" encoding="utf-8"?>
 <ct:contentTypeSchema xmlns:ct="http://schemas.microsoft.com/office/2006/metadata/contentType" xmlns:ma="http://schemas.microsoft.com/office/2006/metadata/properties/metaAttributes" ct:_="" ma:_="" ma:contentTypeName="Document" ma:contentTypeID="0x010100074387D78AC76C4289401EF66FB51FCC" ma:contentTypeVersion="13" ma:contentTypeDescription="Create a new document." ma:contentTypeScope="" ma:versionID="6d00cb191415ef07de8591021eed77b7">
   <xsd:schema xmlns:xsd="http://www.w3.org/2001/XMLSchema" xmlns:xs="http://www.w3.org/2001/XMLSchema" xmlns:p="http://schemas.microsoft.com/office/2006/metadata/properties" xmlns:ns3="92c41bee-f0ee-4aa6-9399-a35fbb883510" xmlns:ns4="e06ed288-fd75-4b50-bbed-f5a5df88c31c" targetNamespace="http://schemas.microsoft.com/office/2006/metadata/properties" ma:root="true" ma:fieldsID="dd3c912a0e2ebbe56c1b62c06dfbba16" ns3:_="" ns4:_="">
     <xsd:import namespace="92c41bee-f0ee-4aa6-9399-a35fbb883510"/>
@@ -19656,12 +19662,6 @@
 </ct:contentTypeSchema>
 </file>
 
-<file path=customXml/item3.xml><?xml version="1.0" encoding="utf-8"?>
-<p:properties xmlns:p="http://schemas.microsoft.com/office/2006/metadata/properties" xmlns:xsi="http://www.w3.org/2001/XMLSchema-instance" xmlns:pc="http://schemas.microsoft.com/office/infopath/2007/PartnerControls">
-  <documentManagement/>
-</p:properties>
-</file>
-
 <file path=customXml/itemProps1.xml><?xml version="1.0" encoding="utf-8"?>
 <ds:datastoreItem xmlns:ds="http://schemas.openxmlformats.org/officeDocument/2006/customXml" ds:itemID="{AD57AD06-F92C-44EB-AE7E-2E7C93F1B38A}">
   <ds:schemaRefs>
@@ -19671,6 +19671,23 @@
 </file>
 
 <file path=customXml/itemProps2.xml><?xml version="1.0" encoding="utf-8"?>
+<ds:datastoreItem xmlns:ds="http://schemas.openxmlformats.org/officeDocument/2006/customXml" ds:itemID="{2DC42811-3B51-4277-9BAB-60004E84128E}">
+  <ds:schemaRefs>
+    <ds:schemaRef ds:uri="http://purl.org/dc/terms/"/>
+    <ds:schemaRef ds:uri="http://purl.org/dc/elements/1.1/"/>
+    <ds:schemaRef ds:uri="92c41bee-f0ee-4aa6-9399-a35fbb883510"/>
+    <ds:schemaRef ds:uri="http://purl.org/dc/dcmitype/"/>
+    <ds:schemaRef ds:uri="http://schemas.microsoft.com/office/2006/documentManagement/types"/>
+    <ds:schemaRef ds:uri="http://schemas.microsoft.com/office/2006/metadata/properties"/>
+    <ds:schemaRef ds:uri="http://schemas.microsoft.com/office/infopath/2007/PartnerControls"/>
+    <ds:schemaRef ds:uri="http://schemas.openxmlformats.org/package/2006/metadata/core-properties"/>
+    <ds:schemaRef ds:uri="e06ed288-fd75-4b50-bbed-f5a5df88c31c"/>
+    <ds:schemaRef ds:uri="http://www.w3.org/XML/1998/namespace"/>
+  </ds:schemaRefs>
+</ds:datastoreItem>
+</file>
+
+<file path=customXml/itemProps3.xml><?xml version="1.0" encoding="utf-8"?>
 <ds:datastoreItem xmlns:ds="http://schemas.openxmlformats.org/officeDocument/2006/customXml" ds:itemID="{92A5BA81-21EF-4D25-A1C1-3693A7025EF6}">
   <ds:schemaRefs>
     <ds:schemaRef ds:uri="http://schemas.microsoft.com/office/2006/metadata/contentType"/>
@@ -19687,21 +19704,4 @@
     <ds:schemaRef ds:uri="http://schemas.microsoft.com/internal/obd"/>
   </ds:schemaRefs>
 </ds:datastoreItem>
-</file>
-
-<file path=customXml/itemProps3.xml><?xml version="1.0" encoding="utf-8"?>
-<ds:datastoreItem xmlns:ds="http://schemas.openxmlformats.org/officeDocument/2006/customXml" ds:itemID="{2DC42811-3B51-4277-9BAB-60004E84128E}">
-  <ds:schemaRefs>
-    <ds:schemaRef ds:uri="http://purl.org/dc/terms/"/>
-    <ds:schemaRef ds:uri="http://purl.org/dc/elements/1.1/"/>
-    <ds:schemaRef ds:uri="92c41bee-f0ee-4aa6-9399-a35fbb883510"/>
-    <ds:schemaRef ds:uri="http://purl.org/dc/dcmitype/"/>
-    <ds:schemaRef ds:uri="http://schemas.microsoft.com/office/2006/documentManagement/types"/>
-    <ds:schemaRef ds:uri="http://schemas.microsoft.com/office/2006/metadata/properties"/>
-    <ds:schemaRef ds:uri="http://schemas.microsoft.com/office/infopath/2007/PartnerControls"/>
-    <ds:schemaRef ds:uri="http://schemas.openxmlformats.org/package/2006/metadata/core-properties"/>
-    <ds:schemaRef ds:uri="e06ed288-fd75-4b50-bbed-f5a5df88c31c"/>
-    <ds:schemaRef ds:uri="http://www.w3.org/XML/1998/namespace"/>
-  </ds:schemaRefs>
-</ds:datastoreItem>
 </file>
</xml_diff>